<commit_message>
Entrega Final Antes de Cloud Computing
</commit_message>
<xml_diff>
--- a/presentacion/Deteccion_Neumonía_CNN.pptx
+++ b/presentacion/Deteccion_Neumonía_CNN.pptx
@@ -5,25 +5,24 @@
     <p:sldMasterId id="2147483658" r:id="rId4"/>
   </p:sldMasterIdLst>
   <p:notesMasterIdLst>
-    <p:notesMasterId r:id="rId18"/>
+    <p:notesMasterId r:id="rId17"/>
   </p:notesMasterIdLst>
   <p:handoutMasterIdLst>
-    <p:handoutMasterId r:id="rId19"/>
+    <p:handoutMasterId r:id="rId18"/>
   </p:handoutMasterIdLst>
   <p:sldIdLst>
     <p:sldId id="350" r:id="rId5"/>
     <p:sldId id="362" r:id="rId6"/>
-    <p:sldId id="361" r:id="rId7"/>
-    <p:sldId id="360" r:id="rId8"/>
+    <p:sldId id="363" r:id="rId7"/>
+    <p:sldId id="365" r:id="rId8"/>
     <p:sldId id="351" r:id="rId9"/>
-    <p:sldId id="352" r:id="rId10"/>
-    <p:sldId id="353" r:id="rId11"/>
-    <p:sldId id="354" r:id="rId12"/>
-    <p:sldId id="355" r:id="rId13"/>
-    <p:sldId id="356" r:id="rId14"/>
+    <p:sldId id="366" r:id="rId10"/>
+    <p:sldId id="352" r:id="rId11"/>
+    <p:sldId id="353" r:id="rId12"/>
+    <p:sldId id="354" r:id="rId13"/>
+    <p:sldId id="355" r:id="rId14"/>
     <p:sldId id="357" r:id="rId15"/>
-    <p:sldId id="358" r:id="rId16"/>
-    <p:sldId id="359" r:id="rId17"/>
+    <p:sldId id="356" r:id="rId16"/>
   </p:sldIdLst>
   <p:sldSz cx="12192000" cy="6858000"/>
   <p:notesSz cx="6858000" cy="9144000"/>
@@ -722,6 +721,110 @@
     <p:extLst>
       <p:ext uri="{BB962C8B-B14F-4D97-AF65-F5344CB8AC3E}">
         <p14:creationId xmlns:p14="http://schemas.microsoft.com/office/powerpoint/2010/main" val="875041331"/>
+      </p:ext>
+    </p:extLst>
+  </p:cSld>
+  <p:clrMapOvr>
+    <a:masterClrMapping/>
+  </p:clrMapOvr>
+</p:notes>
+</file>
+
+<file path=ppt/notesSlides/notesSlide2.xml><?xml version="1.0" encoding="utf-8"?>
+<p:notes xmlns:a="http://schemas.openxmlformats.org/drawingml/2006/main" xmlns:r="http://schemas.openxmlformats.org/officeDocument/2006/relationships" xmlns:p="http://schemas.openxmlformats.org/presentationml/2006/main">
+  <p:cSld>
+    <p:spTree>
+      <p:nvGrpSpPr>
+        <p:cNvPr id="1" name=""/>
+        <p:cNvGrpSpPr/>
+        <p:nvPr/>
+      </p:nvGrpSpPr>
+      <p:grpSpPr>
+        <a:xfrm>
+          <a:off x="0" y="0"/>
+          <a:ext cx="0" cy="0"/>
+          <a:chOff x="0" y="0"/>
+          <a:chExt cx="0" cy="0"/>
+        </a:xfrm>
+      </p:grpSpPr>
+      <p:sp>
+        <p:nvSpPr>
+          <p:cNvPr id="2" name="Marcador de imagen de diapositiva 1"/>
+          <p:cNvSpPr>
+            <a:spLocks noGrp="1" noRot="1" noChangeAspect="1"/>
+          </p:cNvSpPr>
+          <p:nvPr>
+            <p:ph type="sldImg"/>
+          </p:nvPr>
+        </p:nvSpPr>
+        <p:spPr/>
+      </p:sp>
+      <p:sp>
+        <p:nvSpPr>
+          <p:cNvPr id="3" name="Marcador de notas 2"/>
+          <p:cNvSpPr>
+            <a:spLocks noGrp="1"/>
+          </p:cNvSpPr>
+          <p:nvPr>
+            <p:ph type="body" idx="1"/>
+          </p:nvPr>
+        </p:nvSpPr>
+        <p:spPr/>
+        <p:txBody>
+          <a:bodyPr/>
+          <a:lstStyle/>
+          <a:p>
+            <a:r>
+              <a:rPr lang="es-MX" dirty="0"/>
+              <a:t>El motivo de elección de esta arquitectura es porque es una de las más populares y con mejores resultados para el área de </a:t>
+            </a:r>
+            <a:r>
+              <a:rPr lang="es-MX" dirty="0" err="1"/>
+              <a:t>Computer</a:t>
+            </a:r>
+            <a:r>
+              <a:rPr lang="es-MX" dirty="0"/>
+              <a:t> </a:t>
+            </a:r>
+            <a:r>
+              <a:rPr lang="es-MX" dirty="0" err="1"/>
+              <a:t>Vision</a:t>
+            </a:r>
+            <a:r>
+              <a:rPr lang="es-MX" dirty="0"/>
+              <a:t>.</a:t>
+            </a:r>
+          </a:p>
+        </p:txBody>
+      </p:sp>
+      <p:sp>
+        <p:nvSpPr>
+          <p:cNvPr id="4" name="Marcador de número de diapositiva 3"/>
+          <p:cNvSpPr>
+            <a:spLocks noGrp="1"/>
+          </p:cNvSpPr>
+          <p:nvPr>
+            <p:ph type="sldNum" sz="quarter" idx="5"/>
+          </p:nvPr>
+        </p:nvSpPr>
+        <p:spPr/>
+        <p:txBody>
+          <a:bodyPr/>
+          <a:lstStyle/>
+          <a:p>
+            <a:pPr rtl="0"/>
+            <a:fld id="{A89C7E07-3C67-C64C-8DA0-0404F6303970}" type="slidenum">
+              <a:rPr lang="es-ES" noProof="0" smtClean="0"/>
+              <a:t>5</a:t>
+            </a:fld>
+            <a:endParaRPr lang="es-ES" noProof="0"/>
+          </a:p>
+        </p:txBody>
+      </p:sp>
+    </p:spTree>
+    <p:extLst>
+      <p:ext uri="{BB962C8B-B14F-4D97-AF65-F5344CB8AC3E}">
+        <p14:creationId xmlns:p14="http://schemas.microsoft.com/office/powerpoint/2010/main" val="4017830789"/>
       </p:ext>
     </p:extLst>
   </p:cSld>
@@ -13473,6 +13576,37 @@
           <a:chExt cx="0" cy="0"/>
         </a:xfrm>
       </p:grpSpPr>
+      <p:pic>
+        <p:nvPicPr>
+          <p:cNvPr id="5" name="Imagen 4">
+            <a:extLst>
+              <a:ext uri="{FF2B5EF4-FFF2-40B4-BE49-F238E27FC236}">
+                <a16:creationId xmlns:a16="http://schemas.microsoft.com/office/drawing/2014/main" id="{3307D3A6-1642-F13C-6153-703FC0FECDDC}"/>
+              </a:ext>
+            </a:extLst>
+          </p:cNvPr>
+          <p:cNvPicPr>
+            <a:picLocks noChangeAspect="1"/>
+          </p:cNvPicPr>
+          <p:nvPr/>
+        </p:nvPicPr>
+        <p:blipFill>
+          <a:blip r:embed="rId2"/>
+          <a:stretch>
+            <a:fillRect/>
+          </a:stretch>
+        </p:blipFill>
+        <p:spPr>
+          <a:xfrm>
+            <a:off x="6096000" y="1005840"/>
+            <a:ext cx="6096000" cy="4846320"/>
+          </a:xfrm>
+          <a:prstGeom prst="rect">
+            <a:avLst/>
+          </a:prstGeom>
+          <a:noFill/>
+        </p:spPr>
+      </p:pic>
       <p:sp>
         <p:nvSpPr>
           <p:cNvPr id="3" name="Título 2">
@@ -13489,12 +13623,22 @@
             <p:ph type="title"/>
           </p:nvPr>
         </p:nvSpPr>
-        <p:spPr/>
+        <p:spPr>
+          <a:xfrm>
+            <a:off x="964023" y="879063"/>
+            <a:ext cx="4941477" cy="610863"/>
+          </a:xfrm>
+        </p:spPr>
         <p:txBody>
-          <a:bodyPr/>
+          <a:bodyPr anchor="b">
+            <a:normAutofit/>
+          </a:bodyPr>
           <a:lstStyle/>
           <a:p>
-            <a:endParaRPr lang="es-MX"/>
+            <a:r>
+              <a:rPr lang="es-MX" sz="4100"/>
+              <a:t>Frontend (Streamlit)</a:t>
+            </a:r>
           </a:p>
         </p:txBody>
       </p:sp>
@@ -13514,12 +13658,36 @@
             <p:ph type="body" sz="quarter" idx="11"/>
           </p:nvPr>
         </p:nvSpPr>
-        <p:spPr/>
+        <p:spPr>
+          <a:xfrm>
+            <a:off x="952499" y="2289363"/>
+            <a:ext cx="4572001" cy="2795232"/>
+          </a:xfrm>
+        </p:spPr>
         <p:txBody>
-          <a:bodyPr/>
+          <a:bodyPr>
+            <a:normAutofit/>
+          </a:bodyPr>
           <a:lstStyle/>
           <a:p>
-            <a:endParaRPr lang="es-MX"/>
+            <a:pPr marL="285750" indent="-285750" algn="just">
+              <a:buFontTx/>
+              <a:buChar char="-"/>
+            </a:pPr>
+            <a:r>
+              <a:rPr lang="es-MX" sz="2000" dirty="0"/>
+              <a:t>Se creó un Frontend para poder hacer uso de la imagen de manera más fácil y visual.</a:t>
+            </a:r>
+          </a:p>
+          <a:p>
+            <a:pPr marL="285750" indent="-285750" algn="just">
+              <a:buFontTx/>
+              <a:buChar char="-"/>
+            </a:pPr>
+            <a:r>
+              <a:rPr lang="es-MX" sz="2000" dirty="0"/>
+              <a:t>Este se comunica con el contenedor de Frontend para hacer el Request al Backend y obtener el Response de la API.</a:t>
+            </a:r>
           </a:p>
         </p:txBody>
       </p:sp>
@@ -13539,25 +13707,40 @@
             <p:ph type="sldNum" sz="quarter" idx="16"/>
           </p:nvPr>
         </p:nvSpPr>
-        <p:spPr/>
+        <p:spPr>
+          <a:xfrm>
+            <a:off x="971550" y="6332220"/>
+            <a:ext cx="523240" cy="247651"/>
+          </a:xfrm>
+        </p:spPr>
         <p:txBody>
-          <a:bodyPr/>
+          <a:bodyPr anchor="t">
+            <a:normAutofit/>
+          </a:bodyPr>
           <a:lstStyle/>
           <a:p>
-            <a:pPr rtl="0"/>
+            <a:pPr rtl="0">
+              <a:spcAft>
+                <a:spcPts val="600"/>
+              </a:spcAft>
+            </a:pPr>
             <a:fld id="{294A09A9-5501-47C1-A89A-A340965A2BE2}" type="slidenum">
               <a:rPr lang="es-ES" noProof="0" smtClean="0"/>
-              <a:pPr rtl="0"/>
+              <a:pPr rtl="0">
+                <a:spcAft>
+                  <a:spcPts val="600"/>
+                </a:spcAft>
+              </a:pPr>
               <a:t>10</a:t>
             </a:fld>
-            <a:endParaRPr lang="es-ES" noProof="0" dirty="0"/>
+            <a:endParaRPr lang="es-ES" noProof="0"/>
           </a:p>
         </p:txBody>
       </p:sp>
     </p:spTree>
     <p:extLst>
       <p:ext uri="{BB962C8B-B14F-4D97-AF65-F5344CB8AC3E}">
-        <p14:creationId xmlns:p14="http://schemas.microsoft.com/office/powerpoint/2010/main" val="2908943904"/>
+        <p14:creationId xmlns:p14="http://schemas.microsoft.com/office/powerpoint/2010/main" val="733852120"/>
       </p:ext>
     </p:extLst>
   </p:cSld>
@@ -13605,7 +13788,10 @@
           <a:bodyPr/>
           <a:lstStyle/>
           <a:p>
-            <a:endParaRPr lang="es-MX"/>
+            <a:r>
+              <a:rPr lang="es-MX" dirty="0"/>
+              <a:t>Cloud Computing</a:t>
+            </a:r>
           </a:p>
         </p:txBody>
       </p:sp>
@@ -13695,6 +13881,35 @@
           <a:chExt cx="0" cy="0"/>
         </a:xfrm>
       </p:grpSpPr>
+      <p:pic>
+        <p:nvPicPr>
+          <p:cNvPr id="5" name="Imagen 4">
+            <a:extLst>
+              <a:ext uri="{FF2B5EF4-FFF2-40B4-BE49-F238E27FC236}">
+                <a16:creationId xmlns:a16="http://schemas.microsoft.com/office/drawing/2014/main" id="{79BFAA1C-F735-A56B-8A79-96566D82404D}"/>
+              </a:ext>
+            </a:extLst>
+          </p:cNvPr>
+          <p:cNvPicPr>
+            <a:picLocks noChangeAspect="1"/>
+          </p:cNvPicPr>
+          <p:nvPr/>
+        </p:nvPicPr>
+        <p:blipFill rotWithShape="1">
+          <a:blip r:embed="rId2"/>
+          <a:srcRect l="8519" r="8519"/>
+          <a:stretch/>
+        </p:blipFill>
+        <p:spPr>
+          <a:xfrm>
+            <a:off x="0" y="0"/>
+            <a:ext cx="12192000" cy="6858000"/>
+          </a:xfrm>
+          <a:prstGeom prst="rect">
+            <a:avLst/>
+          </a:prstGeom>
+        </p:spPr>
+      </p:pic>
       <p:sp>
         <p:nvSpPr>
           <p:cNvPr id="3" name="Título 2">
@@ -13711,186 +13926,49 @@
             <p:ph type="title"/>
           </p:nvPr>
         </p:nvSpPr>
-        <p:spPr/>
+        <p:spPr>
+          <a:xfrm>
+            <a:off x="7128603" y="3954294"/>
+            <a:ext cx="4941477" cy="1228569"/>
+          </a:xfrm>
+        </p:spPr>
         <p:txBody>
-          <a:bodyPr/>
+          <a:bodyPr>
+            <a:normAutofit/>
+          </a:bodyPr>
           <a:lstStyle/>
           <a:p>
-            <a:endParaRPr lang="es-MX"/>
-          </a:p>
-        </p:txBody>
-      </p:sp>
-      <p:sp>
-        <p:nvSpPr>
-          <p:cNvPr id="4" name="Marcador de texto 3">
-            <a:extLst>
-              <a:ext uri="{FF2B5EF4-FFF2-40B4-BE49-F238E27FC236}">
-                <a16:creationId xmlns:a16="http://schemas.microsoft.com/office/drawing/2014/main" id="{92936A34-2D94-C70C-4498-6D949A584EA0}"/>
-              </a:ext>
-            </a:extLst>
-          </p:cNvPr>
-          <p:cNvSpPr>
-            <a:spLocks noGrp="1"/>
-          </p:cNvSpPr>
-          <p:nvPr>
-            <p:ph type="body" sz="quarter" idx="11"/>
-          </p:nvPr>
-        </p:nvSpPr>
-        <p:spPr/>
-        <p:txBody>
-          <a:bodyPr/>
-          <a:lstStyle/>
-          <a:p>
-            <a:endParaRPr lang="es-MX"/>
-          </a:p>
-        </p:txBody>
-      </p:sp>
-      <p:sp>
-        <p:nvSpPr>
-          <p:cNvPr id="7" name="Marcador de número de diapositiva 6">
-            <a:extLst>
-              <a:ext uri="{FF2B5EF4-FFF2-40B4-BE49-F238E27FC236}">
-                <a16:creationId xmlns:a16="http://schemas.microsoft.com/office/drawing/2014/main" id="{C21CBD27-EBAE-1277-0B7D-91C35B427B26}"/>
-              </a:ext>
-            </a:extLst>
-          </p:cNvPr>
-          <p:cNvSpPr>
-            <a:spLocks noGrp="1"/>
-          </p:cNvSpPr>
-          <p:nvPr>
-            <p:ph type="sldNum" sz="quarter" idx="16"/>
-          </p:nvPr>
-        </p:nvSpPr>
-        <p:spPr/>
-        <p:txBody>
-          <a:bodyPr/>
-          <a:lstStyle/>
-          <a:p>
-            <a:pPr rtl="0"/>
-            <a:fld id="{294A09A9-5501-47C1-A89A-A340965A2BE2}" type="slidenum">
-              <a:rPr lang="es-ES" noProof="0" smtClean="0"/>
-              <a:pPr rtl="0"/>
-              <a:t>12</a:t>
-            </a:fld>
-            <a:endParaRPr lang="es-ES" noProof="0" dirty="0"/>
+            <a:pPr algn="r"/>
+            <a:r>
+              <a:rPr lang="es-MX" u="sng" dirty="0">
+                <a:solidFill>
+                  <a:schemeClr val="tx1"/>
+                </a:solidFill>
+              </a:rPr>
+              <a:t>DEMOSTRACIÓN </a:t>
+            </a:r>
+            <a:br>
+              <a:rPr lang="es-MX" u="sng" dirty="0">
+                <a:solidFill>
+                  <a:schemeClr val="tx1"/>
+                </a:solidFill>
+              </a:rPr>
+            </a:br>
+            <a:r>
+              <a:rPr lang="es-MX" u="sng" dirty="0">
+                <a:solidFill>
+                  <a:schemeClr val="tx1"/>
+                </a:solidFill>
+              </a:rPr>
+              <a:t>EN VIVO</a:t>
+            </a:r>
           </a:p>
         </p:txBody>
       </p:sp>
     </p:spTree>
     <p:extLst>
       <p:ext uri="{BB962C8B-B14F-4D97-AF65-F5344CB8AC3E}">
-        <p14:creationId xmlns:p14="http://schemas.microsoft.com/office/powerpoint/2010/main" val="2700183694"/>
-      </p:ext>
-    </p:extLst>
-  </p:cSld>
-  <p:clrMapOvr>
-    <a:masterClrMapping/>
-  </p:clrMapOvr>
-</p:sld>
-</file>
-
-<file path=ppt/slides/slide13.xml><?xml version="1.0" encoding="utf-8"?>
-<p:sld xmlns:a="http://schemas.openxmlformats.org/drawingml/2006/main" xmlns:r="http://schemas.openxmlformats.org/officeDocument/2006/relationships" xmlns:p="http://schemas.openxmlformats.org/presentationml/2006/main">
-  <p:cSld>
-    <p:spTree>
-      <p:nvGrpSpPr>
-        <p:cNvPr id="1" name=""/>
-        <p:cNvGrpSpPr/>
-        <p:nvPr/>
-      </p:nvGrpSpPr>
-      <p:grpSpPr>
-        <a:xfrm>
-          <a:off x="0" y="0"/>
-          <a:ext cx="0" cy="0"/>
-          <a:chOff x="0" y="0"/>
-          <a:chExt cx="0" cy="0"/>
-        </a:xfrm>
-      </p:grpSpPr>
-      <p:sp>
-        <p:nvSpPr>
-          <p:cNvPr id="3" name="Título 2">
-            <a:extLst>
-              <a:ext uri="{FF2B5EF4-FFF2-40B4-BE49-F238E27FC236}">
-                <a16:creationId xmlns:a16="http://schemas.microsoft.com/office/drawing/2014/main" id="{3CA8A120-A0F5-BCE0-20CD-84A0849EBB53}"/>
-              </a:ext>
-            </a:extLst>
-          </p:cNvPr>
-          <p:cNvSpPr>
-            <a:spLocks noGrp="1"/>
-          </p:cNvSpPr>
-          <p:nvPr>
-            <p:ph type="title"/>
-          </p:nvPr>
-        </p:nvSpPr>
-        <p:spPr/>
-        <p:txBody>
-          <a:bodyPr/>
-          <a:lstStyle/>
-          <a:p>
-            <a:endParaRPr lang="es-MX"/>
-          </a:p>
-        </p:txBody>
-      </p:sp>
-      <p:sp>
-        <p:nvSpPr>
-          <p:cNvPr id="4" name="Marcador de texto 3">
-            <a:extLst>
-              <a:ext uri="{FF2B5EF4-FFF2-40B4-BE49-F238E27FC236}">
-                <a16:creationId xmlns:a16="http://schemas.microsoft.com/office/drawing/2014/main" id="{92936A34-2D94-C70C-4498-6D949A584EA0}"/>
-              </a:ext>
-            </a:extLst>
-          </p:cNvPr>
-          <p:cNvSpPr>
-            <a:spLocks noGrp="1"/>
-          </p:cNvSpPr>
-          <p:nvPr>
-            <p:ph type="body" sz="quarter" idx="11"/>
-          </p:nvPr>
-        </p:nvSpPr>
-        <p:spPr/>
-        <p:txBody>
-          <a:bodyPr/>
-          <a:lstStyle/>
-          <a:p>
-            <a:endParaRPr lang="es-MX"/>
-          </a:p>
-        </p:txBody>
-      </p:sp>
-      <p:sp>
-        <p:nvSpPr>
-          <p:cNvPr id="7" name="Marcador de número de diapositiva 6">
-            <a:extLst>
-              <a:ext uri="{FF2B5EF4-FFF2-40B4-BE49-F238E27FC236}">
-                <a16:creationId xmlns:a16="http://schemas.microsoft.com/office/drawing/2014/main" id="{C21CBD27-EBAE-1277-0B7D-91C35B427B26}"/>
-              </a:ext>
-            </a:extLst>
-          </p:cNvPr>
-          <p:cNvSpPr>
-            <a:spLocks noGrp="1"/>
-          </p:cNvSpPr>
-          <p:nvPr>
-            <p:ph type="sldNum" sz="quarter" idx="16"/>
-          </p:nvPr>
-        </p:nvSpPr>
-        <p:spPr/>
-        <p:txBody>
-          <a:bodyPr/>
-          <a:lstStyle/>
-          <a:p>
-            <a:pPr rtl="0"/>
-            <a:fld id="{294A09A9-5501-47C1-A89A-A340965A2BE2}" type="slidenum">
-              <a:rPr lang="es-ES" noProof="0" smtClean="0"/>
-              <a:pPr rtl="0"/>
-              <a:t>13</a:t>
-            </a:fld>
-            <a:endParaRPr lang="es-ES" noProof="0" dirty="0"/>
-          </a:p>
-        </p:txBody>
-      </p:sp>
-    </p:spTree>
-    <p:extLst>
-      <p:ext uri="{BB962C8B-B14F-4D97-AF65-F5344CB8AC3E}">
-        <p14:creationId xmlns:p14="http://schemas.microsoft.com/office/powerpoint/2010/main" val="324881395"/>
+        <p14:creationId xmlns:p14="http://schemas.microsoft.com/office/powerpoint/2010/main" val="2908943904"/>
       </p:ext>
     </p:extLst>
   </p:cSld>
@@ -13961,12 +14039,21 @@
             <p:ph type="body" sz="quarter" idx="13"/>
           </p:nvPr>
         </p:nvSpPr>
-        <p:spPr/>
+        <p:spPr>
+          <a:xfrm>
+            <a:off x="952500" y="2633630"/>
+            <a:ext cx="4953000" cy="1282588"/>
+          </a:xfrm>
+        </p:spPr>
         <p:txBody>
           <a:bodyPr/>
           <a:lstStyle/>
           <a:p>
-            <a:endParaRPr lang="es-MX"/>
+            <a:pPr algn="just"/>
+            <a:r>
+              <a:rPr lang="es-MX" sz="1800" dirty="0"/>
+              <a:t>Realizar una arquitectura de Redes Neuronales Convolucionales (CNN). Para poder interpretar una radiografía pulmonar y de esa forma reconocer patrones de Neumonía en las mismos.</a:t>
+            </a:r>
           </a:p>
         </p:txBody>
       </p:sp>
@@ -13986,62 +14073,20 @@
             <p:ph type="body" sz="quarter" idx="14"/>
           </p:nvPr>
         </p:nvSpPr>
-        <p:spPr/>
+        <p:spPr>
+          <a:xfrm>
+            <a:off x="952500" y="2052783"/>
+            <a:ext cx="2133600" cy="205837"/>
+          </a:xfrm>
+        </p:spPr>
         <p:txBody>
           <a:bodyPr/>
           <a:lstStyle/>
           <a:p>
-            <a:endParaRPr lang="es-MX"/>
-          </a:p>
-        </p:txBody>
-      </p:sp>
-      <p:sp>
-        <p:nvSpPr>
-          <p:cNvPr id="5" name="Marcador de texto 4">
-            <a:extLst>
-              <a:ext uri="{FF2B5EF4-FFF2-40B4-BE49-F238E27FC236}">
-                <a16:creationId xmlns:a16="http://schemas.microsoft.com/office/drawing/2014/main" id="{AA912391-BECD-46F4-A0CE-970D177E4445}"/>
-              </a:ext>
-            </a:extLst>
-          </p:cNvPr>
-          <p:cNvSpPr>
-            <a:spLocks noGrp="1"/>
-          </p:cNvSpPr>
-          <p:nvPr>
-            <p:ph type="body" sz="quarter" idx="15"/>
-          </p:nvPr>
-        </p:nvSpPr>
-        <p:spPr/>
-        <p:txBody>
-          <a:bodyPr/>
-          <a:lstStyle/>
-          <a:p>
-            <a:endParaRPr lang="es-MX"/>
-          </a:p>
-        </p:txBody>
-      </p:sp>
-      <p:sp>
-        <p:nvSpPr>
-          <p:cNvPr id="6" name="Marcador de texto 5">
-            <a:extLst>
-              <a:ext uri="{FF2B5EF4-FFF2-40B4-BE49-F238E27FC236}">
-                <a16:creationId xmlns:a16="http://schemas.microsoft.com/office/drawing/2014/main" id="{B4791406-5091-4492-21E4-8D10205D005D}"/>
-              </a:ext>
-            </a:extLst>
-          </p:cNvPr>
-          <p:cNvSpPr>
-            <a:spLocks noGrp="1"/>
-          </p:cNvSpPr>
-          <p:nvPr>
-            <p:ph type="body" sz="quarter" idx="16"/>
-          </p:nvPr>
-        </p:nvSpPr>
-        <p:spPr/>
-        <p:txBody>
-          <a:bodyPr/>
-          <a:lstStyle/>
-          <a:p>
-            <a:endParaRPr lang="es-MX"/>
+            <a:r>
+              <a:rPr lang="es-MX" sz="2400" dirty="0"/>
+              <a:t>¿Qué se busca?</a:t>
+            </a:r>
           </a:p>
         </p:txBody>
       </p:sp>
@@ -14061,12 +14106,56 @@
             <p:ph type="body" sz="quarter" idx="19"/>
           </p:nvPr>
         </p:nvSpPr>
-        <p:spPr/>
+        <p:spPr>
+          <a:xfrm>
+            <a:off x="971549" y="4932912"/>
+            <a:ext cx="10370706" cy="1282588"/>
+          </a:xfrm>
+        </p:spPr>
         <p:txBody>
           <a:bodyPr/>
           <a:lstStyle/>
           <a:p>
-            <a:endParaRPr lang="es-MX"/>
+            <a:pPr algn="just"/>
+            <a:r>
+              <a:rPr lang="es-MX" sz="1800" dirty="0"/>
+              <a:t>"La neumonía es una infección que inflama los sacos aéreos de uno o ambos pulmones. Los sacos aéreos se pueden llenar de líquido o pus (...), lo que provoca tos con flema o pus, fiebre, escalofríos y dificultad para respirar.” </a:t>
+            </a:r>
+            <a:r>
+              <a:rPr lang="es-MX" sz="1100" u="sng" dirty="0"/>
+              <a:t>(Neumonía - Síntomas y causas - Mayo </a:t>
+            </a:r>
+            <a:r>
+              <a:rPr lang="es-MX" sz="1100" u="sng" dirty="0" err="1"/>
+              <a:t>Clinic</a:t>
+            </a:r>
+            <a:r>
+              <a:rPr lang="es-MX" sz="1100" u="sng" dirty="0"/>
+              <a:t>, 2021)</a:t>
+            </a:r>
+          </a:p>
+          <a:p>
+            <a:pPr algn="just"/>
+            <a:r>
+              <a:rPr lang="es-MX" sz="1800" dirty="0"/>
+              <a:t>Según </a:t>
+            </a:r>
+            <a:r>
+              <a:rPr lang="es-MX" sz="1800" dirty="0" err="1"/>
+              <a:t>Statita</a:t>
+            </a:r>
+            <a:r>
+              <a:rPr lang="es-MX" sz="1800" dirty="0"/>
+              <a:t> (2022), en México murieron alrededor de </a:t>
+            </a:r>
+            <a:r>
+              <a:rPr lang="es-MX" sz="1800" b="1" i="1" dirty="0"/>
+              <a:t>56,899</a:t>
+            </a:r>
+            <a:r>
+              <a:rPr lang="es-MX" sz="1800" dirty="0"/>
+              <a:t> personas por Neumonía en 2020.</a:t>
+            </a:r>
           </a:p>
         </p:txBody>
       </p:sp>
@@ -14086,210 +14175,228 @@
             <p:ph type="body" sz="quarter" idx="20"/>
           </p:nvPr>
         </p:nvSpPr>
-        <p:spPr/>
+        <p:spPr>
+          <a:xfrm>
+            <a:off x="952500" y="4421204"/>
+            <a:ext cx="2133600" cy="205837"/>
+          </a:xfrm>
+        </p:spPr>
         <p:txBody>
           <a:bodyPr/>
           <a:lstStyle/>
           <a:p>
-            <a:endParaRPr lang="es-MX"/>
+            <a:r>
+              <a:rPr lang="es-MX" sz="2400" dirty="0"/>
+              <a:t>Problemática</a:t>
+            </a:r>
           </a:p>
         </p:txBody>
       </p:sp>
       <p:sp>
         <p:nvSpPr>
-          <p:cNvPr id="9" name="Marcador de texto 8">
-            <a:extLst>
-              <a:ext uri="{FF2B5EF4-FFF2-40B4-BE49-F238E27FC236}">
-                <a16:creationId xmlns:a16="http://schemas.microsoft.com/office/drawing/2014/main" id="{087B0CBA-DC93-6EF1-BAD1-43DF96D7202F}"/>
-              </a:ext>
-            </a:extLst>
-          </p:cNvPr>
-          <p:cNvSpPr>
-            <a:spLocks noGrp="1"/>
-          </p:cNvSpPr>
-          <p:nvPr>
-            <p:ph type="body" sz="quarter" idx="21"/>
-          </p:nvPr>
+          <p:cNvPr id="17" name="Rectángulo 16">
+            <a:extLst>
+              <a:ext uri="{FF2B5EF4-FFF2-40B4-BE49-F238E27FC236}">
+                <a16:creationId xmlns:a16="http://schemas.microsoft.com/office/drawing/2014/main" id="{337B147C-111E-C479-BDAE-D34AF2EFD41B}"/>
+              </a:ext>
+            </a:extLst>
+          </p:cNvPr>
+          <p:cNvSpPr/>
+          <p:nvPr/>
         </p:nvSpPr>
-        <p:spPr/>
+        <p:spPr>
+          <a:xfrm>
+            <a:off x="3607625" y="1764145"/>
+            <a:ext cx="2242458" cy="332366"/>
+          </a:xfrm>
+          <a:prstGeom prst="rect">
+            <a:avLst/>
+          </a:prstGeom>
+          <a:solidFill>
+            <a:srgbClr val="FFFFFF"/>
+          </a:solidFill>
+          <a:ln>
+            <a:noFill/>
+          </a:ln>
+        </p:spPr>
+        <p:style>
+          <a:lnRef idx="2">
+            <a:schemeClr val="accent1">
+              <a:shade val="50000"/>
+            </a:schemeClr>
+          </a:lnRef>
+          <a:fillRef idx="1">
+            <a:schemeClr val="accent1"/>
+          </a:fillRef>
+          <a:effectRef idx="0">
+            <a:schemeClr val="accent1"/>
+          </a:effectRef>
+          <a:fontRef idx="minor">
+            <a:schemeClr val="lt1"/>
+          </a:fontRef>
+        </p:style>
         <p:txBody>
-          <a:bodyPr/>
+          <a:bodyPr rtlCol="0" anchor="ctr"/>
           <a:lstStyle/>
           <a:p>
+            <a:pPr algn="ctr"/>
             <a:endParaRPr lang="es-MX"/>
           </a:p>
         </p:txBody>
       </p:sp>
       <p:sp>
         <p:nvSpPr>
-          <p:cNvPr id="10" name="Marcador de texto 9">
-            <a:extLst>
-              <a:ext uri="{FF2B5EF4-FFF2-40B4-BE49-F238E27FC236}">
-                <a16:creationId xmlns:a16="http://schemas.microsoft.com/office/drawing/2014/main" id="{29EB01A8-C6F1-D65F-CCAE-808A1FC232B2}"/>
-              </a:ext>
-            </a:extLst>
-          </p:cNvPr>
-          <p:cNvSpPr>
-            <a:spLocks noGrp="1"/>
-          </p:cNvSpPr>
-          <p:nvPr>
-            <p:ph type="body" sz="quarter" idx="22"/>
-          </p:nvPr>
+          <p:cNvPr id="18" name="Rectángulo 17">
+            <a:extLst>
+              <a:ext uri="{FF2B5EF4-FFF2-40B4-BE49-F238E27FC236}">
+                <a16:creationId xmlns:a16="http://schemas.microsoft.com/office/drawing/2014/main" id="{95D8BA5A-2AE7-8FEC-8CBB-B98636CBD05E}"/>
+              </a:ext>
+            </a:extLst>
+          </p:cNvPr>
+          <p:cNvSpPr/>
+          <p:nvPr/>
         </p:nvSpPr>
-        <p:spPr/>
+        <p:spPr>
+          <a:xfrm>
+            <a:off x="3607625" y="4181057"/>
+            <a:ext cx="2242458" cy="332366"/>
+          </a:xfrm>
+          <a:prstGeom prst="rect">
+            <a:avLst/>
+          </a:prstGeom>
+          <a:solidFill>
+            <a:srgbClr val="FFFFFF"/>
+          </a:solidFill>
+          <a:ln>
+            <a:noFill/>
+          </a:ln>
+        </p:spPr>
+        <p:style>
+          <a:lnRef idx="2">
+            <a:schemeClr val="accent1">
+              <a:shade val="50000"/>
+            </a:schemeClr>
+          </a:lnRef>
+          <a:fillRef idx="1">
+            <a:schemeClr val="accent1"/>
+          </a:fillRef>
+          <a:effectRef idx="0">
+            <a:schemeClr val="accent1"/>
+          </a:effectRef>
+          <a:fontRef idx="minor">
+            <a:schemeClr val="lt1"/>
+          </a:fontRef>
+        </p:style>
         <p:txBody>
-          <a:bodyPr/>
+          <a:bodyPr rtlCol="0" anchor="ctr"/>
           <a:lstStyle/>
           <a:p>
+            <a:pPr algn="ctr"/>
             <a:endParaRPr lang="es-MX"/>
           </a:p>
         </p:txBody>
       </p:sp>
       <p:sp>
         <p:nvSpPr>
-          <p:cNvPr id="11" name="Marcador de texto 10">
-            <a:extLst>
-              <a:ext uri="{FF2B5EF4-FFF2-40B4-BE49-F238E27FC236}">
-                <a16:creationId xmlns:a16="http://schemas.microsoft.com/office/drawing/2014/main" id="{D3A96504-3E81-83CC-5927-CC35C18F47A1}"/>
-              </a:ext>
-            </a:extLst>
-          </p:cNvPr>
-          <p:cNvSpPr>
-            <a:spLocks noGrp="1"/>
-          </p:cNvSpPr>
-          <p:nvPr>
-            <p:ph type="body" sz="quarter" idx="23"/>
-          </p:nvPr>
+          <p:cNvPr id="19" name="Rectángulo 18">
+            <a:extLst>
+              <a:ext uri="{FF2B5EF4-FFF2-40B4-BE49-F238E27FC236}">
+                <a16:creationId xmlns:a16="http://schemas.microsoft.com/office/drawing/2014/main" id="{28F1971C-2183-6076-A1E9-414D9AA7BDEC}"/>
+              </a:ext>
+            </a:extLst>
+          </p:cNvPr>
+          <p:cNvSpPr/>
+          <p:nvPr/>
         </p:nvSpPr>
-        <p:spPr/>
+        <p:spPr>
+          <a:xfrm>
+            <a:off x="6341919" y="4177898"/>
+            <a:ext cx="2242458" cy="332366"/>
+          </a:xfrm>
+          <a:prstGeom prst="rect">
+            <a:avLst/>
+          </a:prstGeom>
+          <a:solidFill>
+            <a:srgbClr val="FFFFFF"/>
+          </a:solidFill>
+          <a:ln>
+            <a:noFill/>
+          </a:ln>
+        </p:spPr>
+        <p:style>
+          <a:lnRef idx="2">
+            <a:schemeClr val="accent1">
+              <a:shade val="50000"/>
+            </a:schemeClr>
+          </a:lnRef>
+          <a:fillRef idx="1">
+            <a:schemeClr val="accent1"/>
+          </a:fillRef>
+          <a:effectRef idx="0">
+            <a:schemeClr val="accent1"/>
+          </a:effectRef>
+          <a:fontRef idx="minor">
+            <a:schemeClr val="lt1"/>
+          </a:fontRef>
+        </p:style>
         <p:txBody>
-          <a:bodyPr/>
+          <a:bodyPr rtlCol="0" anchor="ctr"/>
           <a:lstStyle/>
           <a:p>
+            <a:pPr algn="ctr"/>
             <a:endParaRPr lang="es-MX"/>
           </a:p>
         </p:txBody>
       </p:sp>
-      <p:sp>
-        <p:nvSpPr>
-          <p:cNvPr id="12" name="Marcador de texto 11">
-            <a:extLst>
-              <a:ext uri="{FF2B5EF4-FFF2-40B4-BE49-F238E27FC236}">
-                <a16:creationId xmlns:a16="http://schemas.microsoft.com/office/drawing/2014/main" id="{70BB3BFD-E40E-0D77-F655-E628CF6DB430}"/>
-              </a:ext>
-            </a:extLst>
-          </p:cNvPr>
-          <p:cNvSpPr>
-            <a:spLocks noGrp="1"/>
-          </p:cNvSpPr>
-          <p:nvPr>
-            <p:ph type="body" sz="quarter" idx="24"/>
-          </p:nvPr>
-        </p:nvSpPr>
-        <p:spPr/>
-        <p:txBody>
-          <a:bodyPr/>
-          <a:lstStyle/>
-          <a:p>
-            <a:endParaRPr lang="es-MX"/>
-          </a:p>
-        </p:txBody>
-      </p:sp>
-      <p:sp>
-        <p:nvSpPr>
-          <p:cNvPr id="13" name="Marcador de fecha 12">
-            <a:extLst>
-              <a:ext uri="{FF2B5EF4-FFF2-40B4-BE49-F238E27FC236}">
-                <a16:creationId xmlns:a16="http://schemas.microsoft.com/office/drawing/2014/main" id="{608610CE-F61F-2F65-8293-4A834A895DE7}"/>
-              </a:ext>
-            </a:extLst>
-          </p:cNvPr>
-          <p:cNvSpPr>
-            <a:spLocks noGrp="1"/>
-          </p:cNvSpPr>
-          <p:nvPr>
-            <p:ph type="dt" sz="half" idx="25"/>
-          </p:nvPr>
-        </p:nvSpPr>
-        <p:spPr/>
-        <p:txBody>
-          <a:bodyPr/>
-          <a:lstStyle/>
-          <a:p>
-            <a:pPr rtl="0"/>
-            <a:fld id="{0CFFE12A-8763-4EB7-9CEB-5B78076C5C21}" type="datetime4">
-              <a:rPr lang="es-ES" noProof="0" smtClean="0">
-                <a:latin typeface="+mn-lt"/>
-              </a:rPr>
-              <a:t>30 de noviembre de 2022</a:t>
-            </a:fld>
-            <a:endParaRPr lang="es-ES" noProof="0" dirty="0">
-              <a:latin typeface="+mn-lt"/>
-            </a:endParaRPr>
-          </a:p>
-        </p:txBody>
-      </p:sp>
-      <p:sp>
-        <p:nvSpPr>
-          <p:cNvPr id="14" name="Marcador de pie de página 13">
-            <a:extLst>
-              <a:ext uri="{FF2B5EF4-FFF2-40B4-BE49-F238E27FC236}">
-                <a16:creationId xmlns:a16="http://schemas.microsoft.com/office/drawing/2014/main" id="{396462B4-BF5C-244D-BF2F-F942BB7BB5AA}"/>
-              </a:ext>
-            </a:extLst>
-          </p:cNvPr>
-          <p:cNvSpPr>
-            <a:spLocks noGrp="1"/>
-          </p:cNvSpPr>
-          <p:nvPr>
-            <p:ph type="ftr" sz="quarter" idx="26"/>
-          </p:nvPr>
-        </p:nvSpPr>
-        <p:spPr/>
-        <p:txBody>
-          <a:bodyPr/>
-          <a:lstStyle/>
-          <a:p>
-            <a:pPr rtl="0"/>
-            <a:r>
-              <a:rPr lang="es-ES" noProof="0"/>
-              <a:t>Revisión anual</a:t>
-            </a:r>
-            <a:endParaRPr lang="es-ES" b="0" noProof="0" dirty="0"/>
-          </a:p>
-        </p:txBody>
-      </p:sp>
-      <p:sp>
-        <p:nvSpPr>
-          <p:cNvPr id="15" name="Marcador de número de diapositiva 14">
-            <a:extLst>
-              <a:ext uri="{FF2B5EF4-FFF2-40B4-BE49-F238E27FC236}">
-                <a16:creationId xmlns:a16="http://schemas.microsoft.com/office/drawing/2014/main" id="{FAA76842-8429-14CE-379E-5D60AD3FD1B5}"/>
-              </a:ext>
-            </a:extLst>
-          </p:cNvPr>
-          <p:cNvSpPr>
-            <a:spLocks noGrp="1"/>
-          </p:cNvSpPr>
-          <p:nvPr>
-            <p:ph type="sldNum" sz="quarter" idx="27"/>
-          </p:nvPr>
-        </p:nvSpPr>
-        <p:spPr/>
-        <p:txBody>
-          <a:bodyPr/>
-          <a:lstStyle/>
-          <a:p>
-            <a:pPr rtl="0"/>
-            <a:fld id="{294A09A9-5501-47C1-A89A-A340965A2BE2}" type="slidenum">
-              <a:rPr lang="es-ES" noProof="0" smtClean="0"/>
-              <a:pPr rtl="0"/>
-              <a:t>2</a:t>
-            </a:fld>
-            <a:endParaRPr lang="es-ES" noProof="0" dirty="0"/>
-          </a:p>
-        </p:txBody>
-      </p:sp>
+      <p:pic>
+        <p:nvPicPr>
+          <p:cNvPr id="25" name="Imagen 24" descr="Imagen que contiene corbata, foto, hombre, radiografía&#10;&#10;Descripción generada automáticamente">
+            <a:extLst>
+              <a:ext uri="{FF2B5EF4-FFF2-40B4-BE49-F238E27FC236}">
+                <a16:creationId xmlns:a16="http://schemas.microsoft.com/office/drawing/2014/main" id="{02AB6E02-5E86-86B8-8642-6C80B6DB7707}"/>
+              </a:ext>
+            </a:extLst>
+          </p:cNvPr>
+          <p:cNvPicPr>
+            <a:picLocks noChangeAspect="1"/>
+          </p:cNvPicPr>
+          <p:nvPr/>
+        </p:nvPicPr>
+        <p:blipFill>
+          <a:blip r:embed="rId2">
+            <a:extLst>
+              <a:ext uri="{28A0092B-C50C-407E-A947-70E740481C1C}">
+                <a14:useLocalDpi xmlns:a14="http://schemas.microsoft.com/office/drawing/2010/main" val="0"/>
+              </a:ext>
+            </a:extLst>
+          </a:blip>
+          <a:stretch>
+            <a:fillRect/>
+          </a:stretch>
+        </p:blipFill>
+        <p:spPr>
+          <a:xfrm>
+            <a:off x="6341919" y="1919776"/>
+            <a:ext cx="5638800" cy="1857375"/>
+          </a:xfrm>
+          <a:prstGeom prst="roundRect">
+            <a:avLst>
+              <a:gd name="adj" fmla="val 8594"/>
+            </a:avLst>
+          </a:prstGeom>
+          <a:solidFill>
+            <a:srgbClr val="FFFFFF">
+              <a:shade val="85000"/>
+            </a:srgbClr>
+          </a:solidFill>
+          <a:ln>
+            <a:noFill/>
+          </a:ln>
+          <a:effectLst>
+            <a:reflection blurRad="12700" stA="38000" endPos="28000" dist="5000" dir="5400000" sy="-100000" algn="bl" rotWithShape="0"/>
+          </a:effectLst>
+        </p:spPr>
+      </p:pic>
     </p:spTree>
     <p:extLst>
       <p:ext uri="{BB962C8B-B14F-4D97-AF65-F5344CB8AC3E}">
@@ -14325,7 +14432,7 @@
           <p:cNvPr id="2" name="Título 1">
             <a:extLst>
               <a:ext uri="{FF2B5EF4-FFF2-40B4-BE49-F238E27FC236}">
-                <a16:creationId xmlns:a16="http://schemas.microsoft.com/office/drawing/2014/main" id="{75F93EA0-E6C7-F013-C933-5DEF001281AB}"/>
+                <a16:creationId xmlns:a16="http://schemas.microsoft.com/office/drawing/2014/main" id="{7116BFED-B170-2E0C-8CA7-5FAE79D9A5D6}"/>
               </a:ext>
             </a:extLst>
           </p:cNvPr>
@@ -14342,9 +14449,300 @@
           <a:lstStyle/>
           <a:p>
             <a:r>
-              <a:rPr lang="es-MX" dirty="0"/>
-              <a:t>Objetivos</a:t>
+              <a:rPr lang="es-MX" dirty="0" err="1"/>
+              <a:t>Dataset</a:t>
             </a:r>
+            <a:endParaRPr lang="es-MX" dirty="0"/>
+          </a:p>
+        </p:txBody>
+      </p:sp>
+      <p:sp>
+        <p:nvSpPr>
+          <p:cNvPr id="4" name="Marcador de texto 3">
+            <a:extLst>
+              <a:ext uri="{FF2B5EF4-FFF2-40B4-BE49-F238E27FC236}">
+                <a16:creationId xmlns:a16="http://schemas.microsoft.com/office/drawing/2014/main" id="{12D93BE9-473F-2D2F-3CD5-8D76215352F9}"/>
+              </a:ext>
+            </a:extLst>
+          </p:cNvPr>
+          <p:cNvSpPr>
+            <a:spLocks noGrp="1"/>
+          </p:cNvSpPr>
+          <p:nvPr>
+            <p:ph type="body" sz="quarter" idx="14"/>
+          </p:nvPr>
+        </p:nvSpPr>
+        <p:spPr>
+          <a:xfrm>
+            <a:off x="952500" y="2052783"/>
+            <a:ext cx="2133600" cy="453837"/>
+          </a:xfrm>
+        </p:spPr>
+        <p:txBody>
+          <a:bodyPr/>
+          <a:lstStyle/>
+          <a:p>
+            <a:r>
+              <a:rPr lang="es-MX" sz="2400" dirty="0"/>
+              <a:t>¿Qué contiene?</a:t>
+            </a:r>
+          </a:p>
+        </p:txBody>
+      </p:sp>
+      <p:sp>
+        <p:nvSpPr>
+          <p:cNvPr id="17" name="Rectángulo 16">
+            <a:extLst>
+              <a:ext uri="{FF2B5EF4-FFF2-40B4-BE49-F238E27FC236}">
+                <a16:creationId xmlns:a16="http://schemas.microsoft.com/office/drawing/2014/main" id="{337B147C-111E-C479-BDAE-D34AF2EFD41B}"/>
+              </a:ext>
+            </a:extLst>
+          </p:cNvPr>
+          <p:cNvSpPr/>
+          <p:nvPr/>
+        </p:nvSpPr>
+        <p:spPr>
+          <a:xfrm>
+            <a:off x="3607625" y="1764145"/>
+            <a:ext cx="2242458" cy="332366"/>
+          </a:xfrm>
+          <a:prstGeom prst="rect">
+            <a:avLst/>
+          </a:prstGeom>
+          <a:solidFill>
+            <a:srgbClr val="FFFFFF"/>
+          </a:solidFill>
+          <a:ln>
+            <a:noFill/>
+          </a:ln>
+        </p:spPr>
+        <p:style>
+          <a:lnRef idx="2">
+            <a:schemeClr val="accent1">
+              <a:shade val="50000"/>
+            </a:schemeClr>
+          </a:lnRef>
+          <a:fillRef idx="1">
+            <a:schemeClr val="accent1"/>
+          </a:fillRef>
+          <a:effectRef idx="0">
+            <a:schemeClr val="accent1"/>
+          </a:effectRef>
+          <a:fontRef idx="minor">
+            <a:schemeClr val="lt1"/>
+          </a:fontRef>
+        </p:style>
+        <p:txBody>
+          <a:bodyPr rtlCol="0" anchor="ctr"/>
+          <a:lstStyle/>
+          <a:p>
+            <a:pPr algn="ctr"/>
+            <a:endParaRPr lang="es-MX"/>
+          </a:p>
+        </p:txBody>
+      </p:sp>
+      <p:sp>
+        <p:nvSpPr>
+          <p:cNvPr id="18" name="Rectángulo 17">
+            <a:extLst>
+              <a:ext uri="{FF2B5EF4-FFF2-40B4-BE49-F238E27FC236}">
+                <a16:creationId xmlns:a16="http://schemas.microsoft.com/office/drawing/2014/main" id="{95D8BA5A-2AE7-8FEC-8CBB-B98636CBD05E}"/>
+              </a:ext>
+            </a:extLst>
+          </p:cNvPr>
+          <p:cNvSpPr/>
+          <p:nvPr/>
+        </p:nvSpPr>
+        <p:spPr>
+          <a:xfrm>
+            <a:off x="3607625" y="4181057"/>
+            <a:ext cx="2242458" cy="332366"/>
+          </a:xfrm>
+          <a:prstGeom prst="rect">
+            <a:avLst/>
+          </a:prstGeom>
+          <a:solidFill>
+            <a:srgbClr val="FFFFFF"/>
+          </a:solidFill>
+          <a:ln>
+            <a:noFill/>
+          </a:ln>
+        </p:spPr>
+        <p:style>
+          <a:lnRef idx="2">
+            <a:schemeClr val="accent1">
+              <a:shade val="50000"/>
+            </a:schemeClr>
+          </a:lnRef>
+          <a:fillRef idx="1">
+            <a:schemeClr val="accent1"/>
+          </a:fillRef>
+          <a:effectRef idx="0">
+            <a:schemeClr val="accent1"/>
+          </a:effectRef>
+          <a:fontRef idx="minor">
+            <a:schemeClr val="lt1"/>
+          </a:fontRef>
+        </p:style>
+        <p:txBody>
+          <a:bodyPr rtlCol="0" anchor="ctr"/>
+          <a:lstStyle/>
+          <a:p>
+            <a:pPr algn="ctr"/>
+            <a:endParaRPr lang="es-MX"/>
+          </a:p>
+        </p:txBody>
+      </p:sp>
+      <p:sp>
+        <p:nvSpPr>
+          <p:cNvPr id="19" name="Rectángulo 18">
+            <a:extLst>
+              <a:ext uri="{FF2B5EF4-FFF2-40B4-BE49-F238E27FC236}">
+                <a16:creationId xmlns:a16="http://schemas.microsoft.com/office/drawing/2014/main" id="{28F1971C-2183-6076-A1E9-414D9AA7BDEC}"/>
+              </a:ext>
+            </a:extLst>
+          </p:cNvPr>
+          <p:cNvSpPr/>
+          <p:nvPr/>
+        </p:nvSpPr>
+        <p:spPr>
+          <a:xfrm>
+            <a:off x="6341919" y="4177898"/>
+            <a:ext cx="2242458" cy="332366"/>
+          </a:xfrm>
+          <a:prstGeom prst="rect">
+            <a:avLst/>
+          </a:prstGeom>
+          <a:solidFill>
+            <a:srgbClr val="FFFFFF"/>
+          </a:solidFill>
+          <a:ln>
+            <a:noFill/>
+          </a:ln>
+        </p:spPr>
+        <p:style>
+          <a:lnRef idx="2">
+            <a:schemeClr val="accent1">
+              <a:shade val="50000"/>
+            </a:schemeClr>
+          </a:lnRef>
+          <a:fillRef idx="1">
+            <a:schemeClr val="accent1"/>
+          </a:fillRef>
+          <a:effectRef idx="0">
+            <a:schemeClr val="accent1"/>
+          </a:effectRef>
+          <a:fontRef idx="minor">
+            <a:schemeClr val="lt1"/>
+          </a:fontRef>
+        </p:style>
+        <p:txBody>
+          <a:bodyPr rtlCol="0" anchor="ctr"/>
+          <a:lstStyle/>
+          <a:p>
+            <a:pPr algn="ctr"/>
+            <a:endParaRPr lang="es-MX"/>
+          </a:p>
+        </p:txBody>
+      </p:sp>
+      <p:pic>
+        <p:nvPicPr>
+          <p:cNvPr id="22" name="Imagen 21" descr="Imagen que contiene radiografía, persona, hombre, viendo&#10;&#10;Descripción generada automáticamente">
+            <a:extLst>
+              <a:ext uri="{FF2B5EF4-FFF2-40B4-BE49-F238E27FC236}">
+                <a16:creationId xmlns:a16="http://schemas.microsoft.com/office/drawing/2014/main" id="{B905C247-0E00-63F3-1F46-443E28D61627}"/>
+              </a:ext>
+            </a:extLst>
+          </p:cNvPr>
+          <p:cNvPicPr>
+            <a:picLocks noChangeAspect="1"/>
+          </p:cNvPicPr>
+          <p:nvPr/>
+        </p:nvPicPr>
+        <p:blipFill>
+          <a:blip r:embed="rId2">
+            <a:extLst>
+              <a:ext uri="{28A0092B-C50C-407E-A947-70E740481C1C}">
+                <a14:useLocalDpi xmlns:a14="http://schemas.microsoft.com/office/drawing/2010/main" val="0"/>
+              </a:ext>
+            </a:extLst>
+          </a:blip>
+          <a:stretch>
+            <a:fillRect/>
+          </a:stretch>
+        </p:blipFill>
+        <p:spPr>
+          <a:xfrm>
+            <a:off x="9019940" y="3429000"/>
+            <a:ext cx="3086655" cy="2622158"/>
+          </a:xfrm>
+          <a:prstGeom prst="roundRect">
+            <a:avLst>
+              <a:gd name="adj" fmla="val 8594"/>
+            </a:avLst>
+          </a:prstGeom>
+          <a:solidFill>
+            <a:srgbClr val="FFFFFF">
+              <a:shade val="85000"/>
+            </a:srgbClr>
+          </a:solidFill>
+          <a:ln>
+            <a:noFill/>
+          </a:ln>
+          <a:effectLst>
+            <a:reflection blurRad="12700" stA="38000" endPos="28000" dist="5000" dir="5400000" sy="-100000" algn="bl" rotWithShape="0"/>
+          </a:effectLst>
+        </p:spPr>
+      </p:pic>
+      <p:sp>
+        <p:nvSpPr>
+          <p:cNvPr id="12" name="Rectángulo 11">
+            <a:extLst>
+              <a:ext uri="{FF2B5EF4-FFF2-40B4-BE49-F238E27FC236}">
+                <a16:creationId xmlns:a16="http://schemas.microsoft.com/office/drawing/2014/main" id="{20D092BB-0743-FE58-4212-008247388BC3}"/>
+              </a:ext>
+            </a:extLst>
+          </p:cNvPr>
+          <p:cNvSpPr/>
+          <p:nvPr/>
+        </p:nvSpPr>
+        <p:spPr>
+          <a:xfrm>
+            <a:off x="844199" y="4165646"/>
+            <a:ext cx="2242458" cy="332366"/>
+          </a:xfrm>
+          <a:prstGeom prst="rect">
+            <a:avLst/>
+          </a:prstGeom>
+          <a:solidFill>
+            <a:srgbClr val="FFFFFF"/>
+          </a:solidFill>
+          <a:ln>
+            <a:noFill/>
+          </a:ln>
+        </p:spPr>
+        <p:style>
+          <a:lnRef idx="2">
+            <a:schemeClr val="accent1">
+              <a:shade val="50000"/>
+            </a:schemeClr>
+          </a:lnRef>
+          <a:fillRef idx="1">
+            <a:schemeClr val="accent1"/>
+          </a:fillRef>
+          <a:effectRef idx="0">
+            <a:schemeClr val="accent1"/>
+          </a:effectRef>
+          <a:fontRef idx="minor">
+            <a:schemeClr val="lt1"/>
+          </a:fontRef>
+        </p:style>
+        <p:txBody>
+          <a:bodyPr rtlCol="0" anchor="ctr"/>
+          <a:lstStyle/>
+          <a:p>
+            <a:pPr algn="ctr"/>
+            <a:endParaRPr lang="es-MX"/>
           </a:p>
         </p:txBody>
       </p:sp>
@@ -14353,57 +14751,7 @@
           <p:cNvPr id="3" name="Marcador de texto 2">
             <a:extLst>
               <a:ext uri="{FF2B5EF4-FFF2-40B4-BE49-F238E27FC236}">
-                <a16:creationId xmlns:a16="http://schemas.microsoft.com/office/drawing/2014/main" id="{DAB79D5F-DE34-4078-963E-715A8A22EAE3}"/>
-              </a:ext>
-            </a:extLst>
-          </p:cNvPr>
-          <p:cNvSpPr>
-            <a:spLocks noGrp="1"/>
-          </p:cNvSpPr>
-          <p:nvPr>
-            <p:ph type="body" sz="quarter" idx="10"/>
-          </p:nvPr>
-        </p:nvSpPr>
-        <p:spPr/>
-        <p:txBody>
-          <a:bodyPr/>
-          <a:lstStyle/>
-          <a:p>
-            <a:endParaRPr lang="es-MX"/>
-          </a:p>
-        </p:txBody>
-      </p:sp>
-      <p:sp>
-        <p:nvSpPr>
-          <p:cNvPr id="4" name="Marcador de texto 3">
-            <a:extLst>
-              <a:ext uri="{FF2B5EF4-FFF2-40B4-BE49-F238E27FC236}">
-                <a16:creationId xmlns:a16="http://schemas.microsoft.com/office/drawing/2014/main" id="{42770E1C-4592-5F9D-32E3-7AF6F166F129}"/>
-              </a:ext>
-            </a:extLst>
-          </p:cNvPr>
-          <p:cNvSpPr>
-            <a:spLocks noGrp="1"/>
-          </p:cNvSpPr>
-          <p:nvPr>
-            <p:ph type="body" sz="quarter" idx="12"/>
-          </p:nvPr>
-        </p:nvSpPr>
-        <p:spPr/>
-        <p:txBody>
-          <a:bodyPr/>
-          <a:lstStyle/>
-          <a:p>
-            <a:endParaRPr lang="es-MX"/>
-          </a:p>
-        </p:txBody>
-      </p:sp>
-      <p:sp>
-        <p:nvSpPr>
-          <p:cNvPr id="5" name="Marcador de texto 4">
-            <a:extLst>
-              <a:ext uri="{FF2B5EF4-FFF2-40B4-BE49-F238E27FC236}">
-                <a16:creationId xmlns:a16="http://schemas.microsoft.com/office/drawing/2014/main" id="{07D88F0A-B407-8029-9B59-83FCF44B4F2B}"/>
+                <a16:creationId xmlns:a16="http://schemas.microsoft.com/office/drawing/2014/main" id="{848EFA7A-AA56-95A4-CA14-6DD359CE1152}"/>
               </a:ext>
             </a:extLst>
           </p:cNvPr>
@@ -14414,225 +14762,269 @@
             <p:ph type="body" sz="quarter" idx="13"/>
           </p:nvPr>
         </p:nvSpPr>
-        <p:spPr/>
+        <p:spPr>
+          <a:xfrm>
+            <a:off x="740064" y="3069477"/>
+            <a:ext cx="6188952" cy="2084546"/>
+          </a:xfrm>
+        </p:spPr>
         <p:txBody>
           <a:bodyPr/>
           <a:lstStyle/>
           <a:p>
-            <a:endParaRPr lang="es-MX"/>
+            <a:pPr marL="285750" indent="-285750" algn="just">
+              <a:buFontTx/>
+              <a:buChar char="-"/>
+            </a:pPr>
+            <a:r>
+              <a:rPr lang="es-MX" sz="1800" dirty="0"/>
+              <a:t>Se usará una base de que cuenta con 5,840 imágenes de pulmones.</a:t>
+            </a:r>
+          </a:p>
+          <a:p>
+            <a:pPr marL="285750" indent="-285750" algn="just">
+              <a:buFontTx/>
+              <a:buChar char="-"/>
+            </a:pPr>
+            <a:r>
+              <a:rPr lang="es-MX" sz="1800" dirty="0"/>
+              <a:t>Las cuales, se identifican en 2 clases:</a:t>
+            </a:r>
+          </a:p>
+          <a:p>
+            <a:pPr marL="971550" lvl="1" indent="-285750" algn="just">
+              <a:buFontTx/>
+              <a:buChar char="-"/>
+            </a:pPr>
+            <a:r>
+              <a:rPr lang="es-MX" sz="1800" dirty="0"/>
+              <a:t>Normal/No Infectado </a:t>
+            </a:r>
+          </a:p>
+          <a:p>
+            <a:pPr marL="971550" lvl="1" indent="-285750" algn="just">
+              <a:buFontTx/>
+              <a:buChar char="-"/>
+            </a:pPr>
+            <a:r>
+              <a:rPr lang="es-MX" sz="1800" dirty="0"/>
+              <a:t>Neumonía/Infectado (por Bacteria o por Virus).</a:t>
+            </a:r>
+          </a:p>
+          <a:p>
+            <a:pPr algn="just"/>
+            <a:r>
+              <a:rPr lang="es-MX" sz="1600" dirty="0"/>
+              <a:t> - Los datos se pueden obtener en </a:t>
+            </a:r>
+            <a:r>
+              <a:rPr lang="es-MX" sz="1600" dirty="0" err="1"/>
+              <a:t>Kaggle</a:t>
+            </a:r>
+            <a:r>
+              <a:rPr lang="es-MX" sz="1600" dirty="0"/>
+              <a:t>, del usuario '</a:t>
+            </a:r>
+            <a:r>
+              <a:rPr lang="es-MX" sz="1600" dirty="0" err="1"/>
+              <a:t>Alif</a:t>
+            </a:r>
+            <a:r>
+              <a:rPr lang="es-MX" sz="1600" dirty="0"/>
+              <a:t> Rahman’.</a:t>
+            </a:r>
+          </a:p>
+          <a:p>
+            <a:pPr algn="just"/>
+            <a:endParaRPr lang="es-MX" sz="1200" u="sng" dirty="0"/>
+          </a:p>
+        </p:txBody>
+      </p:sp>
+      <p:pic>
+        <p:nvPicPr>
+          <p:cNvPr id="14" name="Imagen 13" descr="Imagen que contiene radiografía, viendo, hombre, vistiendo&#10;&#10;Descripción generada automáticamente">
+            <a:extLst>
+              <a:ext uri="{FF2B5EF4-FFF2-40B4-BE49-F238E27FC236}">
+                <a16:creationId xmlns:a16="http://schemas.microsoft.com/office/drawing/2014/main" id="{94AC94DA-CCC2-2F73-B9CC-AF3561FBD537}"/>
+              </a:ext>
+            </a:extLst>
+          </p:cNvPr>
+          <p:cNvPicPr>
+            <a:picLocks noChangeAspect="1"/>
+          </p:cNvPicPr>
+          <p:nvPr/>
+        </p:nvPicPr>
+        <p:blipFill>
+          <a:blip r:embed="rId3">
+            <a:extLst>
+              <a:ext uri="{28A0092B-C50C-407E-A947-70E740481C1C}">
+                <a14:useLocalDpi xmlns:a14="http://schemas.microsoft.com/office/drawing/2010/main" val="0"/>
+              </a:ext>
+            </a:extLst>
+          </a:blip>
+          <a:stretch>
+            <a:fillRect/>
+          </a:stretch>
+        </p:blipFill>
+        <p:spPr>
+          <a:xfrm>
+            <a:off x="6971510" y="551419"/>
+            <a:ext cx="3086655" cy="2425451"/>
+          </a:xfrm>
+          <a:prstGeom prst="roundRect">
+            <a:avLst>
+              <a:gd name="adj" fmla="val 8594"/>
+            </a:avLst>
+          </a:prstGeom>
+          <a:solidFill>
+            <a:srgbClr val="FFFFFF">
+              <a:shade val="85000"/>
+            </a:srgbClr>
+          </a:solidFill>
+          <a:ln>
+            <a:noFill/>
+          </a:ln>
+          <a:effectLst>
+            <a:reflection blurRad="12700" stA="38000" endPos="28000" dist="5000" dir="5400000" sy="-100000" algn="bl" rotWithShape="0"/>
+          </a:effectLst>
+        </p:spPr>
+      </p:pic>
+      <p:sp>
+        <p:nvSpPr>
+          <p:cNvPr id="23" name="CuadroTexto 22">
+            <a:extLst>
+              <a:ext uri="{FF2B5EF4-FFF2-40B4-BE49-F238E27FC236}">
+                <a16:creationId xmlns:a16="http://schemas.microsoft.com/office/drawing/2014/main" id="{9D75ABB6-2D82-5649-BAE1-4D94B420D2D5}"/>
+              </a:ext>
+            </a:extLst>
+          </p:cNvPr>
+          <p:cNvSpPr txBox="1"/>
+          <p:nvPr/>
+        </p:nvSpPr>
+        <p:spPr>
+          <a:xfrm>
+            <a:off x="83460" y="6364242"/>
+            <a:ext cx="8500917" cy="646331"/>
+          </a:xfrm>
+          <a:prstGeom prst="rect">
+            <a:avLst/>
+          </a:prstGeom>
+          <a:noFill/>
+        </p:spPr>
+        <p:txBody>
+          <a:bodyPr wrap="square">
+            <a:spAutoFit/>
+          </a:bodyPr>
+          <a:lstStyle/>
+          <a:p>
+            <a:r>
+              <a:rPr lang="es-MX" dirty="0">
+                <a:solidFill>
+                  <a:schemeClr val="bg1"/>
+                </a:solidFill>
+                <a:hlinkClick r:id="rId4"/>
+              </a:rPr>
+              <a:t>https://www.kaggle.com/datasets/alifrahman/chestxraydataset?resource=download</a:t>
+            </a:r>
+            <a:endParaRPr lang="es-MX" dirty="0">
+              <a:solidFill>
+                <a:schemeClr val="bg1"/>
+              </a:solidFill>
+            </a:endParaRPr>
+          </a:p>
+          <a:p>
+            <a:endParaRPr lang="es-MX" dirty="0">
+              <a:solidFill>
+                <a:schemeClr val="bg1"/>
+              </a:solidFill>
+            </a:endParaRPr>
           </a:p>
         </p:txBody>
       </p:sp>
       <p:sp>
         <p:nvSpPr>
-          <p:cNvPr id="6" name="Marcador de texto 5">
-            <a:extLst>
-              <a:ext uri="{FF2B5EF4-FFF2-40B4-BE49-F238E27FC236}">
-                <a16:creationId xmlns:a16="http://schemas.microsoft.com/office/drawing/2014/main" id="{05E967B3-0D19-6C86-4EE6-313F42707754}"/>
-              </a:ext>
-            </a:extLst>
-          </p:cNvPr>
-          <p:cNvSpPr>
-            <a:spLocks noGrp="1"/>
-          </p:cNvSpPr>
-          <p:nvPr>
-            <p:ph type="body" sz="quarter" idx="14"/>
-          </p:nvPr>
+          <p:cNvPr id="25" name="CuadroTexto 24">
+            <a:extLst>
+              <a:ext uri="{FF2B5EF4-FFF2-40B4-BE49-F238E27FC236}">
+                <a16:creationId xmlns:a16="http://schemas.microsoft.com/office/drawing/2014/main" id="{6F6D5433-3D69-676A-A050-FFDE8B659B84}"/>
+              </a:ext>
+            </a:extLst>
+          </p:cNvPr>
+          <p:cNvSpPr txBox="1"/>
+          <p:nvPr/>
         </p:nvSpPr>
-        <p:spPr/>
+        <p:spPr>
+          <a:xfrm>
+            <a:off x="9442038" y="6133956"/>
+            <a:ext cx="2242458" cy="369332"/>
+          </a:xfrm>
+          <a:prstGeom prst="rect">
+            <a:avLst/>
+          </a:prstGeom>
+          <a:noFill/>
+        </p:spPr>
         <p:txBody>
-          <a:bodyPr/>
+          <a:bodyPr wrap="square" rtlCol="0">
+            <a:spAutoFit/>
+          </a:bodyPr>
           <a:lstStyle/>
           <a:p>
-            <a:endParaRPr lang="es-MX"/>
+            <a:pPr algn="ctr"/>
+            <a:r>
+              <a:rPr lang="es-MX" u="sng" dirty="0">
+                <a:solidFill>
+                  <a:schemeClr val="bg1"/>
+                </a:solidFill>
+              </a:rPr>
+              <a:t>Con Neumonía</a:t>
+            </a:r>
           </a:p>
         </p:txBody>
       </p:sp>
       <p:sp>
         <p:nvSpPr>
-          <p:cNvPr id="7" name="Marcador de texto 6">
-            <a:extLst>
-              <a:ext uri="{FF2B5EF4-FFF2-40B4-BE49-F238E27FC236}">
-                <a16:creationId xmlns:a16="http://schemas.microsoft.com/office/drawing/2014/main" id="{856934F1-64A3-7605-D024-203DB98B8664}"/>
-              </a:ext>
-            </a:extLst>
-          </p:cNvPr>
-          <p:cNvSpPr>
-            <a:spLocks noGrp="1"/>
-          </p:cNvSpPr>
-          <p:nvPr>
-            <p:ph type="body" sz="quarter" idx="15"/>
-          </p:nvPr>
+          <p:cNvPr id="26" name="CuadroTexto 25">
+            <a:extLst>
+              <a:ext uri="{FF2B5EF4-FFF2-40B4-BE49-F238E27FC236}">
+                <a16:creationId xmlns:a16="http://schemas.microsoft.com/office/drawing/2014/main" id="{2450C6F2-93A9-32F4-9444-1D9BDDE786D9}"/>
+              </a:ext>
+            </a:extLst>
+          </p:cNvPr>
+          <p:cNvSpPr txBox="1"/>
+          <p:nvPr/>
         </p:nvSpPr>
-        <p:spPr/>
+        <p:spPr>
+          <a:xfrm>
+            <a:off x="7393608" y="3029937"/>
+            <a:ext cx="2242458" cy="369332"/>
+          </a:xfrm>
+          <a:prstGeom prst="rect">
+            <a:avLst/>
+          </a:prstGeom>
+          <a:noFill/>
+        </p:spPr>
         <p:txBody>
-          <a:bodyPr/>
+          <a:bodyPr wrap="square" rtlCol="0">
+            <a:spAutoFit/>
+          </a:bodyPr>
           <a:lstStyle/>
           <a:p>
-            <a:endParaRPr lang="es-MX"/>
-          </a:p>
-        </p:txBody>
-      </p:sp>
-      <p:sp>
-        <p:nvSpPr>
-          <p:cNvPr id="8" name="Marcador de texto 7">
-            <a:extLst>
-              <a:ext uri="{FF2B5EF4-FFF2-40B4-BE49-F238E27FC236}">
-                <a16:creationId xmlns:a16="http://schemas.microsoft.com/office/drawing/2014/main" id="{1BC956F4-5FA5-085C-DA9E-29BA9B7700AD}"/>
-              </a:ext>
-            </a:extLst>
-          </p:cNvPr>
-          <p:cNvSpPr>
-            <a:spLocks noGrp="1"/>
-          </p:cNvSpPr>
-          <p:nvPr>
-            <p:ph type="body" sz="quarter" idx="16"/>
-          </p:nvPr>
-        </p:nvSpPr>
-        <p:spPr/>
-        <p:txBody>
-          <a:bodyPr/>
-          <a:lstStyle/>
-          <a:p>
-            <a:endParaRPr lang="es-MX"/>
-          </a:p>
-        </p:txBody>
-      </p:sp>
-      <p:sp>
-        <p:nvSpPr>
-          <p:cNvPr id="9" name="Marcador de texto 8">
-            <a:extLst>
-              <a:ext uri="{FF2B5EF4-FFF2-40B4-BE49-F238E27FC236}">
-                <a16:creationId xmlns:a16="http://schemas.microsoft.com/office/drawing/2014/main" id="{4369DC79-B3F6-1493-397E-DABA5D1A138D}"/>
-              </a:ext>
-            </a:extLst>
-          </p:cNvPr>
-          <p:cNvSpPr>
-            <a:spLocks noGrp="1"/>
-          </p:cNvSpPr>
-          <p:nvPr>
-            <p:ph type="body" sz="quarter" idx="17"/>
-          </p:nvPr>
-        </p:nvSpPr>
-        <p:spPr/>
-        <p:txBody>
-          <a:bodyPr/>
-          <a:lstStyle/>
-          <a:p>
-            <a:endParaRPr lang="es-MX"/>
-          </a:p>
-        </p:txBody>
-      </p:sp>
-      <p:sp>
-        <p:nvSpPr>
-          <p:cNvPr id="10" name="Marcador de texto 9">
-            <a:extLst>
-              <a:ext uri="{FF2B5EF4-FFF2-40B4-BE49-F238E27FC236}">
-                <a16:creationId xmlns:a16="http://schemas.microsoft.com/office/drawing/2014/main" id="{2A2B4709-CCE3-1C63-C3E6-F40AC5364CA7}"/>
-              </a:ext>
-            </a:extLst>
-          </p:cNvPr>
-          <p:cNvSpPr>
-            <a:spLocks noGrp="1"/>
-          </p:cNvSpPr>
-          <p:nvPr>
-            <p:ph type="body" sz="quarter" idx="18"/>
-          </p:nvPr>
-        </p:nvSpPr>
-        <p:spPr/>
-        <p:txBody>
-          <a:bodyPr/>
-          <a:lstStyle/>
-          <a:p>
-            <a:endParaRPr lang="es-MX"/>
-          </a:p>
-        </p:txBody>
-      </p:sp>
-      <p:sp>
-        <p:nvSpPr>
-          <p:cNvPr id="11" name="Marcador de texto 10">
-            <a:extLst>
-              <a:ext uri="{FF2B5EF4-FFF2-40B4-BE49-F238E27FC236}">
-                <a16:creationId xmlns:a16="http://schemas.microsoft.com/office/drawing/2014/main" id="{EB3A72CC-5681-668C-C32B-5AA36BAC42CF}"/>
-              </a:ext>
-            </a:extLst>
-          </p:cNvPr>
-          <p:cNvSpPr>
-            <a:spLocks noGrp="1"/>
-          </p:cNvSpPr>
-          <p:nvPr>
-            <p:ph type="body" sz="quarter" idx="19"/>
-          </p:nvPr>
-        </p:nvSpPr>
-        <p:spPr/>
-        <p:txBody>
-          <a:bodyPr/>
-          <a:lstStyle/>
-          <a:p>
-            <a:endParaRPr lang="es-MX"/>
-          </a:p>
-        </p:txBody>
-      </p:sp>
-      <p:sp>
-        <p:nvSpPr>
-          <p:cNvPr id="12" name="Marcador de texto 11">
-            <a:extLst>
-              <a:ext uri="{FF2B5EF4-FFF2-40B4-BE49-F238E27FC236}">
-                <a16:creationId xmlns:a16="http://schemas.microsoft.com/office/drawing/2014/main" id="{BCEDBABA-DDCE-9379-F99F-D62C1EBE1375}"/>
-              </a:ext>
-            </a:extLst>
-          </p:cNvPr>
-          <p:cNvSpPr>
-            <a:spLocks noGrp="1"/>
-          </p:cNvSpPr>
-          <p:nvPr>
-            <p:ph type="body" sz="quarter" idx="20"/>
-          </p:nvPr>
-        </p:nvSpPr>
-        <p:spPr/>
-        <p:txBody>
-          <a:bodyPr/>
-          <a:lstStyle/>
-          <a:p>
-            <a:endParaRPr lang="es-MX"/>
-          </a:p>
-        </p:txBody>
-      </p:sp>
-      <p:sp>
-        <p:nvSpPr>
-          <p:cNvPr id="15" name="Marcador de número de diapositiva 14">
-            <a:extLst>
-              <a:ext uri="{FF2B5EF4-FFF2-40B4-BE49-F238E27FC236}">
-                <a16:creationId xmlns:a16="http://schemas.microsoft.com/office/drawing/2014/main" id="{A02853E8-3B1A-16F1-6CFB-97BB3D7A77B1}"/>
-              </a:ext>
-            </a:extLst>
-          </p:cNvPr>
-          <p:cNvSpPr>
-            <a:spLocks noGrp="1"/>
-          </p:cNvSpPr>
-          <p:nvPr>
-            <p:ph type="sldNum" sz="quarter" idx="23"/>
-          </p:nvPr>
-        </p:nvSpPr>
-        <p:spPr/>
-        <p:txBody>
-          <a:bodyPr/>
-          <a:lstStyle/>
-          <a:p>
-            <a:pPr rtl="0"/>
-            <a:fld id="{294A09A9-5501-47C1-A89A-A340965A2BE2}" type="slidenum">
-              <a:rPr lang="es-ES" noProof="0" smtClean="0"/>
-              <a:pPr rtl="0"/>
-              <a:t>3</a:t>
-            </a:fld>
-            <a:endParaRPr lang="es-ES" noProof="0" dirty="0"/>
+            <a:pPr algn="ctr"/>
+            <a:r>
+              <a:rPr lang="es-MX" u="sng" dirty="0">
+                <a:solidFill>
+                  <a:schemeClr val="bg1"/>
+                </a:solidFill>
+              </a:rPr>
+              <a:t>Normal</a:t>
+            </a:r>
           </a:p>
         </p:txBody>
       </p:sp>
     </p:spTree>
     <p:extLst>
       <p:ext uri="{BB962C8B-B14F-4D97-AF65-F5344CB8AC3E}">
-        <p14:creationId xmlns:p14="http://schemas.microsoft.com/office/powerpoint/2010/main" val="3937393810"/>
+        <p14:creationId xmlns:p14="http://schemas.microsoft.com/office/powerpoint/2010/main" val="309796570"/>
       </p:ext>
     </p:extLst>
   </p:cSld>
@@ -14661,10 +15053,10 @@
       </p:grpSpPr>
       <p:sp>
         <p:nvSpPr>
-          <p:cNvPr id="2" name="Título 1">
-            <a:extLst>
-              <a:ext uri="{FF2B5EF4-FFF2-40B4-BE49-F238E27FC236}">
-                <a16:creationId xmlns:a16="http://schemas.microsoft.com/office/drawing/2014/main" id="{3A5761AF-A0C6-6568-A4E8-32AAE1A24A19}"/>
+          <p:cNvPr id="3" name="Título 2">
+            <a:extLst>
+              <a:ext uri="{FF2B5EF4-FFF2-40B4-BE49-F238E27FC236}">
+                <a16:creationId xmlns:a16="http://schemas.microsoft.com/office/drawing/2014/main" id="{C5B4355C-E5C7-FD65-9DF7-E9679CE34D53}"/>
               </a:ext>
             </a:extLst>
           </p:cNvPr>
@@ -14682,1712 +15074,154 @@
           <a:p>
             <a:r>
               <a:rPr lang="es-MX" dirty="0"/>
-              <a:t>Proceso</a:t>
+              <a:t>EDA</a:t>
             </a:r>
           </a:p>
         </p:txBody>
       </p:sp>
-      <p:sp>
-        <p:nvSpPr>
-          <p:cNvPr id="3" name="Marcador de texto 2">
-            <a:extLst>
-              <a:ext uri="{FF2B5EF4-FFF2-40B4-BE49-F238E27FC236}">
-                <a16:creationId xmlns:a16="http://schemas.microsoft.com/office/drawing/2014/main" id="{0CDAFE4C-C0D8-5E18-2CF2-ADBC3D3DB862}"/>
-              </a:ext>
-            </a:extLst>
-          </p:cNvPr>
-          <p:cNvSpPr>
-            <a:spLocks noGrp="1"/>
-          </p:cNvSpPr>
-          <p:nvPr>
-            <p:ph type="body" sz="quarter" idx="13"/>
-          </p:nvPr>
-        </p:nvSpPr>
+      <p:pic>
+        <p:nvPicPr>
+          <p:cNvPr id="19" name="Imagen 18">
+            <a:extLst>
+              <a:ext uri="{FF2B5EF4-FFF2-40B4-BE49-F238E27FC236}">
+                <a16:creationId xmlns:a16="http://schemas.microsoft.com/office/drawing/2014/main" id="{0D032CF4-51EB-E22B-8EB3-54829E5D50FF}"/>
+              </a:ext>
+            </a:extLst>
+          </p:cNvPr>
+          <p:cNvPicPr>
+            <a:picLocks noChangeAspect="1"/>
+          </p:cNvPicPr>
+          <p:nvPr/>
+        </p:nvPicPr>
+        <p:blipFill>
+          <a:blip r:embed="rId2"/>
+          <a:stretch>
+            <a:fillRect/>
+          </a:stretch>
+        </p:blipFill>
         <p:spPr>
           <a:xfrm>
-            <a:off x="952500" y="2728628"/>
-            <a:ext cx="2133600" cy="962585"/>
-          </a:xfrm>
-        </p:spPr>
-        <p:txBody>
-          <a:bodyPr/>
-          <a:lstStyle/>
-          <a:p>
-            <a:r>
-              <a:rPr lang="es-MX" dirty="0" err="1"/>
-              <a:t>jas</a:t>
-            </a:r>
-            <a:endParaRPr lang="es-MX" dirty="0"/>
-          </a:p>
-        </p:txBody>
-      </p:sp>
-      <p:sp>
-        <p:nvSpPr>
-          <p:cNvPr id="4" name="Marcador de texto 3">
-            <a:extLst>
-              <a:ext uri="{FF2B5EF4-FFF2-40B4-BE49-F238E27FC236}">
-                <a16:creationId xmlns:a16="http://schemas.microsoft.com/office/drawing/2014/main" id="{E0CB1BC8-BA06-9942-417C-06EA5BDA11CF}"/>
-              </a:ext>
-            </a:extLst>
-          </p:cNvPr>
-          <p:cNvSpPr>
-            <a:spLocks noGrp="1"/>
-          </p:cNvSpPr>
-          <p:nvPr>
-            <p:ph type="body" sz="quarter" idx="14"/>
-          </p:nvPr>
-        </p:nvSpPr>
-        <p:spPr>
-          <a:xfrm>
-            <a:off x="952500" y="2133600"/>
-            <a:ext cx="2133600" cy="369332"/>
-          </a:xfrm>
-        </p:spPr>
-        <p:txBody>
-          <a:bodyPr/>
-          <a:lstStyle/>
-          <a:p>
-            <a:r>
-              <a:rPr lang="es-MX" dirty="0"/>
-              <a:t>Exploración de los Datos</a:t>
-            </a:r>
-          </a:p>
-        </p:txBody>
-      </p:sp>
-      <p:sp>
-        <p:nvSpPr>
-          <p:cNvPr id="15" name="Marcador de número de diapositiva 14">
-            <a:extLst>
-              <a:ext uri="{FF2B5EF4-FFF2-40B4-BE49-F238E27FC236}">
-                <a16:creationId xmlns:a16="http://schemas.microsoft.com/office/drawing/2014/main" id="{9FB48757-1BBF-E563-A87D-235BF95F10C4}"/>
-              </a:ext>
-            </a:extLst>
-          </p:cNvPr>
-          <p:cNvSpPr>
-            <a:spLocks noGrp="1"/>
-          </p:cNvSpPr>
-          <p:nvPr>
-            <p:ph type="sldNum" sz="quarter" idx="27"/>
-          </p:nvPr>
-        </p:nvSpPr>
-        <p:spPr/>
-        <p:txBody>
-          <a:bodyPr/>
-          <a:lstStyle/>
-          <a:p>
-            <a:pPr rtl="0"/>
-            <a:fld id="{294A09A9-5501-47C1-A89A-A340965A2BE2}" type="slidenum">
-              <a:rPr lang="es-ES" noProof="0" smtClean="0"/>
-              <a:pPr rtl="0"/>
-              <a:t>4</a:t>
-            </a:fld>
-            <a:endParaRPr lang="es-ES" noProof="0" dirty="0"/>
-          </a:p>
-        </p:txBody>
-      </p:sp>
-      <p:sp>
-        <p:nvSpPr>
-          <p:cNvPr id="18" name="Marcador de texto 2">
-            <a:extLst>
-              <a:ext uri="{FF2B5EF4-FFF2-40B4-BE49-F238E27FC236}">
-                <a16:creationId xmlns:a16="http://schemas.microsoft.com/office/drawing/2014/main" id="{2B4D67BC-50AF-1AE3-6608-ADD8AF75E2B8}"/>
-              </a:ext>
-            </a:extLst>
-          </p:cNvPr>
-          <p:cNvSpPr txBox="1">
-            <a:spLocks/>
-          </p:cNvSpPr>
-          <p:nvPr/>
-        </p:nvSpPr>
-        <p:spPr>
-          <a:xfrm>
-            <a:off x="3663042" y="2650836"/>
-            <a:ext cx="2133600" cy="1040378"/>
+            <a:off x="677693" y="2818136"/>
+            <a:ext cx="3324689" cy="828791"/>
           </a:xfrm>
           <a:prstGeom prst="rect">
             <a:avLst/>
           </a:prstGeom>
         </p:spPr>
-        <p:txBody>
-          <a:bodyPr vert="horz" lIns="0" tIns="0" rIns="0" bIns="0" rtlCol="0">
-            <a:noAutofit/>
-          </a:bodyPr>
-          <a:lstStyle>
-            <a:lvl1pPr marL="0" indent="0" algn="l" defTabSz="914400" rtl="0" eaLnBrk="1" latinLnBrk="0" hangingPunct="1">
-              <a:lnSpc>
-                <a:spcPct val="100000"/>
-              </a:lnSpc>
-              <a:spcBef>
-                <a:spcPts val="1000"/>
-              </a:spcBef>
-              <a:buFont typeface="Arial" panose="020B0604020202020204" pitchFamily="34" charset="0"/>
-              <a:buNone/>
-              <a:defRPr sz="1400" b="0" i="0" kern="1200">
-                <a:solidFill>
-                  <a:schemeClr val="bg1"/>
-                </a:solidFill>
-                <a:latin typeface="+mn-lt"/>
-                <a:ea typeface="+mn-ea"/>
-                <a:cs typeface="+mn-cs"/>
-              </a:defRPr>
-            </a:lvl1pPr>
-            <a:lvl2pPr marL="685800" indent="-228600" algn="l" defTabSz="914400" rtl="0" eaLnBrk="1" latinLnBrk="0" hangingPunct="1">
-              <a:lnSpc>
-                <a:spcPct val="90000"/>
-              </a:lnSpc>
-              <a:spcBef>
-                <a:spcPts val="500"/>
-              </a:spcBef>
-              <a:buFont typeface="Arial" panose="020B0604020202020204" pitchFamily="34" charset="0"/>
-              <a:buChar char="•"/>
-              <a:defRPr sz="4000" b="0" i="0" kern="1200">
-                <a:solidFill>
-                  <a:schemeClr val="bg1"/>
-                </a:solidFill>
-                <a:latin typeface="+mn-lt"/>
-                <a:ea typeface="+mn-ea"/>
-                <a:cs typeface="+mn-cs"/>
-              </a:defRPr>
-            </a:lvl2pPr>
-            <a:lvl3pPr marL="1143000" indent="-228600" algn="l" defTabSz="914400" rtl="0" eaLnBrk="1" latinLnBrk="0" hangingPunct="1">
-              <a:lnSpc>
-                <a:spcPct val="90000"/>
-              </a:lnSpc>
-              <a:spcBef>
-                <a:spcPts val="500"/>
-              </a:spcBef>
-              <a:buFont typeface="Arial" panose="020B0604020202020204" pitchFamily="34" charset="0"/>
-              <a:buChar char="•"/>
-              <a:defRPr sz="4000" b="0" i="0" kern="1200">
-                <a:solidFill>
-                  <a:schemeClr val="bg1"/>
-                </a:solidFill>
-                <a:latin typeface="+mn-lt"/>
-                <a:ea typeface="+mn-ea"/>
-                <a:cs typeface="+mn-cs"/>
-              </a:defRPr>
-            </a:lvl3pPr>
-            <a:lvl4pPr marL="1600200" indent="-228600" algn="l" defTabSz="914400" rtl="0" eaLnBrk="1" latinLnBrk="0" hangingPunct="1">
-              <a:lnSpc>
-                <a:spcPct val="90000"/>
-              </a:lnSpc>
-              <a:spcBef>
-                <a:spcPts val="500"/>
-              </a:spcBef>
-              <a:buFont typeface="Arial" panose="020B0604020202020204" pitchFamily="34" charset="0"/>
-              <a:buChar char="•"/>
-              <a:defRPr sz="4000" b="0" i="0" kern="1200">
-                <a:solidFill>
-                  <a:schemeClr val="bg1"/>
-                </a:solidFill>
-                <a:latin typeface="+mn-lt"/>
-                <a:ea typeface="+mn-ea"/>
-                <a:cs typeface="+mn-cs"/>
-              </a:defRPr>
-            </a:lvl4pPr>
-            <a:lvl5pPr marL="2057400" indent="-228600" algn="l" defTabSz="914400" rtl="0" eaLnBrk="1" latinLnBrk="0" hangingPunct="1">
-              <a:lnSpc>
-                <a:spcPct val="90000"/>
-              </a:lnSpc>
-              <a:spcBef>
-                <a:spcPts val="500"/>
-              </a:spcBef>
-              <a:buFont typeface="Arial" panose="020B0604020202020204" pitchFamily="34" charset="0"/>
-              <a:buChar char="•"/>
-              <a:defRPr sz="4000" b="0" i="0" kern="1200">
-                <a:solidFill>
-                  <a:schemeClr val="bg1"/>
-                </a:solidFill>
-                <a:latin typeface="+mn-lt"/>
-                <a:ea typeface="+mn-ea"/>
-                <a:cs typeface="+mn-cs"/>
-              </a:defRPr>
-            </a:lvl5pPr>
-            <a:lvl6pPr marL="2514600" indent="-228600" algn="l" defTabSz="914400" rtl="0" eaLnBrk="1" latinLnBrk="0" hangingPunct="1">
-              <a:lnSpc>
-                <a:spcPct val="90000"/>
-              </a:lnSpc>
-              <a:spcBef>
-                <a:spcPts val="500"/>
-              </a:spcBef>
-              <a:buFont typeface="Arial" panose="020B0604020202020204" pitchFamily="34" charset="0"/>
-              <a:buChar char="•"/>
-              <a:defRPr sz="1800" kern="1200">
-                <a:solidFill>
-                  <a:schemeClr val="tx1"/>
-                </a:solidFill>
-                <a:latin typeface="+mn-lt"/>
-                <a:ea typeface="+mn-ea"/>
-                <a:cs typeface="+mn-cs"/>
-              </a:defRPr>
-            </a:lvl6pPr>
-            <a:lvl7pPr marL="2971800" indent="-228600" algn="l" defTabSz="914400" rtl="0" eaLnBrk="1" latinLnBrk="0" hangingPunct="1">
-              <a:lnSpc>
-                <a:spcPct val="90000"/>
-              </a:lnSpc>
-              <a:spcBef>
-                <a:spcPts val="500"/>
-              </a:spcBef>
-              <a:buFont typeface="Arial" panose="020B0604020202020204" pitchFamily="34" charset="0"/>
-              <a:buChar char="•"/>
-              <a:defRPr sz="1800" kern="1200">
-                <a:solidFill>
-                  <a:schemeClr val="tx1"/>
-                </a:solidFill>
-                <a:latin typeface="+mn-lt"/>
-                <a:ea typeface="+mn-ea"/>
-                <a:cs typeface="+mn-cs"/>
-              </a:defRPr>
-            </a:lvl7pPr>
-            <a:lvl8pPr marL="3429000" indent="-228600" algn="l" defTabSz="914400" rtl="0" eaLnBrk="1" latinLnBrk="0" hangingPunct="1">
-              <a:lnSpc>
-                <a:spcPct val="90000"/>
-              </a:lnSpc>
-              <a:spcBef>
-                <a:spcPts val="500"/>
-              </a:spcBef>
-              <a:buFont typeface="Arial" panose="020B0604020202020204" pitchFamily="34" charset="0"/>
-              <a:buChar char="•"/>
-              <a:defRPr sz="1800" kern="1200">
-                <a:solidFill>
-                  <a:schemeClr val="tx1"/>
-                </a:solidFill>
-                <a:latin typeface="+mn-lt"/>
-                <a:ea typeface="+mn-ea"/>
-                <a:cs typeface="+mn-cs"/>
-              </a:defRPr>
-            </a:lvl8pPr>
-            <a:lvl9pPr marL="3886200" indent="-228600" algn="l" defTabSz="914400" rtl="0" eaLnBrk="1" latinLnBrk="0" hangingPunct="1">
-              <a:lnSpc>
-                <a:spcPct val="90000"/>
-              </a:lnSpc>
-              <a:spcBef>
-                <a:spcPts val="500"/>
-              </a:spcBef>
-              <a:buFont typeface="Arial" panose="020B0604020202020204" pitchFamily="34" charset="0"/>
-              <a:buChar char="•"/>
-              <a:defRPr sz="1800" kern="1200">
-                <a:solidFill>
-                  <a:schemeClr val="tx1"/>
-                </a:solidFill>
-                <a:latin typeface="+mn-lt"/>
-                <a:ea typeface="+mn-ea"/>
-                <a:cs typeface="+mn-cs"/>
-              </a:defRPr>
-            </a:lvl9pPr>
-          </a:lstStyle>
-          <a:p>
-            <a:r>
-              <a:rPr lang="es-MX"/>
-              <a:t>jas</a:t>
-            </a:r>
-            <a:endParaRPr lang="es-MX" dirty="0"/>
-          </a:p>
-        </p:txBody>
-      </p:sp>
+      </p:pic>
       <p:sp>
         <p:nvSpPr>
-          <p:cNvPr id="19" name="Marcador de texto 3">
-            <a:extLst>
-              <a:ext uri="{FF2B5EF4-FFF2-40B4-BE49-F238E27FC236}">
-                <a16:creationId xmlns:a16="http://schemas.microsoft.com/office/drawing/2014/main" id="{7F8A1D74-F1E1-2156-83A5-8FDAB2086CB4}"/>
-              </a:ext>
-            </a:extLst>
-          </p:cNvPr>
-          <p:cNvSpPr txBox="1">
-            <a:spLocks/>
-          </p:cNvSpPr>
+          <p:cNvPr id="20" name="Rectángulo 19">
+            <a:extLst>
+              <a:ext uri="{FF2B5EF4-FFF2-40B4-BE49-F238E27FC236}">
+                <a16:creationId xmlns:a16="http://schemas.microsoft.com/office/drawing/2014/main" id="{70BEED1E-500C-60E1-46BD-DB8F67F4DB5B}"/>
+              </a:ext>
+            </a:extLst>
+          </p:cNvPr>
+          <p:cNvSpPr/>
           <p:nvPr/>
         </p:nvSpPr>
         <p:spPr>
           <a:xfrm>
-            <a:off x="3663042" y="2133600"/>
-            <a:ext cx="2133600" cy="369332"/>
+            <a:off x="964022" y="1600763"/>
+            <a:ext cx="2133600" cy="110836"/>
+          </a:xfrm>
+          <a:prstGeom prst="rect">
+            <a:avLst/>
+          </a:prstGeom>
+          <a:solidFill>
+            <a:srgbClr val="7CA655"/>
+          </a:solidFill>
+        </p:spPr>
+        <p:style>
+          <a:lnRef idx="2">
+            <a:schemeClr val="accent1">
+              <a:shade val="50000"/>
+            </a:schemeClr>
+          </a:lnRef>
+          <a:fillRef idx="1">
+            <a:schemeClr val="accent1"/>
+          </a:fillRef>
+          <a:effectRef idx="0">
+            <a:schemeClr val="accent1"/>
+          </a:effectRef>
+          <a:fontRef idx="minor">
+            <a:schemeClr val="lt1"/>
+          </a:fontRef>
+        </p:style>
+        <p:txBody>
+          <a:bodyPr rtlCol="0" anchor="ctr"/>
+          <a:lstStyle/>
+          <a:p>
+            <a:pPr algn="ctr"/>
+            <a:endParaRPr lang="es-MX"/>
+          </a:p>
+        </p:txBody>
+      </p:sp>
+      <p:pic>
+        <p:nvPicPr>
+          <p:cNvPr id="24" name="Imagen 23">
+            <a:extLst>
+              <a:ext uri="{FF2B5EF4-FFF2-40B4-BE49-F238E27FC236}">
+                <a16:creationId xmlns:a16="http://schemas.microsoft.com/office/drawing/2014/main" id="{5CE10E31-F074-C94A-7F4D-7B72E64DF1F3}"/>
+              </a:ext>
+            </a:extLst>
+          </p:cNvPr>
+          <p:cNvPicPr>
+            <a:picLocks noChangeAspect="1"/>
+          </p:cNvPicPr>
+          <p:nvPr/>
+        </p:nvPicPr>
+        <p:blipFill>
+          <a:blip r:embed="rId3"/>
+          <a:stretch>
+            <a:fillRect/>
+          </a:stretch>
+        </p:blipFill>
+        <p:spPr>
+          <a:xfrm>
+            <a:off x="4605606" y="1357226"/>
+            <a:ext cx="7168026" cy="4972338"/>
           </a:xfrm>
           <a:prstGeom prst="rect">
             <a:avLst/>
           </a:prstGeom>
         </p:spPr>
-        <p:txBody>
-          <a:bodyPr vert="horz" lIns="0" tIns="0" rIns="0" bIns="0" rtlCol="0">
-            <a:noAutofit/>
-          </a:bodyPr>
-          <a:lstStyle>
-            <a:lvl1pPr marL="0" indent="0" algn="l" defTabSz="914400" rtl="0" eaLnBrk="1" latinLnBrk="0" hangingPunct="1">
-              <a:lnSpc>
-                <a:spcPct val="100000"/>
-              </a:lnSpc>
-              <a:spcBef>
-                <a:spcPts val="400"/>
-              </a:spcBef>
-              <a:buFont typeface="Arial" panose="020B0604020202020204" pitchFamily="34" charset="0"/>
-              <a:buNone/>
-              <a:defRPr sz="1800" b="0" i="0" kern="1200">
-                <a:solidFill>
-                  <a:schemeClr val="tx2"/>
-                </a:solidFill>
-                <a:latin typeface="+mj-lt"/>
-                <a:ea typeface="+mn-ea"/>
-                <a:cs typeface="+mn-cs"/>
-              </a:defRPr>
-            </a:lvl1pPr>
-            <a:lvl2pPr marL="685800" indent="-228600" algn="l" defTabSz="914400" rtl="0" eaLnBrk="1" latinLnBrk="0" hangingPunct="1">
-              <a:lnSpc>
-                <a:spcPct val="90000"/>
-              </a:lnSpc>
-              <a:spcBef>
-                <a:spcPts val="500"/>
-              </a:spcBef>
-              <a:buFont typeface="Arial" panose="020B0604020202020204" pitchFamily="34" charset="0"/>
-              <a:buChar char="•"/>
-              <a:defRPr sz="4000" b="0" i="0" kern="1200">
-                <a:solidFill>
-                  <a:schemeClr val="bg1"/>
-                </a:solidFill>
-                <a:latin typeface="+mn-lt"/>
-                <a:ea typeface="+mn-ea"/>
-                <a:cs typeface="+mn-cs"/>
-              </a:defRPr>
-            </a:lvl2pPr>
-            <a:lvl3pPr marL="1143000" indent="-228600" algn="l" defTabSz="914400" rtl="0" eaLnBrk="1" latinLnBrk="0" hangingPunct="1">
-              <a:lnSpc>
-                <a:spcPct val="90000"/>
-              </a:lnSpc>
-              <a:spcBef>
-                <a:spcPts val="500"/>
-              </a:spcBef>
-              <a:buFont typeface="Arial" panose="020B0604020202020204" pitchFamily="34" charset="0"/>
-              <a:buChar char="•"/>
-              <a:defRPr sz="4000" b="0" i="0" kern="1200">
-                <a:solidFill>
-                  <a:schemeClr val="bg1"/>
-                </a:solidFill>
-                <a:latin typeface="+mn-lt"/>
-                <a:ea typeface="+mn-ea"/>
-                <a:cs typeface="+mn-cs"/>
-              </a:defRPr>
-            </a:lvl3pPr>
-            <a:lvl4pPr marL="1600200" indent="-228600" algn="l" defTabSz="914400" rtl="0" eaLnBrk="1" latinLnBrk="0" hangingPunct="1">
-              <a:lnSpc>
-                <a:spcPct val="90000"/>
-              </a:lnSpc>
-              <a:spcBef>
-                <a:spcPts val="500"/>
-              </a:spcBef>
-              <a:buFont typeface="Arial" panose="020B0604020202020204" pitchFamily="34" charset="0"/>
-              <a:buChar char="•"/>
-              <a:defRPr sz="4000" b="0" i="0" kern="1200">
-                <a:solidFill>
-                  <a:schemeClr val="bg1"/>
-                </a:solidFill>
-                <a:latin typeface="+mn-lt"/>
-                <a:ea typeface="+mn-ea"/>
-                <a:cs typeface="+mn-cs"/>
-              </a:defRPr>
-            </a:lvl4pPr>
-            <a:lvl5pPr marL="2057400" indent="-228600" algn="l" defTabSz="914400" rtl="0" eaLnBrk="1" latinLnBrk="0" hangingPunct="1">
-              <a:lnSpc>
-                <a:spcPct val="90000"/>
-              </a:lnSpc>
-              <a:spcBef>
-                <a:spcPts val="500"/>
-              </a:spcBef>
-              <a:buFont typeface="Arial" panose="020B0604020202020204" pitchFamily="34" charset="0"/>
-              <a:buChar char="•"/>
-              <a:defRPr sz="4000" b="0" i="0" kern="1200">
-                <a:solidFill>
-                  <a:schemeClr val="bg1"/>
-                </a:solidFill>
-                <a:latin typeface="+mn-lt"/>
-                <a:ea typeface="+mn-ea"/>
-                <a:cs typeface="+mn-cs"/>
-              </a:defRPr>
-            </a:lvl5pPr>
-            <a:lvl6pPr marL="2514600" indent="-228600" algn="l" defTabSz="914400" rtl="0" eaLnBrk="1" latinLnBrk="0" hangingPunct="1">
-              <a:lnSpc>
-                <a:spcPct val="90000"/>
-              </a:lnSpc>
-              <a:spcBef>
-                <a:spcPts val="500"/>
-              </a:spcBef>
-              <a:buFont typeface="Arial" panose="020B0604020202020204" pitchFamily="34" charset="0"/>
-              <a:buChar char="•"/>
-              <a:defRPr sz="1800" kern="1200">
-                <a:solidFill>
-                  <a:schemeClr val="tx1"/>
-                </a:solidFill>
-                <a:latin typeface="+mn-lt"/>
-                <a:ea typeface="+mn-ea"/>
-                <a:cs typeface="+mn-cs"/>
-              </a:defRPr>
-            </a:lvl6pPr>
-            <a:lvl7pPr marL="2971800" indent="-228600" algn="l" defTabSz="914400" rtl="0" eaLnBrk="1" latinLnBrk="0" hangingPunct="1">
-              <a:lnSpc>
-                <a:spcPct val="90000"/>
-              </a:lnSpc>
-              <a:spcBef>
-                <a:spcPts val="500"/>
-              </a:spcBef>
-              <a:buFont typeface="Arial" panose="020B0604020202020204" pitchFamily="34" charset="0"/>
-              <a:buChar char="•"/>
-              <a:defRPr sz="1800" kern="1200">
-                <a:solidFill>
-                  <a:schemeClr val="tx1"/>
-                </a:solidFill>
-                <a:latin typeface="+mn-lt"/>
-                <a:ea typeface="+mn-ea"/>
-                <a:cs typeface="+mn-cs"/>
-              </a:defRPr>
-            </a:lvl7pPr>
-            <a:lvl8pPr marL="3429000" indent="-228600" algn="l" defTabSz="914400" rtl="0" eaLnBrk="1" latinLnBrk="0" hangingPunct="1">
-              <a:lnSpc>
-                <a:spcPct val="90000"/>
-              </a:lnSpc>
-              <a:spcBef>
-                <a:spcPts val="500"/>
-              </a:spcBef>
-              <a:buFont typeface="Arial" panose="020B0604020202020204" pitchFamily="34" charset="0"/>
-              <a:buChar char="•"/>
-              <a:defRPr sz="1800" kern="1200">
-                <a:solidFill>
-                  <a:schemeClr val="tx1"/>
-                </a:solidFill>
-                <a:latin typeface="+mn-lt"/>
-                <a:ea typeface="+mn-ea"/>
-                <a:cs typeface="+mn-cs"/>
-              </a:defRPr>
-            </a:lvl8pPr>
-            <a:lvl9pPr marL="3886200" indent="-228600" algn="l" defTabSz="914400" rtl="0" eaLnBrk="1" latinLnBrk="0" hangingPunct="1">
-              <a:lnSpc>
-                <a:spcPct val="90000"/>
-              </a:lnSpc>
-              <a:spcBef>
-                <a:spcPts val="500"/>
-              </a:spcBef>
-              <a:buFont typeface="Arial" panose="020B0604020202020204" pitchFamily="34" charset="0"/>
-              <a:buChar char="•"/>
-              <a:defRPr sz="1800" kern="1200">
-                <a:solidFill>
-                  <a:schemeClr val="tx1"/>
-                </a:solidFill>
-                <a:latin typeface="+mn-lt"/>
-                <a:ea typeface="+mn-ea"/>
-                <a:cs typeface="+mn-cs"/>
-              </a:defRPr>
-            </a:lvl9pPr>
-          </a:lstStyle>
-          <a:p>
-            <a:r>
-              <a:rPr lang="es-MX" dirty="0"/>
-              <a:t>h</a:t>
-            </a:r>
-          </a:p>
-        </p:txBody>
-      </p:sp>
-      <p:sp>
-        <p:nvSpPr>
-          <p:cNvPr id="20" name="Marcador de texto 2">
-            <a:extLst>
-              <a:ext uri="{FF2B5EF4-FFF2-40B4-BE49-F238E27FC236}">
-                <a16:creationId xmlns:a16="http://schemas.microsoft.com/office/drawing/2014/main" id="{30A8B17B-E3D1-5AD3-9B1E-ED41DBC24B3E}"/>
-              </a:ext>
-            </a:extLst>
-          </p:cNvPr>
-          <p:cNvSpPr txBox="1">
-            <a:spLocks/>
-          </p:cNvSpPr>
+      </p:pic>
+      <p:pic>
+        <p:nvPicPr>
+          <p:cNvPr id="26" name="Imagen 25">
+            <a:extLst>
+              <a:ext uri="{FF2B5EF4-FFF2-40B4-BE49-F238E27FC236}">
+                <a16:creationId xmlns:a16="http://schemas.microsoft.com/office/drawing/2014/main" id="{054C0362-8830-FB3D-1FD0-89F2B08DCF3B}"/>
+              </a:ext>
+            </a:extLst>
+          </p:cNvPr>
+          <p:cNvPicPr>
+            <a:picLocks noChangeAspect="1"/>
+          </p:cNvPicPr>
           <p:nvPr/>
-        </p:nvSpPr>
+        </p:nvPicPr>
+        <p:blipFill>
+          <a:blip r:embed="rId4"/>
+          <a:stretch>
+            <a:fillRect/>
+          </a:stretch>
+        </p:blipFill>
         <p:spPr>
           <a:xfrm>
-            <a:off x="952500" y="5066145"/>
-            <a:ext cx="2133600" cy="1040378"/>
+            <a:off x="677693" y="3843395"/>
+            <a:ext cx="3324689" cy="874164"/>
           </a:xfrm>
           <a:prstGeom prst="rect">
             <a:avLst/>
           </a:prstGeom>
         </p:spPr>
-        <p:txBody>
-          <a:bodyPr vert="horz" lIns="0" tIns="0" rIns="0" bIns="0" rtlCol="0">
-            <a:noAutofit/>
-          </a:bodyPr>
-          <a:lstStyle>
-            <a:lvl1pPr marL="0" indent="0" algn="l" defTabSz="914400" rtl="0" eaLnBrk="1" latinLnBrk="0" hangingPunct="1">
-              <a:lnSpc>
-                <a:spcPct val="100000"/>
-              </a:lnSpc>
-              <a:spcBef>
-                <a:spcPts val="1000"/>
-              </a:spcBef>
-              <a:buFont typeface="Arial" panose="020B0604020202020204" pitchFamily="34" charset="0"/>
-              <a:buNone/>
-              <a:defRPr sz="1400" b="0" i="0" kern="1200">
-                <a:solidFill>
-                  <a:schemeClr val="bg1"/>
-                </a:solidFill>
-                <a:latin typeface="+mn-lt"/>
-                <a:ea typeface="+mn-ea"/>
-                <a:cs typeface="+mn-cs"/>
-              </a:defRPr>
-            </a:lvl1pPr>
-            <a:lvl2pPr marL="685800" indent="-228600" algn="l" defTabSz="914400" rtl="0" eaLnBrk="1" latinLnBrk="0" hangingPunct="1">
-              <a:lnSpc>
-                <a:spcPct val="90000"/>
-              </a:lnSpc>
-              <a:spcBef>
-                <a:spcPts val="500"/>
-              </a:spcBef>
-              <a:buFont typeface="Arial" panose="020B0604020202020204" pitchFamily="34" charset="0"/>
-              <a:buChar char="•"/>
-              <a:defRPr sz="4000" b="0" i="0" kern="1200">
-                <a:solidFill>
-                  <a:schemeClr val="bg1"/>
-                </a:solidFill>
-                <a:latin typeface="+mn-lt"/>
-                <a:ea typeface="+mn-ea"/>
-                <a:cs typeface="+mn-cs"/>
-              </a:defRPr>
-            </a:lvl2pPr>
-            <a:lvl3pPr marL="1143000" indent="-228600" algn="l" defTabSz="914400" rtl="0" eaLnBrk="1" latinLnBrk="0" hangingPunct="1">
-              <a:lnSpc>
-                <a:spcPct val="90000"/>
-              </a:lnSpc>
-              <a:spcBef>
-                <a:spcPts val="500"/>
-              </a:spcBef>
-              <a:buFont typeface="Arial" panose="020B0604020202020204" pitchFamily="34" charset="0"/>
-              <a:buChar char="•"/>
-              <a:defRPr sz="4000" b="0" i="0" kern="1200">
-                <a:solidFill>
-                  <a:schemeClr val="bg1"/>
-                </a:solidFill>
-                <a:latin typeface="+mn-lt"/>
-                <a:ea typeface="+mn-ea"/>
-                <a:cs typeface="+mn-cs"/>
-              </a:defRPr>
-            </a:lvl3pPr>
-            <a:lvl4pPr marL="1600200" indent="-228600" algn="l" defTabSz="914400" rtl="0" eaLnBrk="1" latinLnBrk="0" hangingPunct="1">
-              <a:lnSpc>
-                <a:spcPct val="90000"/>
-              </a:lnSpc>
-              <a:spcBef>
-                <a:spcPts val="500"/>
-              </a:spcBef>
-              <a:buFont typeface="Arial" panose="020B0604020202020204" pitchFamily="34" charset="0"/>
-              <a:buChar char="•"/>
-              <a:defRPr sz="4000" b="0" i="0" kern="1200">
-                <a:solidFill>
-                  <a:schemeClr val="bg1"/>
-                </a:solidFill>
-                <a:latin typeface="+mn-lt"/>
-                <a:ea typeface="+mn-ea"/>
-                <a:cs typeface="+mn-cs"/>
-              </a:defRPr>
-            </a:lvl4pPr>
-            <a:lvl5pPr marL="2057400" indent="-228600" algn="l" defTabSz="914400" rtl="0" eaLnBrk="1" latinLnBrk="0" hangingPunct="1">
-              <a:lnSpc>
-                <a:spcPct val="90000"/>
-              </a:lnSpc>
-              <a:spcBef>
-                <a:spcPts val="500"/>
-              </a:spcBef>
-              <a:buFont typeface="Arial" panose="020B0604020202020204" pitchFamily="34" charset="0"/>
-              <a:buChar char="•"/>
-              <a:defRPr sz="4000" b="0" i="0" kern="1200">
-                <a:solidFill>
-                  <a:schemeClr val="bg1"/>
-                </a:solidFill>
-                <a:latin typeface="+mn-lt"/>
-                <a:ea typeface="+mn-ea"/>
-                <a:cs typeface="+mn-cs"/>
-              </a:defRPr>
-            </a:lvl5pPr>
-            <a:lvl6pPr marL="2514600" indent="-228600" algn="l" defTabSz="914400" rtl="0" eaLnBrk="1" latinLnBrk="0" hangingPunct="1">
-              <a:lnSpc>
-                <a:spcPct val="90000"/>
-              </a:lnSpc>
-              <a:spcBef>
-                <a:spcPts val="500"/>
-              </a:spcBef>
-              <a:buFont typeface="Arial" panose="020B0604020202020204" pitchFamily="34" charset="0"/>
-              <a:buChar char="•"/>
-              <a:defRPr sz="1800" kern="1200">
-                <a:solidFill>
-                  <a:schemeClr val="tx1"/>
-                </a:solidFill>
-                <a:latin typeface="+mn-lt"/>
-                <a:ea typeface="+mn-ea"/>
-                <a:cs typeface="+mn-cs"/>
-              </a:defRPr>
-            </a:lvl6pPr>
-            <a:lvl7pPr marL="2971800" indent="-228600" algn="l" defTabSz="914400" rtl="0" eaLnBrk="1" latinLnBrk="0" hangingPunct="1">
-              <a:lnSpc>
-                <a:spcPct val="90000"/>
-              </a:lnSpc>
-              <a:spcBef>
-                <a:spcPts val="500"/>
-              </a:spcBef>
-              <a:buFont typeface="Arial" panose="020B0604020202020204" pitchFamily="34" charset="0"/>
-              <a:buChar char="•"/>
-              <a:defRPr sz="1800" kern="1200">
-                <a:solidFill>
-                  <a:schemeClr val="tx1"/>
-                </a:solidFill>
-                <a:latin typeface="+mn-lt"/>
-                <a:ea typeface="+mn-ea"/>
-                <a:cs typeface="+mn-cs"/>
-              </a:defRPr>
-            </a:lvl7pPr>
-            <a:lvl8pPr marL="3429000" indent="-228600" algn="l" defTabSz="914400" rtl="0" eaLnBrk="1" latinLnBrk="0" hangingPunct="1">
-              <a:lnSpc>
-                <a:spcPct val="90000"/>
-              </a:lnSpc>
-              <a:spcBef>
-                <a:spcPts val="500"/>
-              </a:spcBef>
-              <a:buFont typeface="Arial" panose="020B0604020202020204" pitchFamily="34" charset="0"/>
-              <a:buChar char="•"/>
-              <a:defRPr sz="1800" kern="1200">
-                <a:solidFill>
-                  <a:schemeClr val="tx1"/>
-                </a:solidFill>
-                <a:latin typeface="+mn-lt"/>
-                <a:ea typeface="+mn-ea"/>
-                <a:cs typeface="+mn-cs"/>
-              </a:defRPr>
-            </a:lvl8pPr>
-            <a:lvl9pPr marL="3886200" indent="-228600" algn="l" defTabSz="914400" rtl="0" eaLnBrk="1" latinLnBrk="0" hangingPunct="1">
-              <a:lnSpc>
-                <a:spcPct val="90000"/>
-              </a:lnSpc>
-              <a:spcBef>
-                <a:spcPts val="500"/>
-              </a:spcBef>
-              <a:buFont typeface="Arial" panose="020B0604020202020204" pitchFamily="34" charset="0"/>
-              <a:buChar char="•"/>
-              <a:defRPr sz="1800" kern="1200">
-                <a:solidFill>
-                  <a:schemeClr val="tx1"/>
-                </a:solidFill>
-                <a:latin typeface="+mn-lt"/>
-                <a:ea typeface="+mn-ea"/>
-                <a:cs typeface="+mn-cs"/>
-              </a:defRPr>
-            </a:lvl9pPr>
-          </a:lstStyle>
-          <a:p>
-            <a:r>
-              <a:rPr lang="es-MX"/>
-              <a:t>jas</a:t>
-            </a:r>
-            <a:endParaRPr lang="es-MX" dirty="0"/>
-          </a:p>
-        </p:txBody>
-      </p:sp>
-      <p:sp>
-        <p:nvSpPr>
-          <p:cNvPr id="21" name="Marcador de texto 3">
-            <a:extLst>
-              <a:ext uri="{FF2B5EF4-FFF2-40B4-BE49-F238E27FC236}">
-                <a16:creationId xmlns:a16="http://schemas.microsoft.com/office/drawing/2014/main" id="{8D1CAEE4-F013-3023-9584-7C5C1AB7617B}"/>
-              </a:ext>
-            </a:extLst>
-          </p:cNvPr>
-          <p:cNvSpPr txBox="1">
-            <a:spLocks/>
-          </p:cNvSpPr>
-          <p:nvPr/>
-        </p:nvSpPr>
-        <p:spPr>
-          <a:xfrm>
-            <a:off x="952500" y="4548909"/>
-            <a:ext cx="2133600" cy="369332"/>
-          </a:xfrm>
-          <a:prstGeom prst="rect">
-            <a:avLst/>
-          </a:prstGeom>
-        </p:spPr>
-        <p:txBody>
-          <a:bodyPr vert="horz" lIns="0" tIns="0" rIns="0" bIns="0" rtlCol="0">
-            <a:noAutofit/>
-          </a:bodyPr>
-          <a:lstStyle>
-            <a:lvl1pPr marL="0" indent="0" algn="l" defTabSz="914400" rtl="0" eaLnBrk="1" latinLnBrk="0" hangingPunct="1">
-              <a:lnSpc>
-                <a:spcPct val="100000"/>
-              </a:lnSpc>
-              <a:spcBef>
-                <a:spcPts val="400"/>
-              </a:spcBef>
-              <a:buFont typeface="Arial" panose="020B0604020202020204" pitchFamily="34" charset="0"/>
-              <a:buNone/>
-              <a:defRPr sz="1800" b="0" i="0" kern="1200">
-                <a:solidFill>
-                  <a:schemeClr val="tx2"/>
-                </a:solidFill>
-                <a:latin typeface="+mj-lt"/>
-                <a:ea typeface="+mn-ea"/>
-                <a:cs typeface="+mn-cs"/>
-              </a:defRPr>
-            </a:lvl1pPr>
-            <a:lvl2pPr marL="685800" indent="-228600" algn="l" defTabSz="914400" rtl="0" eaLnBrk="1" latinLnBrk="0" hangingPunct="1">
-              <a:lnSpc>
-                <a:spcPct val="90000"/>
-              </a:lnSpc>
-              <a:spcBef>
-                <a:spcPts val="500"/>
-              </a:spcBef>
-              <a:buFont typeface="Arial" panose="020B0604020202020204" pitchFamily="34" charset="0"/>
-              <a:buChar char="•"/>
-              <a:defRPr sz="4000" b="0" i="0" kern="1200">
-                <a:solidFill>
-                  <a:schemeClr val="bg1"/>
-                </a:solidFill>
-                <a:latin typeface="+mn-lt"/>
-                <a:ea typeface="+mn-ea"/>
-                <a:cs typeface="+mn-cs"/>
-              </a:defRPr>
-            </a:lvl2pPr>
-            <a:lvl3pPr marL="1143000" indent="-228600" algn="l" defTabSz="914400" rtl="0" eaLnBrk="1" latinLnBrk="0" hangingPunct="1">
-              <a:lnSpc>
-                <a:spcPct val="90000"/>
-              </a:lnSpc>
-              <a:spcBef>
-                <a:spcPts val="500"/>
-              </a:spcBef>
-              <a:buFont typeface="Arial" panose="020B0604020202020204" pitchFamily="34" charset="0"/>
-              <a:buChar char="•"/>
-              <a:defRPr sz="4000" b="0" i="0" kern="1200">
-                <a:solidFill>
-                  <a:schemeClr val="bg1"/>
-                </a:solidFill>
-                <a:latin typeface="+mn-lt"/>
-                <a:ea typeface="+mn-ea"/>
-                <a:cs typeface="+mn-cs"/>
-              </a:defRPr>
-            </a:lvl3pPr>
-            <a:lvl4pPr marL="1600200" indent="-228600" algn="l" defTabSz="914400" rtl="0" eaLnBrk="1" latinLnBrk="0" hangingPunct="1">
-              <a:lnSpc>
-                <a:spcPct val="90000"/>
-              </a:lnSpc>
-              <a:spcBef>
-                <a:spcPts val="500"/>
-              </a:spcBef>
-              <a:buFont typeface="Arial" panose="020B0604020202020204" pitchFamily="34" charset="0"/>
-              <a:buChar char="•"/>
-              <a:defRPr sz="4000" b="0" i="0" kern="1200">
-                <a:solidFill>
-                  <a:schemeClr val="bg1"/>
-                </a:solidFill>
-                <a:latin typeface="+mn-lt"/>
-                <a:ea typeface="+mn-ea"/>
-                <a:cs typeface="+mn-cs"/>
-              </a:defRPr>
-            </a:lvl4pPr>
-            <a:lvl5pPr marL="2057400" indent="-228600" algn="l" defTabSz="914400" rtl="0" eaLnBrk="1" latinLnBrk="0" hangingPunct="1">
-              <a:lnSpc>
-                <a:spcPct val="90000"/>
-              </a:lnSpc>
-              <a:spcBef>
-                <a:spcPts val="500"/>
-              </a:spcBef>
-              <a:buFont typeface="Arial" panose="020B0604020202020204" pitchFamily="34" charset="0"/>
-              <a:buChar char="•"/>
-              <a:defRPr sz="4000" b="0" i="0" kern="1200">
-                <a:solidFill>
-                  <a:schemeClr val="bg1"/>
-                </a:solidFill>
-                <a:latin typeface="+mn-lt"/>
-                <a:ea typeface="+mn-ea"/>
-                <a:cs typeface="+mn-cs"/>
-              </a:defRPr>
-            </a:lvl5pPr>
-            <a:lvl6pPr marL="2514600" indent="-228600" algn="l" defTabSz="914400" rtl="0" eaLnBrk="1" latinLnBrk="0" hangingPunct="1">
-              <a:lnSpc>
-                <a:spcPct val="90000"/>
-              </a:lnSpc>
-              <a:spcBef>
-                <a:spcPts val="500"/>
-              </a:spcBef>
-              <a:buFont typeface="Arial" panose="020B0604020202020204" pitchFamily="34" charset="0"/>
-              <a:buChar char="•"/>
-              <a:defRPr sz="1800" kern="1200">
-                <a:solidFill>
-                  <a:schemeClr val="tx1"/>
-                </a:solidFill>
-                <a:latin typeface="+mn-lt"/>
-                <a:ea typeface="+mn-ea"/>
-                <a:cs typeface="+mn-cs"/>
-              </a:defRPr>
-            </a:lvl6pPr>
-            <a:lvl7pPr marL="2971800" indent="-228600" algn="l" defTabSz="914400" rtl="0" eaLnBrk="1" latinLnBrk="0" hangingPunct="1">
-              <a:lnSpc>
-                <a:spcPct val="90000"/>
-              </a:lnSpc>
-              <a:spcBef>
-                <a:spcPts val="500"/>
-              </a:spcBef>
-              <a:buFont typeface="Arial" panose="020B0604020202020204" pitchFamily="34" charset="0"/>
-              <a:buChar char="•"/>
-              <a:defRPr sz="1800" kern="1200">
-                <a:solidFill>
-                  <a:schemeClr val="tx1"/>
-                </a:solidFill>
-                <a:latin typeface="+mn-lt"/>
-                <a:ea typeface="+mn-ea"/>
-                <a:cs typeface="+mn-cs"/>
-              </a:defRPr>
-            </a:lvl7pPr>
-            <a:lvl8pPr marL="3429000" indent="-228600" algn="l" defTabSz="914400" rtl="0" eaLnBrk="1" latinLnBrk="0" hangingPunct="1">
-              <a:lnSpc>
-                <a:spcPct val="90000"/>
-              </a:lnSpc>
-              <a:spcBef>
-                <a:spcPts val="500"/>
-              </a:spcBef>
-              <a:buFont typeface="Arial" panose="020B0604020202020204" pitchFamily="34" charset="0"/>
-              <a:buChar char="•"/>
-              <a:defRPr sz="1800" kern="1200">
-                <a:solidFill>
-                  <a:schemeClr val="tx1"/>
-                </a:solidFill>
-                <a:latin typeface="+mn-lt"/>
-                <a:ea typeface="+mn-ea"/>
-                <a:cs typeface="+mn-cs"/>
-              </a:defRPr>
-            </a:lvl8pPr>
-            <a:lvl9pPr marL="3886200" indent="-228600" algn="l" defTabSz="914400" rtl="0" eaLnBrk="1" latinLnBrk="0" hangingPunct="1">
-              <a:lnSpc>
-                <a:spcPct val="90000"/>
-              </a:lnSpc>
-              <a:spcBef>
-                <a:spcPts val="500"/>
-              </a:spcBef>
-              <a:buFont typeface="Arial" panose="020B0604020202020204" pitchFamily="34" charset="0"/>
-              <a:buChar char="•"/>
-              <a:defRPr sz="1800" kern="1200">
-                <a:solidFill>
-                  <a:schemeClr val="tx1"/>
-                </a:solidFill>
-                <a:latin typeface="+mn-lt"/>
-                <a:ea typeface="+mn-ea"/>
-                <a:cs typeface="+mn-cs"/>
-              </a:defRPr>
-            </a:lvl9pPr>
-          </a:lstStyle>
-          <a:p>
-            <a:r>
-              <a:rPr lang="es-MX"/>
-              <a:t>h</a:t>
-            </a:r>
-            <a:endParaRPr lang="es-MX" dirty="0"/>
-          </a:p>
-        </p:txBody>
-      </p:sp>
-      <p:sp>
-        <p:nvSpPr>
-          <p:cNvPr id="22" name="Marcador de texto 2">
-            <a:extLst>
-              <a:ext uri="{FF2B5EF4-FFF2-40B4-BE49-F238E27FC236}">
-                <a16:creationId xmlns:a16="http://schemas.microsoft.com/office/drawing/2014/main" id="{9AA0A668-7268-4D27-0F67-6AFC206E6A3F}"/>
-              </a:ext>
-            </a:extLst>
-          </p:cNvPr>
-          <p:cNvSpPr txBox="1">
-            <a:spLocks/>
-          </p:cNvSpPr>
-          <p:nvPr/>
-        </p:nvSpPr>
-        <p:spPr>
-          <a:xfrm>
-            <a:off x="3663042" y="5066145"/>
-            <a:ext cx="2133600" cy="1040378"/>
-          </a:xfrm>
-          <a:prstGeom prst="rect">
-            <a:avLst/>
-          </a:prstGeom>
-        </p:spPr>
-        <p:txBody>
-          <a:bodyPr vert="horz" lIns="0" tIns="0" rIns="0" bIns="0" rtlCol="0">
-            <a:noAutofit/>
-          </a:bodyPr>
-          <a:lstStyle>
-            <a:lvl1pPr marL="0" indent="0" algn="l" defTabSz="914400" rtl="0" eaLnBrk="1" latinLnBrk="0" hangingPunct="1">
-              <a:lnSpc>
-                <a:spcPct val="100000"/>
-              </a:lnSpc>
-              <a:spcBef>
-                <a:spcPts val="1000"/>
-              </a:spcBef>
-              <a:buFont typeface="Arial" panose="020B0604020202020204" pitchFamily="34" charset="0"/>
-              <a:buNone/>
-              <a:defRPr sz="1400" b="0" i="0" kern="1200">
-                <a:solidFill>
-                  <a:schemeClr val="bg1"/>
-                </a:solidFill>
-                <a:latin typeface="+mn-lt"/>
-                <a:ea typeface="+mn-ea"/>
-                <a:cs typeface="+mn-cs"/>
-              </a:defRPr>
-            </a:lvl1pPr>
-            <a:lvl2pPr marL="685800" indent="-228600" algn="l" defTabSz="914400" rtl="0" eaLnBrk="1" latinLnBrk="0" hangingPunct="1">
-              <a:lnSpc>
-                <a:spcPct val="90000"/>
-              </a:lnSpc>
-              <a:spcBef>
-                <a:spcPts val="500"/>
-              </a:spcBef>
-              <a:buFont typeface="Arial" panose="020B0604020202020204" pitchFamily="34" charset="0"/>
-              <a:buChar char="•"/>
-              <a:defRPr sz="4000" b="0" i="0" kern="1200">
-                <a:solidFill>
-                  <a:schemeClr val="bg1"/>
-                </a:solidFill>
-                <a:latin typeface="+mn-lt"/>
-                <a:ea typeface="+mn-ea"/>
-                <a:cs typeface="+mn-cs"/>
-              </a:defRPr>
-            </a:lvl2pPr>
-            <a:lvl3pPr marL="1143000" indent="-228600" algn="l" defTabSz="914400" rtl="0" eaLnBrk="1" latinLnBrk="0" hangingPunct="1">
-              <a:lnSpc>
-                <a:spcPct val="90000"/>
-              </a:lnSpc>
-              <a:spcBef>
-                <a:spcPts val="500"/>
-              </a:spcBef>
-              <a:buFont typeface="Arial" panose="020B0604020202020204" pitchFamily="34" charset="0"/>
-              <a:buChar char="•"/>
-              <a:defRPr sz="4000" b="0" i="0" kern="1200">
-                <a:solidFill>
-                  <a:schemeClr val="bg1"/>
-                </a:solidFill>
-                <a:latin typeface="+mn-lt"/>
-                <a:ea typeface="+mn-ea"/>
-                <a:cs typeface="+mn-cs"/>
-              </a:defRPr>
-            </a:lvl3pPr>
-            <a:lvl4pPr marL="1600200" indent="-228600" algn="l" defTabSz="914400" rtl="0" eaLnBrk="1" latinLnBrk="0" hangingPunct="1">
-              <a:lnSpc>
-                <a:spcPct val="90000"/>
-              </a:lnSpc>
-              <a:spcBef>
-                <a:spcPts val="500"/>
-              </a:spcBef>
-              <a:buFont typeface="Arial" panose="020B0604020202020204" pitchFamily="34" charset="0"/>
-              <a:buChar char="•"/>
-              <a:defRPr sz="4000" b="0" i="0" kern="1200">
-                <a:solidFill>
-                  <a:schemeClr val="bg1"/>
-                </a:solidFill>
-                <a:latin typeface="+mn-lt"/>
-                <a:ea typeface="+mn-ea"/>
-                <a:cs typeface="+mn-cs"/>
-              </a:defRPr>
-            </a:lvl4pPr>
-            <a:lvl5pPr marL="2057400" indent="-228600" algn="l" defTabSz="914400" rtl="0" eaLnBrk="1" latinLnBrk="0" hangingPunct="1">
-              <a:lnSpc>
-                <a:spcPct val="90000"/>
-              </a:lnSpc>
-              <a:spcBef>
-                <a:spcPts val="500"/>
-              </a:spcBef>
-              <a:buFont typeface="Arial" panose="020B0604020202020204" pitchFamily="34" charset="0"/>
-              <a:buChar char="•"/>
-              <a:defRPr sz="4000" b="0" i="0" kern="1200">
-                <a:solidFill>
-                  <a:schemeClr val="bg1"/>
-                </a:solidFill>
-                <a:latin typeface="+mn-lt"/>
-                <a:ea typeface="+mn-ea"/>
-                <a:cs typeface="+mn-cs"/>
-              </a:defRPr>
-            </a:lvl5pPr>
-            <a:lvl6pPr marL="2514600" indent="-228600" algn="l" defTabSz="914400" rtl="0" eaLnBrk="1" latinLnBrk="0" hangingPunct="1">
-              <a:lnSpc>
-                <a:spcPct val="90000"/>
-              </a:lnSpc>
-              <a:spcBef>
-                <a:spcPts val="500"/>
-              </a:spcBef>
-              <a:buFont typeface="Arial" panose="020B0604020202020204" pitchFamily="34" charset="0"/>
-              <a:buChar char="•"/>
-              <a:defRPr sz="1800" kern="1200">
-                <a:solidFill>
-                  <a:schemeClr val="tx1"/>
-                </a:solidFill>
-                <a:latin typeface="+mn-lt"/>
-                <a:ea typeface="+mn-ea"/>
-                <a:cs typeface="+mn-cs"/>
-              </a:defRPr>
-            </a:lvl6pPr>
-            <a:lvl7pPr marL="2971800" indent="-228600" algn="l" defTabSz="914400" rtl="0" eaLnBrk="1" latinLnBrk="0" hangingPunct="1">
-              <a:lnSpc>
-                <a:spcPct val="90000"/>
-              </a:lnSpc>
-              <a:spcBef>
-                <a:spcPts val="500"/>
-              </a:spcBef>
-              <a:buFont typeface="Arial" panose="020B0604020202020204" pitchFamily="34" charset="0"/>
-              <a:buChar char="•"/>
-              <a:defRPr sz="1800" kern="1200">
-                <a:solidFill>
-                  <a:schemeClr val="tx1"/>
-                </a:solidFill>
-                <a:latin typeface="+mn-lt"/>
-                <a:ea typeface="+mn-ea"/>
-                <a:cs typeface="+mn-cs"/>
-              </a:defRPr>
-            </a:lvl7pPr>
-            <a:lvl8pPr marL="3429000" indent="-228600" algn="l" defTabSz="914400" rtl="0" eaLnBrk="1" latinLnBrk="0" hangingPunct="1">
-              <a:lnSpc>
-                <a:spcPct val="90000"/>
-              </a:lnSpc>
-              <a:spcBef>
-                <a:spcPts val="500"/>
-              </a:spcBef>
-              <a:buFont typeface="Arial" panose="020B0604020202020204" pitchFamily="34" charset="0"/>
-              <a:buChar char="•"/>
-              <a:defRPr sz="1800" kern="1200">
-                <a:solidFill>
-                  <a:schemeClr val="tx1"/>
-                </a:solidFill>
-                <a:latin typeface="+mn-lt"/>
-                <a:ea typeface="+mn-ea"/>
-                <a:cs typeface="+mn-cs"/>
-              </a:defRPr>
-            </a:lvl8pPr>
-            <a:lvl9pPr marL="3886200" indent="-228600" algn="l" defTabSz="914400" rtl="0" eaLnBrk="1" latinLnBrk="0" hangingPunct="1">
-              <a:lnSpc>
-                <a:spcPct val="90000"/>
-              </a:lnSpc>
-              <a:spcBef>
-                <a:spcPts val="500"/>
-              </a:spcBef>
-              <a:buFont typeface="Arial" panose="020B0604020202020204" pitchFamily="34" charset="0"/>
-              <a:buChar char="•"/>
-              <a:defRPr sz="1800" kern="1200">
-                <a:solidFill>
-                  <a:schemeClr val="tx1"/>
-                </a:solidFill>
-                <a:latin typeface="+mn-lt"/>
-                <a:ea typeface="+mn-ea"/>
-                <a:cs typeface="+mn-cs"/>
-              </a:defRPr>
-            </a:lvl9pPr>
-          </a:lstStyle>
-          <a:p>
-            <a:r>
-              <a:rPr lang="es-MX"/>
-              <a:t>jas</a:t>
-            </a:r>
-            <a:endParaRPr lang="es-MX" dirty="0"/>
-          </a:p>
-        </p:txBody>
-      </p:sp>
-      <p:sp>
-        <p:nvSpPr>
-          <p:cNvPr id="23" name="Marcador de texto 3">
-            <a:extLst>
-              <a:ext uri="{FF2B5EF4-FFF2-40B4-BE49-F238E27FC236}">
-                <a16:creationId xmlns:a16="http://schemas.microsoft.com/office/drawing/2014/main" id="{4631010F-3BBE-B4DA-0722-5B40AB7C5704}"/>
-              </a:ext>
-            </a:extLst>
-          </p:cNvPr>
-          <p:cNvSpPr txBox="1">
-            <a:spLocks/>
-          </p:cNvSpPr>
-          <p:nvPr/>
-        </p:nvSpPr>
-        <p:spPr>
-          <a:xfrm>
-            <a:off x="3663042" y="4548909"/>
-            <a:ext cx="2133600" cy="369332"/>
-          </a:xfrm>
-          <a:prstGeom prst="rect">
-            <a:avLst/>
-          </a:prstGeom>
-        </p:spPr>
-        <p:txBody>
-          <a:bodyPr vert="horz" lIns="0" tIns="0" rIns="0" bIns="0" rtlCol="0">
-            <a:noAutofit/>
-          </a:bodyPr>
-          <a:lstStyle>
-            <a:lvl1pPr marL="0" indent="0" algn="l" defTabSz="914400" rtl="0" eaLnBrk="1" latinLnBrk="0" hangingPunct="1">
-              <a:lnSpc>
-                <a:spcPct val="100000"/>
-              </a:lnSpc>
-              <a:spcBef>
-                <a:spcPts val="400"/>
-              </a:spcBef>
-              <a:buFont typeface="Arial" panose="020B0604020202020204" pitchFamily="34" charset="0"/>
-              <a:buNone/>
-              <a:defRPr sz="1800" b="0" i="0" kern="1200">
-                <a:solidFill>
-                  <a:schemeClr val="tx2"/>
-                </a:solidFill>
-                <a:latin typeface="+mj-lt"/>
-                <a:ea typeface="+mn-ea"/>
-                <a:cs typeface="+mn-cs"/>
-              </a:defRPr>
-            </a:lvl1pPr>
-            <a:lvl2pPr marL="685800" indent="-228600" algn="l" defTabSz="914400" rtl="0" eaLnBrk="1" latinLnBrk="0" hangingPunct="1">
-              <a:lnSpc>
-                <a:spcPct val="90000"/>
-              </a:lnSpc>
-              <a:spcBef>
-                <a:spcPts val="500"/>
-              </a:spcBef>
-              <a:buFont typeface="Arial" panose="020B0604020202020204" pitchFamily="34" charset="0"/>
-              <a:buChar char="•"/>
-              <a:defRPr sz="4000" b="0" i="0" kern="1200">
-                <a:solidFill>
-                  <a:schemeClr val="bg1"/>
-                </a:solidFill>
-                <a:latin typeface="+mn-lt"/>
-                <a:ea typeface="+mn-ea"/>
-                <a:cs typeface="+mn-cs"/>
-              </a:defRPr>
-            </a:lvl2pPr>
-            <a:lvl3pPr marL="1143000" indent="-228600" algn="l" defTabSz="914400" rtl="0" eaLnBrk="1" latinLnBrk="0" hangingPunct="1">
-              <a:lnSpc>
-                <a:spcPct val="90000"/>
-              </a:lnSpc>
-              <a:spcBef>
-                <a:spcPts val="500"/>
-              </a:spcBef>
-              <a:buFont typeface="Arial" panose="020B0604020202020204" pitchFamily="34" charset="0"/>
-              <a:buChar char="•"/>
-              <a:defRPr sz="4000" b="0" i="0" kern="1200">
-                <a:solidFill>
-                  <a:schemeClr val="bg1"/>
-                </a:solidFill>
-                <a:latin typeface="+mn-lt"/>
-                <a:ea typeface="+mn-ea"/>
-                <a:cs typeface="+mn-cs"/>
-              </a:defRPr>
-            </a:lvl3pPr>
-            <a:lvl4pPr marL="1600200" indent="-228600" algn="l" defTabSz="914400" rtl="0" eaLnBrk="1" latinLnBrk="0" hangingPunct="1">
-              <a:lnSpc>
-                <a:spcPct val="90000"/>
-              </a:lnSpc>
-              <a:spcBef>
-                <a:spcPts val="500"/>
-              </a:spcBef>
-              <a:buFont typeface="Arial" panose="020B0604020202020204" pitchFamily="34" charset="0"/>
-              <a:buChar char="•"/>
-              <a:defRPr sz="4000" b="0" i="0" kern="1200">
-                <a:solidFill>
-                  <a:schemeClr val="bg1"/>
-                </a:solidFill>
-                <a:latin typeface="+mn-lt"/>
-                <a:ea typeface="+mn-ea"/>
-                <a:cs typeface="+mn-cs"/>
-              </a:defRPr>
-            </a:lvl4pPr>
-            <a:lvl5pPr marL="2057400" indent="-228600" algn="l" defTabSz="914400" rtl="0" eaLnBrk="1" latinLnBrk="0" hangingPunct="1">
-              <a:lnSpc>
-                <a:spcPct val="90000"/>
-              </a:lnSpc>
-              <a:spcBef>
-                <a:spcPts val="500"/>
-              </a:spcBef>
-              <a:buFont typeface="Arial" panose="020B0604020202020204" pitchFamily="34" charset="0"/>
-              <a:buChar char="•"/>
-              <a:defRPr sz="4000" b="0" i="0" kern="1200">
-                <a:solidFill>
-                  <a:schemeClr val="bg1"/>
-                </a:solidFill>
-                <a:latin typeface="+mn-lt"/>
-                <a:ea typeface="+mn-ea"/>
-                <a:cs typeface="+mn-cs"/>
-              </a:defRPr>
-            </a:lvl5pPr>
-            <a:lvl6pPr marL="2514600" indent="-228600" algn="l" defTabSz="914400" rtl="0" eaLnBrk="1" latinLnBrk="0" hangingPunct="1">
-              <a:lnSpc>
-                <a:spcPct val="90000"/>
-              </a:lnSpc>
-              <a:spcBef>
-                <a:spcPts val="500"/>
-              </a:spcBef>
-              <a:buFont typeface="Arial" panose="020B0604020202020204" pitchFamily="34" charset="0"/>
-              <a:buChar char="•"/>
-              <a:defRPr sz="1800" kern="1200">
-                <a:solidFill>
-                  <a:schemeClr val="tx1"/>
-                </a:solidFill>
-                <a:latin typeface="+mn-lt"/>
-                <a:ea typeface="+mn-ea"/>
-                <a:cs typeface="+mn-cs"/>
-              </a:defRPr>
-            </a:lvl6pPr>
-            <a:lvl7pPr marL="2971800" indent="-228600" algn="l" defTabSz="914400" rtl="0" eaLnBrk="1" latinLnBrk="0" hangingPunct="1">
-              <a:lnSpc>
-                <a:spcPct val="90000"/>
-              </a:lnSpc>
-              <a:spcBef>
-                <a:spcPts val="500"/>
-              </a:spcBef>
-              <a:buFont typeface="Arial" panose="020B0604020202020204" pitchFamily="34" charset="0"/>
-              <a:buChar char="•"/>
-              <a:defRPr sz="1800" kern="1200">
-                <a:solidFill>
-                  <a:schemeClr val="tx1"/>
-                </a:solidFill>
-                <a:latin typeface="+mn-lt"/>
-                <a:ea typeface="+mn-ea"/>
-                <a:cs typeface="+mn-cs"/>
-              </a:defRPr>
-            </a:lvl7pPr>
-            <a:lvl8pPr marL="3429000" indent="-228600" algn="l" defTabSz="914400" rtl="0" eaLnBrk="1" latinLnBrk="0" hangingPunct="1">
-              <a:lnSpc>
-                <a:spcPct val="90000"/>
-              </a:lnSpc>
-              <a:spcBef>
-                <a:spcPts val="500"/>
-              </a:spcBef>
-              <a:buFont typeface="Arial" panose="020B0604020202020204" pitchFamily="34" charset="0"/>
-              <a:buChar char="•"/>
-              <a:defRPr sz="1800" kern="1200">
-                <a:solidFill>
-                  <a:schemeClr val="tx1"/>
-                </a:solidFill>
-                <a:latin typeface="+mn-lt"/>
-                <a:ea typeface="+mn-ea"/>
-                <a:cs typeface="+mn-cs"/>
-              </a:defRPr>
-            </a:lvl8pPr>
-            <a:lvl9pPr marL="3886200" indent="-228600" algn="l" defTabSz="914400" rtl="0" eaLnBrk="1" latinLnBrk="0" hangingPunct="1">
-              <a:lnSpc>
-                <a:spcPct val="90000"/>
-              </a:lnSpc>
-              <a:spcBef>
-                <a:spcPts val="500"/>
-              </a:spcBef>
-              <a:buFont typeface="Arial" panose="020B0604020202020204" pitchFamily="34" charset="0"/>
-              <a:buChar char="•"/>
-              <a:defRPr sz="1800" kern="1200">
-                <a:solidFill>
-                  <a:schemeClr val="tx1"/>
-                </a:solidFill>
-                <a:latin typeface="+mn-lt"/>
-                <a:ea typeface="+mn-ea"/>
-                <a:cs typeface="+mn-cs"/>
-              </a:defRPr>
-            </a:lvl9pPr>
-          </a:lstStyle>
-          <a:p>
-            <a:r>
-              <a:rPr lang="es-MX"/>
-              <a:t>h</a:t>
-            </a:r>
-            <a:endParaRPr lang="es-MX" dirty="0"/>
-          </a:p>
-        </p:txBody>
-      </p:sp>
-      <p:sp>
-        <p:nvSpPr>
-          <p:cNvPr id="24" name="Marcador de texto 2">
-            <a:extLst>
-              <a:ext uri="{FF2B5EF4-FFF2-40B4-BE49-F238E27FC236}">
-                <a16:creationId xmlns:a16="http://schemas.microsoft.com/office/drawing/2014/main" id="{5F3B8B4B-E218-04DA-EAC0-22152833BC14}"/>
-              </a:ext>
-            </a:extLst>
-          </p:cNvPr>
-          <p:cNvSpPr txBox="1">
-            <a:spLocks/>
-          </p:cNvSpPr>
-          <p:nvPr/>
-        </p:nvSpPr>
-        <p:spPr>
-          <a:xfrm>
-            <a:off x="6373584" y="5066145"/>
-            <a:ext cx="2133600" cy="1040378"/>
-          </a:xfrm>
-          <a:prstGeom prst="rect">
-            <a:avLst/>
-          </a:prstGeom>
-        </p:spPr>
-        <p:txBody>
-          <a:bodyPr vert="horz" lIns="0" tIns="0" rIns="0" bIns="0" rtlCol="0">
-            <a:noAutofit/>
-          </a:bodyPr>
-          <a:lstStyle>
-            <a:lvl1pPr marL="0" indent="0" algn="l" defTabSz="914400" rtl="0" eaLnBrk="1" latinLnBrk="0" hangingPunct="1">
-              <a:lnSpc>
-                <a:spcPct val="100000"/>
-              </a:lnSpc>
-              <a:spcBef>
-                <a:spcPts val="1000"/>
-              </a:spcBef>
-              <a:buFont typeface="Arial" panose="020B0604020202020204" pitchFamily="34" charset="0"/>
-              <a:buNone/>
-              <a:defRPr sz="1400" b="0" i="0" kern="1200">
-                <a:solidFill>
-                  <a:schemeClr val="bg1"/>
-                </a:solidFill>
-                <a:latin typeface="+mn-lt"/>
-                <a:ea typeface="+mn-ea"/>
-                <a:cs typeface="+mn-cs"/>
-              </a:defRPr>
-            </a:lvl1pPr>
-            <a:lvl2pPr marL="685800" indent="-228600" algn="l" defTabSz="914400" rtl="0" eaLnBrk="1" latinLnBrk="0" hangingPunct="1">
-              <a:lnSpc>
-                <a:spcPct val="90000"/>
-              </a:lnSpc>
-              <a:spcBef>
-                <a:spcPts val="500"/>
-              </a:spcBef>
-              <a:buFont typeface="Arial" panose="020B0604020202020204" pitchFamily="34" charset="0"/>
-              <a:buChar char="•"/>
-              <a:defRPr sz="4000" b="0" i="0" kern="1200">
-                <a:solidFill>
-                  <a:schemeClr val="bg1"/>
-                </a:solidFill>
-                <a:latin typeface="+mn-lt"/>
-                <a:ea typeface="+mn-ea"/>
-                <a:cs typeface="+mn-cs"/>
-              </a:defRPr>
-            </a:lvl2pPr>
-            <a:lvl3pPr marL="1143000" indent="-228600" algn="l" defTabSz="914400" rtl="0" eaLnBrk="1" latinLnBrk="0" hangingPunct="1">
-              <a:lnSpc>
-                <a:spcPct val="90000"/>
-              </a:lnSpc>
-              <a:spcBef>
-                <a:spcPts val="500"/>
-              </a:spcBef>
-              <a:buFont typeface="Arial" panose="020B0604020202020204" pitchFamily="34" charset="0"/>
-              <a:buChar char="•"/>
-              <a:defRPr sz="4000" b="0" i="0" kern="1200">
-                <a:solidFill>
-                  <a:schemeClr val="bg1"/>
-                </a:solidFill>
-                <a:latin typeface="+mn-lt"/>
-                <a:ea typeface="+mn-ea"/>
-                <a:cs typeface="+mn-cs"/>
-              </a:defRPr>
-            </a:lvl3pPr>
-            <a:lvl4pPr marL="1600200" indent="-228600" algn="l" defTabSz="914400" rtl="0" eaLnBrk="1" latinLnBrk="0" hangingPunct="1">
-              <a:lnSpc>
-                <a:spcPct val="90000"/>
-              </a:lnSpc>
-              <a:spcBef>
-                <a:spcPts val="500"/>
-              </a:spcBef>
-              <a:buFont typeface="Arial" panose="020B0604020202020204" pitchFamily="34" charset="0"/>
-              <a:buChar char="•"/>
-              <a:defRPr sz="4000" b="0" i="0" kern="1200">
-                <a:solidFill>
-                  <a:schemeClr val="bg1"/>
-                </a:solidFill>
-                <a:latin typeface="+mn-lt"/>
-                <a:ea typeface="+mn-ea"/>
-                <a:cs typeface="+mn-cs"/>
-              </a:defRPr>
-            </a:lvl4pPr>
-            <a:lvl5pPr marL="2057400" indent="-228600" algn="l" defTabSz="914400" rtl="0" eaLnBrk="1" latinLnBrk="0" hangingPunct="1">
-              <a:lnSpc>
-                <a:spcPct val="90000"/>
-              </a:lnSpc>
-              <a:spcBef>
-                <a:spcPts val="500"/>
-              </a:spcBef>
-              <a:buFont typeface="Arial" panose="020B0604020202020204" pitchFamily="34" charset="0"/>
-              <a:buChar char="•"/>
-              <a:defRPr sz="4000" b="0" i="0" kern="1200">
-                <a:solidFill>
-                  <a:schemeClr val="bg1"/>
-                </a:solidFill>
-                <a:latin typeface="+mn-lt"/>
-                <a:ea typeface="+mn-ea"/>
-                <a:cs typeface="+mn-cs"/>
-              </a:defRPr>
-            </a:lvl5pPr>
-            <a:lvl6pPr marL="2514600" indent="-228600" algn="l" defTabSz="914400" rtl="0" eaLnBrk="1" latinLnBrk="0" hangingPunct="1">
-              <a:lnSpc>
-                <a:spcPct val="90000"/>
-              </a:lnSpc>
-              <a:spcBef>
-                <a:spcPts val="500"/>
-              </a:spcBef>
-              <a:buFont typeface="Arial" panose="020B0604020202020204" pitchFamily="34" charset="0"/>
-              <a:buChar char="•"/>
-              <a:defRPr sz="1800" kern="1200">
-                <a:solidFill>
-                  <a:schemeClr val="tx1"/>
-                </a:solidFill>
-                <a:latin typeface="+mn-lt"/>
-                <a:ea typeface="+mn-ea"/>
-                <a:cs typeface="+mn-cs"/>
-              </a:defRPr>
-            </a:lvl6pPr>
-            <a:lvl7pPr marL="2971800" indent="-228600" algn="l" defTabSz="914400" rtl="0" eaLnBrk="1" latinLnBrk="0" hangingPunct="1">
-              <a:lnSpc>
-                <a:spcPct val="90000"/>
-              </a:lnSpc>
-              <a:spcBef>
-                <a:spcPts val="500"/>
-              </a:spcBef>
-              <a:buFont typeface="Arial" panose="020B0604020202020204" pitchFamily="34" charset="0"/>
-              <a:buChar char="•"/>
-              <a:defRPr sz="1800" kern="1200">
-                <a:solidFill>
-                  <a:schemeClr val="tx1"/>
-                </a:solidFill>
-                <a:latin typeface="+mn-lt"/>
-                <a:ea typeface="+mn-ea"/>
-                <a:cs typeface="+mn-cs"/>
-              </a:defRPr>
-            </a:lvl7pPr>
-            <a:lvl8pPr marL="3429000" indent="-228600" algn="l" defTabSz="914400" rtl="0" eaLnBrk="1" latinLnBrk="0" hangingPunct="1">
-              <a:lnSpc>
-                <a:spcPct val="90000"/>
-              </a:lnSpc>
-              <a:spcBef>
-                <a:spcPts val="500"/>
-              </a:spcBef>
-              <a:buFont typeface="Arial" panose="020B0604020202020204" pitchFamily="34" charset="0"/>
-              <a:buChar char="•"/>
-              <a:defRPr sz="1800" kern="1200">
-                <a:solidFill>
-                  <a:schemeClr val="tx1"/>
-                </a:solidFill>
-                <a:latin typeface="+mn-lt"/>
-                <a:ea typeface="+mn-ea"/>
-                <a:cs typeface="+mn-cs"/>
-              </a:defRPr>
-            </a:lvl8pPr>
-            <a:lvl9pPr marL="3886200" indent="-228600" algn="l" defTabSz="914400" rtl="0" eaLnBrk="1" latinLnBrk="0" hangingPunct="1">
-              <a:lnSpc>
-                <a:spcPct val="90000"/>
-              </a:lnSpc>
-              <a:spcBef>
-                <a:spcPts val="500"/>
-              </a:spcBef>
-              <a:buFont typeface="Arial" panose="020B0604020202020204" pitchFamily="34" charset="0"/>
-              <a:buChar char="•"/>
-              <a:defRPr sz="1800" kern="1200">
-                <a:solidFill>
-                  <a:schemeClr val="tx1"/>
-                </a:solidFill>
-                <a:latin typeface="+mn-lt"/>
-                <a:ea typeface="+mn-ea"/>
-                <a:cs typeface="+mn-cs"/>
-              </a:defRPr>
-            </a:lvl9pPr>
-          </a:lstStyle>
-          <a:p>
-            <a:r>
-              <a:rPr lang="es-MX"/>
-              <a:t>jas</a:t>
-            </a:r>
-            <a:endParaRPr lang="es-MX" dirty="0"/>
-          </a:p>
-        </p:txBody>
-      </p:sp>
-      <p:sp>
-        <p:nvSpPr>
-          <p:cNvPr id="25" name="Marcador de texto 3">
-            <a:extLst>
-              <a:ext uri="{FF2B5EF4-FFF2-40B4-BE49-F238E27FC236}">
-                <a16:creationId xmlns:a16="http://schemas.microsoft.com/office/drawing/2014/main" id="{8933FBC4-25C7-3BBF-F94F-F799E7031405}"/>
-              </a:ext>
-            </a:extLst>
-          </p:cNvPr>
-          <p:cNvSpPr txBox="1">
-            <a:spLocks/>
-          </p:cNvSpPr>
-          <p:nvPr/>
-        </p:nvSpPr>
-        <p:spPr>
-          <a:xfrm>
-            <a:off x="6373584" y="4548909"/>
-            <a:ext cx="2133600" cy="369332"/>
-          </a:xfrm>
-          <a:prstGeom prst="rect">
-            <a:avLst/>
-          </a:prstGeom>
-        </p:spPr>
-        <p:txBody>
-          <a:bodyPr vert="horz" lIns="0" tIns="0" rIns="0" bIns="0" rtlCol="0">
-            <a:noAutofit/>
-          </a:bodyPr>
-          <a:lstStyle>
-            <a:lvl1pPr marL="0" indent="0" algn="l" defTabSz="914400" rtl="0" eaLnBrk="1" latinLnBrk="0" hangingPunct="1">
-              <a:lnSpc>
-                <a:spcPct val="100000"/>
-              </a:lnSpc>
-              <a:spcBef>
-                <a:spcPts val="400"/>
-              </a:spcBef>
-              <a:buFont typeface="Arial" panose="020B0604020202020204" pitchFamily="34" charset="0"/>
-              <a:buNone/>
-              <a:defRPr sz="1800" b="0" i="0" kern="1200">
-                <a:solidFill>
-                  <a:schemeClr val="tx2"/>
-                </a:solidFill>
-                <a:latin typeface="+mj-lt"/>
-                <a:ea typeface="+mn-ea"/>
-                <a:cs typeface="+mn-cs"/>
-              </a:defRPr>
-            </a:lvl1pPr>
-            <a:lvl2pPr marL="685800" indent="-228600" algn="l" defTabSz="914400" rtl="0" eaLnBrk="1" latinLnBrk="0" hangingPunct="1">
-              <a:lnSpc>
-                <a:spcPct val="90000"/>
-              </a:lnSpc>
-              <a:spcBef>
-                <a:spcPts val="500"/>
-              </a:spcBef>
-              <a:buFont typeface="Arial" panose="020B0604020202020204" pitchFamily="34" charset="0"/>
-              <a:buChar char="•"/>
-              <a:defRPr sz="4000" b="0" i="0" kern="1200">
-                <a:solidFill>
-                  <a:schemeClr val="bg1"/>
-                </a:solidFill>
-                <a:latin typeface="+mn-lt"/>
-                <a:ea typeface="+mn-ea"/>
-                <a:cs typeface="+mn-cs"/>
-              </a:defRPr>
-            </a:lvl2pPr>
-            <a:lvl3pPr marL="1143000" indent="-228600" algn="l" defTabSz="914400" rtl="0" eaLnBrk="1" latinLnBrk="0" hangingPunct="1">
-              <a:lnSpc>
-                <a:spcPct val="90000"/>
-              </a:lnSpc>
-              <a:spcBef>
-                <a:spcPts val="500"/>
-              </a:spcBef>
-              <a:buFont typeface="Arial" panose="020B0604020202020204" pitchFamily="34" charset="0"/>
-              <a:buChar char="•"/>
-              <a:defRPr sz="4000" b="0" i="0" kern="1200">
-                <a:solidFill>
-                  <a:schemeClr val="bg1"/>
-                </a:solidFill>
-                <a:latin typeface="+mn-lt"/>
-                <a:ea typeface="+mn-ea"/>
-                <a:cs typeface="+mn-cs"/>
-              </a:defRPr>
-            </a:lvl3pPr>
-            <a:lvl4pPr marL="1600200" indent="-228600" algn="l" defTabSz="914400" rtl="0" eaLnBrk="1" latinLnBrk="0" hangingPunct="1">
-              <a:lnSpc>
-                <a:spcPct val="90000"/>
-              </a:lnSpc>
-              <a:spcBef>
-                <a:spcPts val="500"/>
-              </a:spcBef>
-              <a:buFont typeface="Arial" panose="020B0604020202020204" pitchFamily="34" charset="0"/>
-              <a:buChar char="•"/>
-              <a:defRPr sz="4000" b="0" i="0" kern="1200">
-                <a:solidFill>
-                  <a:schemeClr val="bg1"/>
-                </a:solidFill>
-                <a:latin typeface="+mn-lt"/>
-                <a:ea typeface="+mn-ea"/>
-                <a:cs typeface="+mn-cs"/>
-              </a:defRPr>
-            </a:lvl4pPr>
-            <a:lvl5pPr marL="2057400" indent="-228600" algn="l" defTabSz="914400" rtl="0" eaLnBrk="1" latinLnBrk="0" hangingPunct="1">
-              <a:lnSpc>
-                <a:spcPct val="90000"/>
-              </a:lnSpc>
-              <a:spcBef>
-                <a:spcPts val="500"/>
-              </a:spcBef>
-              <a:buFont typeface="Arial" panose="020B0604020202020204" pitchFamily="34" charset="0"/>
-              <a:buChar char="•"/>
-              <a:defRPr sz="4000" b="0" i="0" kern="1200">
-                <a:solidFill>
-                  <a:schemeClr val="bg1"/>
-                </a:solidFill>
-                <a:latin typeface="+mn-lt"/>
-                <a:ea typeface="+mn-ea"/>
-                <a:cs typeface="+mn-cs"/>
-              </a:defRPr>
-            </a:lvl5pPr>
-            <a:lvl6pPr marL="2514600" indent="-228600" algn="l" defTabSz="914400" rtl="0" eaLnBrk="1" latinLnBrk="0" hangingPunct="1">
-              <a:lnSpc>
-                <a:spcPct val="90000"/>
-              </a:lnSpc>
-              <a:spcBef>
-                <a:spcPts val="500"/>
-              </a:spcBef>
-              <a:buFont typeface="Arial" panose="020B0604020202020204" pitchFamily="34" charset="0"/>
-              <a:buChar char="•"/>
-              <a:defRPr sz="1800" kern="1200">
-                <a:solidFill>
-                  <a:schemeClr val="tx1"/>
-                </a:solidFill>
-                <a:latin typeface="+mn-lt"/>
-                <a:ea typeface="+mn-ea"/>
-                <a:cs typeface="+mn-cs"/>
-              </a:defRPr>
-            </a:lvl6pPr>
-            <a:lvl7pPr marL="2971800" indent="-228600" algn="l" defTabSz="914400" rtl="0" eaLnBrk="1" latinLnBrk="0" hangingPunct="1">
-              <a:lnSpc>
-                <a:spcPct val="90000"/>
-              </a:lnSpc>
-              <a:spcBef>
-                <a:spcPts val="500"/>
-              </a:spcBef>
-              <a:buFont typeface="Arial" panose="020B0604020202020204" pitchFamily="34" charset="0"/>
-              <a:buChar char="•"/>
-              <a:defRPr sz="1800" kern="1200">
-                <a:solidFill>
-                  <a:schemeClr val="tx1"/>
-                </a:solidFill>
-                <a:latin typeface="+mn-lt"/>
-                <a:ea typeface="+mn-ea"/>
-                <a:cs typeface="+mn-cs"/>
-              </a:defRPr>
-            </a:lvl7pPr>
-            <a:lvl8pPr marL="3429000" indent="-228600" algn="l" defTabSz="914400" rtl="0" eaLnBrk="1" latinLnBrk="0" hangingPunct="1">
-              <a:lnSpc>
-                <a:spcPct val="90000"/>
-              </a:lnSpc>
-              <a:spcBef>
-                <a:spcPts val="500"/>
-              </a:spcBef>
-              <a:buFont typeface="Arial" panose="020B0604020202020204" pitchFamily="34" charset="0"/>
-              <a:buChar char="•"/>
-              <a:defRPr sz="1800" kern="1200">
-                <a:solidFill>
-                  <a:schemeClr val="tx1"/>
-                </a:solidFill>
-                <a:latin typeface="+mn-lt"/>
-                <a:ea typeface="+mn-ea"/>
-                <a:cs typeface="+mn-cs"/>
-              </a:defRPr>
-            </a:lvl8pPr>
-            <a:lvl9pPr marL="3886200" indent="-228600" algn="l" defTabSz="914400" rtl="0" eaLnBrk="1" latinLnBrk="0" hangingPunct="1">
-              <a:lnSpc>
-                <a:spcPct val="90000"/>
-              </a:lnSpc>
-              <a:spcBef>
-                <a:spcPts val="500"/>
-              </a:spcBef>
-              <a:buFont typeface="Arial" panose="020B0604020202020204" pitchFamily="34" charset="0"/>
-              <a:buChar char="•"/>
-              <a:defRPr sz="1800" kern="1200">
-                <a:solidFill>
-                  <a:schemeClr val="tx1"/>
-                </a:solidFill>
-                <a:latin typeface="+mn-lt"/>
-                <a:ea typeface="+mn-ea"/>
-                <a:cs typeface="+mn-cs"/>
-              </a:defRPr>
-            </a:lvl9pPr>
-          </a:lstStyle>
-          <a:p>
-            <a:r>
-              <a:rPr lang="es-MX"/>
-              <a:t>h</a:t>
-            </a:r>
-            <a:endParaRPr lang="es-MX" dirty="0"/>
-          </a:p>
-        </p:txBody>
-      </p:sp>
+      </p:pic>
     </p:spTree>
     <p:extLst>
       <p:ext uri="{BB962C8B-B14F-4D97-AF65-F5344CB8AC3E}">
-        <p14:creationId xmlns:p14="http://schemas.microsoft.com/office/powerpoint/2010/main" val="1511085981"/>
+        <p14:creationId xmlns:p14="http://schemas.microsoft.com/office/powerpoint/2010/main" val="3994772602"/>
       </p:ext>
     </p:extLst>
   </p:cSld>
@@ -16435,7 +15269,10 @@
           <a:bodyPr/>
           <a:lstStyle/>
           <a:p>
-            <a:endParaRPr lang="es-MX"/>
+            <a:r>
+              <a:rPr lang="es-MX" dirty="0"/>
+              <a:t>Modelo</a:t>
+            </a:r>
           </a:p>
         </p:txBody>
       </p:sp>
@@ -16455,12 +15292,58 @@
             <p:ph type="body" sz="quarter" idx="11"/>
           </p:nvPr>
         </p:nvSpPr>
-        <p:spPr/>
+        <p:spPr>
+          <a:xfrm>
+            <a:off x="741434" y="2217729"/>
+            <a:ext cx="5164065" cy="3030545"/>
+          </a:xfrm>
+        </p:spPr>
         <p:txBody>
           <a:bodyPr/>
           <a:lstStyle/>
           <a:p>
-            <a:endParaRPr lang="es-MX"/>
+            <a:pPr marL="285750" indent="-285750" algn="just">
+              <a:buFontTx/>
+              <a:buChar char="-"/>
+            </a:pPr>
+            <a:r>
+              <a:rPr lang="es-MX" sz="2000" dirty="0"/>
+              <a:t>Las CNN son muy útiles para predecir una etiqueta en base a Matrices de pixeles.</a:t>
+            </a:r>
+          </a:p>
+          <a:p>
+            <a:pPr marL="285750" indent="-285750" algn="just">
+              <a:buFontTx/>
+              <a:buChar char="-"/>
+            </a:pPr>
+            <a:r>
+              <a:rPr lang="es-MX" sz="2000" dirty="0"/>
+              <a:t>Para este ejercicio, se usó la estructura </a:t>
+            </a:r>
+            <a:r>
+              <a:rPr lang="es-MX" sz="2000" i="1" u="sng" dirty="0"/>
+              <a:t>Resnet-26D</a:t>
+            </a:r>
+            <a:r>
+              <a:rPr lang="es-MX" sz="2000" dirty="0"/>
+              <a:t>, (Residual Neural Network) que proporciona la librería </a:t>
+            </a:r>
+            <a:r>
+              <a:rPr lang="es-MX" sz="2000" dirty="0" err="1"/>
+              <a:t>FastAI</a:t>
+            </a:r>
+            <a:r>
+              <a:rPr lang="es-MX" sz="2000" dirty="0"/>
+              <a:t>, la cual ya viene </a:t>
+            </a:r>
+            <a:r>
+              <a:rPr lang="es-MX" sz="2000" dirty="0" err="1"/>
+              <a:t>pre-entrenada</a:t>
+            </a:r>
+            <a:r>
+              <a:rPr lang="es-MX" sz="2000" dirty="0"/>
+              <a:t> para imágenes.</a:t>
+            </a:r>
           </a:p>
         </p:txBody>
       </p:sp>
@@ -16495,6 +15378,53 @@
           </a:p>
         </p:txBody>
       </p:sp>
+      <p:pic>
+        <p:nvPicPr>
+          <p:cNvPr id="3074" name="Picture 2">
+            <a:extLst>
+              <a:ext uri="{FF2B5EF4-FFF2-40B4-BE49-F238E27FC236}">
+                <a16:creationId xmlns:a16="http://schemas.microsoft.com/office/drawing/2014/main" id="{3A4D09D5-AB78-1CAB-58B8-5AE1080E913D}"/>
+              </a:ext>
+            </a:extLst>
+          </p:cNvPr>
+          <p:cNvPicPr>
+            <a:picLocks noChangeAspect="1" noChangeArrowheads="1"/>
+          </p:cNvPicPr>
+          <p:nvPr/>
+        </p:nvPicPr>
+        <p:blipFill>
+          <a:blip r:embed="rId3">
+            <a:extLst>
+              <a:ext uri="{28A0092B-C50C-407E-A947-70E740481C1C}">
+                <a14:useLocalDpi xmlns:a14="http://schemas.microsoft.com/office/drawing/2010/main" val="0"/>
+              </a:ext>
+            </a:extLst>
+          </a:blip>
+          <a:srcRect/>
+          <a:stretch>
+            <a:fillRect/>
+          </a:stretch>
+        </p:blipFill>
+        <p:spPr bwMode="auto">
+          <a:xfrm>
+            <a:off x="7179852" y="0"/>
+            <a:ext cx="4848225" cy="6842316"/>
+          </a:xfrm>
+          <a:prstGeom prst="rect">
+            <a:avLst/>
+          </a:prstGeom>
+          <a:noFill/>
+          <a:extLst>
+            <a:ext uri="{909E8E84-426E-40DD-AFC4-6F175D3DCCD1}">
+              <a14:hiddenFill xmlns:a14="http://schemas.microsoft.com/office/drawing/2010/main">
+                <a:solidFill>
+                  <a:srgbClr val="FFFFFF"/>
+                </a:solidFill>
+              </a14:hiddenFill>
+            </a:ext>
+          </a:extLst>
+        </p:spPr>
+      </p:pic>
     </p:spTree>
     <p:extLst>
       <p:ext uri="{BB962C8B-B14F-4D97-AF65-F5344CB8AC3E}">
@@ -16527,10 +15457,62 @@
       </p:grpSpPr>
       <p:sp>
         <p:nvSpPr>
+          <p:cNvPr id="10" name="Rectángulo 9">
+            <a:extLst>
+              <a:ext uri="{FF2B5EF4-FFF2-40B4-BE49-F238E27FC236}">
+                <a16:creationId xmlns:a16="http://schemas.microsoft.com/office/drawing/2014/main" id="{B7C15985-DE54-EA79-3AFF-82FAB863F7D5}"/>
+              </a:ext>
+            </a:extLst>
+          </p:cNvPr>
+          <p:cNvSpPr/>
+          <p:nvPr/>
+        </p:nvSpPr>
+        <p:spPr>
+          <a:xfrm>
+            <a:off x="6362700" y="1812783"/>
+            <a:ext cx="2242458" cy="332366"/>
+          </a:xfrm>
+          <a:prstGeom prst="rect">
+            <a:avLst/>
+          </a:prstGeom>
+          <a:solidFill>
+            <a:srgbClr val="FFFFFF"/>
+          </a:solidFill>
+          <a:ln>
+            <a:noFill/>
+          </a:ln>
+        </p:spPr>
+        <p:style>
+          <a:lnRef idx="2">
+            <a:schemeClr val="accent1">
+              <a:shade val="50000"/>
+            </a:schemeClr>
+          </a:lnRef>
+          <a:fillRef idx="1">
+            <a:schemeClr val="accent1"/>
+          </a:fillRef>
+          <a:effectRef idx="0">
+            <a:schemeClr val="accent1"/>
+          </a:effectRef>
+          <a:fontRef idx="minor">
+            <a:schemeClr val="lt1"/>
+          </a:fontRef>
+        </p:style>
+        <p:txBody>
+          <a:bodyPr rtlCol="0" anchor="ctr"/>
+          <a:lstStyle/>
+          <a:p>
+            <a:pPr algn="ctr"/>
+            <a:endParaRPr lang="es-MX"/>
+          </a:p>
+        </p:txBody>
+      </p:sp>
+      <p:sp>
+        <p:nvSpPr>
           <p:cNvPr id="3" name="Título 2">
             <a:extLst>
               <a:ext uri="{FF2B5EF4-FFF2-40B4-BE49-F238E27FC236}">
-                <a16:creationId xmlns:a16="http://schemas.microsoft.com/office/drawing/2014/main" id="{3CA8A120-A0F5-BCE0-20CD-84A0849EBB53}"/>
+                <a16:creationId xmlns:a16="http://schemas.microsoft.com/office/drawing/2014/main" id="{5655B88C-2516-4304-A06E-0B6D230DBCEE}"/>
               </a:ext>
             </a:extLst>
           </p:cNvPr>
@@ -16541,21 +15523,31 @@
             <p:ph type="title"/>
           </p:nvPr>
         </p:nvSpPr>
-        <p:spPr/>
+        <p:spPr>
+          <a:xfrm>
+            <a:off x="964023" y="879063"/>
+            <a:ext cx="4941477" cy="610863"/>
+          </a:xfrm>
+        </p:spPr>
         <p:txBody>
-          <a:bodyPr/>
+          <a:bodyPr anchor="b">
+            <a:normAutofit/>
+          </a:bodyPr>
           <a:lstStyle/>
           <a:p>
-            <a:endParaRPr lang="es-MX"/>
+            <a:r>
+              <a:rPr lang="es-MX" dirty="0"/>
+              <a:t>Evaluación</a:t>
+            </a:r>
           </a:p>
         </p:txBody>
       </p:sp>
       <p:sp>
         <p:nvSpPr>
-          <p:cNvPr id="4" name="Marcador de texto 3">
-            <a:extLst>
-              <a:ext uri="{FF2B5EF4-FFF2-40B4-BE49-F238E27FC236}">
-                <a16:creationId xmlns:a16="http://schemas.microsoft.com/office/drawing/2014/main" id="{92936A34-2D94-C70C-4498-6D949A584EA0}"/>
+          <p:cNvPr id="18" name="Content Placeholder 4">
+            <a:extLst>
+              <a:ext uri="{FF2B5EF4-FFF2-40B4-BE49-F238E27FC236}">
+                <a16:creationId xmlns:a16="http://schemas.microsoft.com/office/drawing/2014/main" id="{4B8F0B88-7F21-ED38-4D0D-46170DB22A41}"/>
               </a:ext>
             </a:extLst>
           </p:cNvPr>
@@ -16563,15 +15555,48 @@
             <a:spLocks noGrp="1"/>
           </p:cNvSpPr>
           <p:nvPr>
-            <p:ph type="body" sz="quarter" idx="11"/>
+            <p:ph sz="half" idx="2"/>
           </p:nvPr>
         </p:nvSpPr>
-        <p:spPr/>
+        <p:spPr>
+          <a:xfrm>
+            <a:off x="964023" y="2300984"/>
+            <a:ext cx="5131977" cy="2440300"/>
+          </a:xfrm>
+        </p:spPr>
         <p:txBody>
           <a:bodyPr/>
           <a:lstStyle/>
           <a:p>
-            <a:endParaRPr lang="es-MX"/>
+            <a:pPr algn="just"/>
+            <a:r>
+              <a:rPr lang="es-MX" dirty="0"/>
+              <a:t>Para este modelo usaremos como métrica de evaluación el </a:t>
+            </a:r>
+            <a:r>
+              <a:rPr lang="es-MX" b="1" i="1" dirty="0" err="1"/>
+              <a:t>Recall</a:t>
+            </a:r>
+            <a:r>
+              <a:rPr lang="es-MX" dirty="0"/>
+              <a:t>, debido a que los </a:t>
+            </a:r>
+            <a:r>
+              <a:rPr lang="es-MX" b="1" i="1" dirty="0"/>
+              <a:t>False-Negatives</a:t>
+            </a:r>
+            <a:r>
+              <a:rPr lang="es-MX" dirty="0"/>
+              <a:t> nos afectan mucho.</a:t>
+            </a:r>
+          </a:p>
+          <a:p>
+            <a:pPr algn="just"/>
+            <a:r>
+              <a:rPr lang="es-MX" dirty="0"/>
+              <a:t> El modelo puede identificar correctamente el 97.14% de los enfermos de manera correcta, el 2.86% restante son False-Negatives (enfermos que se clasifican como no enfermos).</a:t>
+            </a:r>
+            <a:endParaRPr lang="en-US" dirty="0"/>
           </a:p>
         </p:txBody>
       </p:sp>
@@ -16580,7 +15605,7 @@
           <p:cNvPr id="7" name="Marcador de número de diapositiva 6">
             <a:extLst>
               <a:ext uri="{FF2B5EF4-FFF2-40B4-BE49-F238E27FC236}">
-                <a16:creationId xmlns:a16="http://schemas.microsoft.com/office/drawing/2014/main" id="{C21CBD27-EBAE-1277-0B7D-91C35B427B26}"/>
+                <a16:creationId xmlns:a16="http://schemas.microsoft.com/office/drawing/2014/main" id="{E0B2C963-0E09-5011-BBEE-4E5F11C3B42B}"/>
               </a:ext>
             </a:extLst>
           </p:cNvPr>
@@ -16591,25 +15616,350 @@
             <p:ph type="sldNum" sz="quarter" idx="16"/>
           </p:nvPr>
         </p:nvSpPr>
-        <p:spPr/>
+        <p:spPr>
+          <a:xfrm>
+            <a:off x="971550" y="6332220"/>
+            <a:ext cx="523240" cy="247651"/>
+          </a:xfrm>
+        </p:spPr>
         <p:txBody>
-          <a:bodyPr/>
+          <a:bodyPr anchor="t">
+            <a:normAutofit/>
+          </a:bodyPr>
           <a:lstStyle/>
           <a:p>
-            <a:pPr rtl="0"/>
+            <a:pPr rtl="0">
+              <a:spcAft>
+                <a:spcPts val="600"/>
+              </a:spcAft>
+            </a:pPr>
             <a:fld id="{294A09A9-5501-47C1-A89A-A340965A2BE2}" type="slidenum">
               <a:rPr lang="es-ES" noProof="0" smtClean="0"/>
-              <a:pPr rtl="0"/>
+              <a:pPr rtl="0">
+                <a:spcAft>
+                  <a:spcPts val="600"/>
+                </a:spcAft>
+              </a:pPr>
               <a:t>6</a:t>
             </a:fld>
-            <a:endParaRPr lang="es-ES" noProof="0" dirty="0"/>
+            <a:endParaRPr lang="es-ES" noProof="0"/>
           </a:p>
         </p:txBody>
       </p:sp>
+      <p:sp>
+        <p:nvSpPr>
+          <p:cNvPr id="13" name="CuadroTexto 12">
+            <a:extLst>
+              <a:ext uri="{FF2B5EF4-FFF2-40B4-BE49-F238E27FC236}">
+                <a16:creationId xmlns:a16="http://schemas.microsoft.com/office/drawing/2014/main" id="{BC051A7B-3E81-613A-85BE-FE1239EC83D9}"/>
+              </a:ext>
+            </a:extLst>
+          </p:cNvPr>
+          <p:cNvSpPr txBox="1"/>
+          <p:nvPr/>
+        </p:nvSpPr>
+        <p:spPr>
+          <a:xfrm>
+            <a:off x="1013414" y="4555938"/>
+            <a:ext cx="6470515" cy="861774"/>
+          </a:xfrm>
+          <a:prstGeom prst="rect">
+            <a:avLst/>
+          </a:prstGeom>
+          <a:noFill/>
+        </p:spPr>
+        <p:txBody>
+          <a:bodyPr wrap="square">
+            <a:spAutoFit/>
+          </a:bodyPr>
+          <a:lstStyle/>
+          <a:p>
+            <a:r>
+              <a:rPr lang="es-MX" dirty="0">
+                <a:solidFill>
+                  <a:schemeClr val="bg1"/>
+                </a:solidFill>
+              </a:rPr>
+              <a:t>FALSE-NEGATIVE: </a:t>
+            </a:r>
+          </a:p>
+          <a:p>
+            <a:r>
+              <a:rPr lang="es-MX" sz="1600" dirty="0">
+                <a:solidFill>
+                  <a:schemeClr val="bg1"/>
+                </a:solidFill>
+              </a:rPr>
+              <a:t>- Son cuando se predice 0 (No </a:t>
+            </a:r>
+            <a:r>
+              <a:rPr lang="es-MX" sz="1600" dirty="0" err="1">
+                <a:solidFill>
+                  <a:schemeClr val="bg1"/>
+                </a:solidFill>
+              </a:rPr>
+              <a:t>enferno</a:t>
+            </a:r>
+            <a:r>
+              <a:rPr lang="es-MX" sz="1600" dirty="0">
+                <a:solidFill>
+                  <a:schemeClr val="bg1"/>
+                </a:solidFill>
+              </a:rPr>
+              <a:t>) y en realidad era 1 (enfermo).</a:t>
+            </a:r>
+          </a:p>
+          <a:p>
+            <a:r>
+              <a:rPr lang="es-MX" sz="1600" dirty="0">
+                <a:solidFill>
+                  <a:schemeClr val="bg1"/>
+                </a:solidFill>
+              </a:rPr>
+              <a:t>- Esto puede ocasionar que un paciente enfermo no reciba tratamiento.</a:t>
+            </a:r>
+          </a:p>
+        </p:txBody>
+      </p:sp>
+      <p:grpSp>
+        <p:nvGrpSpPr>
+          <p:cNvPr id="22" name="Grupo 21">
+            <a:extLst>
+              <a:ext uri="{FF2B5EF4-FFF2-40B4-BE49-F238E27FC236}">
+                <a16:creationId xmlns:a16="http://schemas.microsoft.com/office/drawing/2014/main" id="{594FD9E7-AC95-C3E0-137A-3EF8E9EFEF38}"/>
+              </a:ext>
+            </a:extLst>
+          </p:cNvPr>
+          <p:cNvGrpSpPr/>
+          <p:nvPr/>
+        </p:nvGrpSpPr>
+        <p:grpSpPr>
+          <a:xfrm>
+            <a:off x="6605891" y="1767806"/>
+            <a:ext cx="4191637" cy="2731436"/>
+            <a:chOff x="6096001" y="2577830"/>
+            <a:chExt cx="3164732" cy="2062264"/>
+          </a:xfrm>
+        </p:grpSpPr>
+        <p:sp>
+          <p:nvSpPr>
+            <p:cNvPr id="20" name="Rectángulo 19">
+              <a:extLst>
+                <a:ext uri="{FF2B5EF4-FFF2-40B4-BE49-F238E27FC236}">
+                  <a16:creationId xmlns:a16="http://schemas.microsoft.com/office/drawing/2014/main" id="{974917BE-D60E-834F-92AD-07FA25A46466}"/>
+                </a:ext>
+              </a:extLst>
+            </p:cNvPr>
+            <p:cNvSpPr/>
+            <p:nvPr/>
+          </p:nvSpPr>
+          <p:spPr>
+            <a:xfrm>
+              <a:off x="6096001" y="2577830"/>
+              <a:ext cx="3164732" cy="2062264"/>
+            </a:xfrm>
+            <a:prstGeom prst="rect">
+              <a:avLst/>
+            </a:prstGeom>
+            <a:solidFill>
+              <a:srgbClr val="2B2B2B"/>
+            </a:solidFill>
+          </p:spPr>
+          <p:style>
+            <a:lnRef idx="2">
+              <a:schemeClr val="accent1">
+                <a:shade val="50000"/>
+              </a:schemeClr>
+            </a:lnRef>
+            <a:fillRef idx="1">
+              <a:schemeClr val="accent1"/>
+            </a:fillRef>
+            <a:effectRef idx="0">
+              <a:schemeClr val="accent1"/>
+            </a:effectRef>
+            <a:fontRef idx="minor">
+              <a:schemeClr val="lt1"/>
+            </a:fontRef>
+          </p:style>
+          <p:txBody>
+            <a:bodyPr rtlCol="0" anchor="ctr"/>
+            <a:lstStyle/>
+            <a:p>
+              <a:pPr algn="ctr"/>
+              <a:endParaRPr lang="es-MX"/>
+            </a:p>
+          </p:txBody>
+        </p:sp>
+        <p:pic>
+          <p:nvPicPr>
+            <p:cNvPr id="9" name="Imagen 8" descr="Interfaz de usuario gráfica, Aplicación&#10;&#10;Descripción generada automáticamente">
+              <a:extLst>
+                <a:ext uri="{FF2B5EF4-FFF2-40B4-BE49-F238E27FC236}">
+                  <a16:creationId xmlns:a16="http://schemas.microsoft.com/office/drawing/2014/main" id="{73341696-0F2B-77B0-7E42-0D93357FCD60}"/>
+                </a:ext>
+              </a:extLst>
+            </p:cNvPr>
+            <p:cNvPicPr>
+              <a:picLocks noChangeAspect="1"/>
+            </p:cNvPicPr>
+            <p:nvPr/>
+          </p:nvPicPr>
+          <p:blipFill rotWithShape="1">
+            <a:blip r:embed="rId2">
+              <a:extLst>
+                <a:ext uri="{28A0092B-C50C-407E-A947-70E740481C1C}">
+                  <a14:useLocalDpi xmlns:a14="http://schemas.microsoft.com/office/drawing/2010/main" val="0"/>
+                </a:ext>
+              </a:extLst>
+            </a:blip>
+            <a:srcRect l="57550" r="24075" b="61736"/>
+            <a:stretch/>
+          </p:blipFill>
+          <p:spPr>
+            <a:xfrm>
+              <a:off x="6404273" y="3503050"/>
+              <a:ext cx="1229103" cy="683046"/>
+            </a:xfrm>
+            <a:prstGeom prst="rect">
+              <a:avLst/>
+            </a:prstGeom>
+            <a:noFill/>
+          </p:spPr>
+        </p:pic>
+        <p:grpSp>
+          <p:nvGrpSpPr>
+            <p:cNvPr id="19" name="Grupo 18">
+              <a:extLst>
+                <a:ext uri="{FF2B5EF4-FFF2-40B4-BE49-F238E27FC236}">
+                  <a16:creationId xmlns:a16="http://schemas.microsoft.com/office/drawing/2014/main" id="{E726E779-7199-A00A-E9FA-2B5DDCB20207}"/>
+                </a:ext>
+              </a:extLst>
+            </p:cNvPr>
+            <p:cNvGrpSpPr/>
+            <p:nvPr/>
+          </p:nvGrpSpPr>
+          <p:grpSpPr>
+            <a:xfrm>
+              <a:off x="6404274" y="3022585"/>
+              <a:ext cx="2337071" cy="332366"/>
+              <a:chOff x="5905500" y="3027339"/>
+              <a:chExt cx="2337071" cy="332366"/>
+            </a:xfrm>
+          </p:grpSpPr>
+          <p:pic>
+            <p:nvPicPr>
+              <p:cNvPr id="15" name="Imagen 14" descr="Interfaz de usuario gráfica, Aplicación&#10;&#10;Descripción generada automáticamente">
+                <a:extLst>
+                  <a:ext uri="{FF2B5EF4-FFF2-40B4-BE49-F238E27FC236}">
+                    <a16:creationId xmlns:a16="http://schemas.microsoft.com/office/drawing/2014/main" id="{55FC79B6-ADB2-A44F-2CD0-34751B7E31E0}"/>
+                  </a:ext>
+                </a:extLst>
+              </p:cNvPr>
+              <p:cNvPicPr>
+                <a:picLocks noChangeAspect="1"/>
+              </p:cNvPicPr>
+              <p:nvPr/>
+            </p:nvPicPr>
+            <p:blipFill rotWithShape="1">
+              <a:blip r:embed="rId2">
+                <a:extLst>
+                  <a:ext uri="{28A0092B-C50C-407E-A947-70E740481C1C}">
+                    <a14:useLocalDpi xmlns:a14="http://schemas.microsoft.com/office/drawing/2010/main" val="0"/>
+                  </a:ext>
+                </a:extLst>
+              </a:blip>
+              <a:srcRect l="10611" t="81381" r="69838"/>
+              <a:stretch/>
+            </p:blipFill>
+            <p:spPr>
+              <a:xfrm>
+                <a:off x="5905500" y="3027339"/>
+                <a:ext cx="1229103" cy="332366"/>
+              </a:xfrm>
+              <a:prstGeom prst="rect">
+                <a:avLst/>
+              </a:prstGeom>
+              <a:noFill/>
+            </p:spPr>
+          </p:pic>
+          <p:pic>
+            <p:nvPicPr>
+              <p:cNvPr id="17" name="Imagen 16" descr="Interfaz de usuario gráfica, Aplicación&#10;&#10;Descripción generada automáticamente">
+                <a:extLst>
+                  <a:ext uri="{FF2B5EF4-FFF2-40B4-BE49-F238E27FC236}">
+                    <a16:creationId xmlns:a16="http://schemas.microsoft.com/office/drawing/2014/main" id="{86418568-6522-DECE-7808-0F326774A45E}"/>
+                  </a:ext>
+                </a:extLst>
+              </p:cNvPr>
+              <p:cNvPicPr>
+                <a:picLocks noChangeAspect="1"/>
+              </p:cNvPicPr>
+              <p:nvPr/>
+            </p:nvPicPr>
+            <p:blipFill rotWithShape="1">
+              <a:blip r:embed="rId2">
+                <a:extLst>
+                  <a:ext uri="{28A0092B-C50C-407E-A947-70E740481C1C}">
+                    <a14:useLocalDpi xmlns:a14="http://schemas.microsoft.com/office/drawing/2010/main" val="0"/>
+                  </a:ext>
+                </a:extLst>
+              </a:blip>
+              <a:srcRect l="79213" t="81381" r="3162"/>
+              <a:stretch/>
+            </p:blipFill>
+            <p:spPr>
+              <a:xfrm>
+                <a:off x="7134603" y="3033206"/>
+                <a:ext cx="1107968" cy="326499"/>
+              </a:xfrm>
+              <a:prstGeom prst="rect">
+                <a:avLst/>
+              </a:prstGeom>
+              <a:noFill/>
+            </p:spPr>
+          </p:pic>
+        </p:grpSp>
+        <p:pic>
+          <p:nvPicPr>
+            <p:cNvPr id="21" name="Imagen 20" descr="Interfaz de usuario gráfica, Aplicación&#10;&#10;Descripción generada automáticamente">
+              <a:extLst>
+                <a:ext uri="{FF2B5EF4-FFF2-40B4-BE49-F238E27FC236}">
+                  <a16:creationId xmlns:a16="http://schemas.microsoft.com/office/drawing/2014/main" id="{D8D82EA2-E408-2798-B9C2-076FABDCFDA4}"/>
+                </a:ext>
+              </a:extLst>
+            </p:cNvPr>
+            <p:cNvPicPr>
+              <a:picLocks noChangeAspect="1"/>
+            </p:cNvPicPr>
+            <p:nvPr/>
+          </p:nvPicPr>
+          <p:blipFill rotWithShape="1">
+            <a:blip r:embed="rId2">
+              <a:extLst>
+                <a:ext uri="{28A0092B-C50C-407E-A947-70E740481C1C}">
+                  <a14:useLocalDpi xmlns:a14="http://schemas.microsoft.com/office/drawing/2010/main" val="0"/>
+                </a:ext>
+              </a:extLst>
+            </a:blip>
+            <a:srcRect l="57550" t="42197" r="24075" b="28044"/>
+            <a:stretch/>
+          </p:blipFill>
+          <p:spPr>
+            <a:xfrm>
+              <a:off x="7703668" y="3578966"/>
+              <a:ext cx="1107969" cy="531213"/>
+            </a:xfrm>
+            <a:prstGeom prst="rect">
+              <a:avLst/>
+            </a:prstGeom>
+            <a:noFill/>
+          </p:spPr>
+        </p:pic>
+      </p:grpSp>
     </p:spTree>
     <p:extLst>
       <p:ext uri="{BB962C8B-B14F-4D97-AF65-F5344CB8AC3E}">
-        <p14:creationId xmlns:p14="http://schemas.microsoft.com/office/powerpoint/2010/main" val="3724584205"/>
+        <p14:creationId xmlns:p14="http://schemas.microsoft.com/office/powerpoint/2010/main" val="2198531783"/>
       </p:ext>
     </p:extLst>
   </p:cSld>
@@ -16654,35 +16004,15 @@
         </p:nvSpPr>
         <p:spPr/>
         <p:txBody>
-          <a:bodyPr/>
+          <a:bodyPr>
+            <a:normAutofit fontScale="90000"/>
+          </a:bodyPr>
           <a:lstStyle/>
           <a:p>
-            <a:endParaRPr lang="es-MX"/>
-          </a:p>
-        </p:txBody>
-      </p:sp>
-      <p:sp>
-        <p:nvSpPr>
-          <p:cNvPr id="4" name="Marcador de texto 3">
-            <a:extLst>
-              <a:ext uri="{FF2B5EF4-FFF2-40B4-BE49-F238E27FC236}">
-                <a16:creationId xmlns:a16="http://schemas.microsoft.com/office/drawing/2014/main" id="{92936A34-2D94-C70C-4498-6D949A584EA0}"/>
-              </a:ext>
-            </a:extLst>
-          </p:cNvPr>
-          <p:cNvSpPr>
-            <a:spLocks noGrp="1"/>
-          </p:cNvSpPr>
-          <p:nvPr>
-            <p:ph type="body" sz="quarter" idx="11"/>
-          </p:nvPr>
-        </p:nvSpPr>
-        <p:spPr/>
-        <p:txBody>
-          <a:bodyPr/>
-          <a:lstStyle/>
-          <a:p>
-            <a:endParaRPr lang="es-MX"/>
+            <a:r>
+              <a:rPr lang="es-MX" dirty="0"/>
+              <a:t>Probando el Modelo</a:t>
+            </a:r>
           </a:p>
         </p:txBody>
       </p:sp>
@@ -16717,10 +16047,228 @@
           </a:p>
         </p:txBody>
       </p:sp>
+      <p:pic>
+        <p:nvPicPr>
+          <p:cNvPr id="5" name="Imagen 4">
+            <a:extLst>
+              <a:ext uri="{FF2B5EF4-FFF2-40B4-BE49-F238E27FC236}">
+                <a16:creationId xmlns:a16="http://schemas.microsoft.com/office/drawing/2014/main" id="{8BC1C7D9-257C-EC8B-C70F-10A62FF57DED}"/>
+              </a:ext>
+            </a:extLst>
+          </p:cNvPr>
+          <p:cNvPicPr>
+            <a:picLocks noChangeAspect="1"/>
+          </p:cNvPicPr>
+          <p:nvPr/>
+        </p:nvPicPr>
+        <p:blipFill>
+          <a:blip r:embed="rId2"/>
+          <a:stretch>
+            <a:fillRect/>
+          </a:stretch>
+        </p:blipFill>
+        <p:spPr>
+          <a:xfrm>
+            <a:off x="971550" y="2477748"/>
+            <a:ext cx="4787832" cy="2613725"/>
+          </a:xfrm>
+          <a:prstGeom prst="rect">
+            <a:avLst/>
+          </a:prstGeom>
+        </p:spPr>
+      </p:pic>
+      <p:grpSp>
+        <p:nvGrpSpPr>
+          <p:cNvPr id="10" name="Grupo 9">
+            <a:extLst>
+              <a:ext uri="{FF2B5EF4-FFF2-40B4-BE49-F238E27FC236}">
+                <a16:creationId xmlns:a16="http://schemas.microsoft.com/office/drawing/2014/main" id="{F45C9B38-3E29-8590-F477-E0B19BDA7B93}"/>
+              </a:ext>
+            </a:extLst>
+          </p:cNvPr>
+          <p:cNvGrpSpPr/>
+          <p:nvPr/>
+        </p:nvGrpSpPr>
+        <p:grpSpPr>
+          <a:xfrm>
+            <a:off x="1040844" y="5210358"/>
+            <a:ext cx="4787833" cy="1093170"/>
+            <a:chOff x="2852284" y="2281078"/>
+            <a:chExt cx="6487431" cy="1481222"/>
+          </a:xfrm>
+        </p:grpSpPr>
+        <p:pic>
+          <p:nvPicPr>
+            <p:cNvPr id="8" name="Imagen 7">
+              <a:extLst>
+                <a:ext uri="{FF2B5EF4-FFF2-40B4-BE49-F238E27FC236}">
+                  <a16:creationId xmlns:a16="http://schemas.microsoft.com/office/drawing/2014/main" id="{19E491F0-A7D2-AACA-41F4-04BC2D86254F}"/>
+                </a:ext>
+              </a:extLst>
+            </p:cNvPr>
+            <p:cNvPicPr>
+              <a:picLocks noChangeAspect="1"/>
+            </p:cNvPicPr>
+            <p:nvPr/>
+          </p:nvPicPr>
+          <p:blipFill rotWithShape="1">
+            <a:blip r:embed="rId3"/>
+            <a:srcRect b="58262"/>
+            <a:stretch/>
+          </p:blipFill>
+          <p:spPr>
+            <a:xfrm>
+              <a:off x="2852285" y="2281078"/>
+              <a:ext cx="6487430" cy="958234"/>
+            </a:xfrm>
+            <a:prstGeom prst="rect">
+              <a:avLst/>
+            </a:prstGeom>
+          </p:spPr>
+        </p:pic>
+        <p:pic>
+          <p:nvPicPr>
+            <p:cNvPr id="9" name="Imagen 8">
+              <a:extLst>
+                <a:ext uri="{FF2B5EF4-FFF2-40B4-BE49-F238E27FC236}">
+                  <a16:creationId xmlns:a16="http://schemas.microsoft.com/office/drawing/2014/main" id="{F926632F-18FB-8344-25DD-2D7401B34A75}"/>
+                </a:ext>
+              </a:extLst>
+            </p:cNvPr>
+            <p:cNvPicPr>
+              <a:picLocks noChangeAspect="1"/>
+            </p:cNvPicPr>
+            <p:nvPr/>
+          </p:nvPicPr>
+          <p:blipFill rotWithShape="1">
+            <a:blip r:embed="rId3"/>
+            <a:srcRect l="1" t="84983" r="44823" b="1585"/>
+            <a:stretch/>
+          </p:blipFill>
+          <p:spPr>
+            <a:xfrm>
+              <a:off x="2852284" y="3203420"/>
+              <a:ext cx="6487430" cy="558880"/>
+            </a:xfrm>
+            <a:prstGeom prst="rect">
+              <a:avLst/>
+            </a:prstGeom>
+          </p:spPr>
+        </p:pic>
+      </p:grpSp>
+      <p:pic>
+        <p:nvPicPr>
+          <p:cNvPr id="12" name="Imagen 11">
+            <a:extLst>
+              <a:ext uri="{FF2B5EF4-FFF2-40B4-BE49-F238E27FC236}">
+                <a16:creationId xmlns:a16="http://schemas.microsoft.com/office/drawing/2014/main" id="{83C14DC8-A2A1-65CE-93A9-B2016AAE0E59}"/>
+              </a:ext>
+            </a:extLst>
+          </p:cNvPr>
+          <p:cNvPicPr>
+            <a:picLocks noChangeAspect="1"/>
+          </p:cNvPicPr>
+          <p:nvPr/>
+        </p:nvPicPr>
+        <p:blipFill>
+          <a:blip r:embed="rId4"/>
+          <a:stretch>
+            <a:fillRect/>
+          </a:stretch>
+        </p:blipFill>
+        <p:spPr>
+          <a:xfrm>
+            <a:off x="6643989" y="1804611"/>
+            <a:ext cx="4182896" cy="3286862"/>
+          </a:xfrm>
+          <a:prstGeom prst="rect">
+            <a:avLst/>
+          </a:prstGeom>
+        </p:spPr>
+      </p:pic>
+      <p:grpSp>
+        <p:nvGrpSpPr>
+          <p:cNvPr id="16" name="Grupo 15">
+            <a:extLst>
+              <a:ext uri="{FF2B5EF4-FFF2-40B4-BE49-F238E27FC236}">
+                <a16:creationId xmlns:a16="http://schemas.microsoft.com/office/drawing/2014/main" id="{0A465EED-2988-404D-7A5A-6D806067E86B}"/>
+              </a:ext>
+            </a:extLst>
+          </p:cNvPr>
+          <p:cNvGrpSpPr/>
+          <p:nvPr/>
+        </p:nvGrpSpPr>
+        <p:grpSpPr>
+          <a:xfrm>
+            <a:off x="6707936" y="5210355"/>
+            <a:ext cx="4045272" cy="1126258"/>
+            <a:chOff x="3162102" y="2281077"/>
+            <a:chExt cx="5853718" cy="1629755"/>
+          </a:xfrm>
+        </p:grpSpPr>
+        <p:pic>
+          <p:nvPicPr>
+            <p:cNvPr id="14" name="Imagen 13">
+              <a:extLst>
+                <a:ext uri="{FF2B5EF4-FFF2-40B4-BE49-F238E27FC236}">
+                  <a16:creationId xmlns:a16="http://schemas.microsoft.com/office/drawing/2014/main" id="{A58FD950-D221-3487-4DE3-F5AB92AB7968}"/>
+                </a:ext>
+              </a:extLst>
+            </p:cNvPr>
+            <p:cNvPicPr>
+              <a:picLocks noChangeAspect="1"/>
+            </p:cNvPicPr>
+            <p:nvPr/>
+          </p:nvPicPr>
+          <p:blipFill rotWithShape="1">
+            <a:blip r:embed="rId5"/>
+            <a:srcRect b="55297"/>
+            <a:stretch/>
+          </p:blipFill>
+          <p:spPr>
+            <a:xfrm>
+              <a:off x="3176180" y="2281077"/>
+              <a:ext cx="5839640" cy="1026327"/>
+            </a:xfrm>
+            <a:prstGeom prst="rect">
+              <a:avLst/>
+            </a:prstGeom>
+          </p:spPr>
+        </p:pic>
+        <p:pic>
+          <p:nvPicPr>
+            <p:cNvPr id="15" name="Imagen 14">
+              <a:extLst>
+                <a:ext uri="{FF2B5EF4-FFF2-40B4-BE49-F238E27FC236}">
+                  <a16:creationId xmlns:a16="http://schemas.microsoft.com/office/drawing/2014/main" id="{CBEA3B1A-11C9-F00E-352E-5D5AA1E6DA31}"/>
+                </a:ext>
+              </a:extLst>
+            </p:cNvPr>
+            <p:cNvPicPr>
+              <a:picLocks noChangeAspect="1"/>
+            </p:cNvPicPr>
+            <p:nvPr/>
+          </p:nvPicPr>
+          <p:blipFill rotWithShape="1">
+            <a:blip r:embed="rId5"/>
+            <a:srcRect l="-108" t="87114" r="45381" b="-1342"/>
+            <a:stretch/>
+          </p:blipFill>
+          <p:spPr>
+            <a:xfrm>
+              <a:off x="3162102" y="3313975"/>
+              <a:ext cx="5839640" cy="596857"/>
+            </a:xfrm>
+            <a:prstGeom prst="rect">
+              <a:avLst/>
+            </a:prstGeom>
+          </p:spPr>
+        </p:pic>
+      </p:grpSp>
     </p:spTree>
     <p:extLst>
       <p:ext uri="{BB962C8B-B14F-4D97-AF65-F5344CB8AC3E}">
-        <p14:creationId xmlns:p14="http://schemas.microsoft.com/office/powerpoint/2010/main" val="3730588438"/>
+        <p14:creationId xmlns:p14="http://schemas.microsoft.com/office/powerpoint/2010/main" val="3724584205"/>
       </p:ext>
     </p:extLst>
   </p:cSld>
@@ -16768,7 +16316,10 @@
           <a:bodyPr/>
           <a:lstStyle/>
           <a:p>
-            <a:endParaRPr lang="es-MX"/>
+            <a:r>
+              <a:rPr lang="es-MX" dirty="0"/>
+              <a:t>Imagen</a:t>
+            </a:r>
           </a:p>
         </p:txBody>
       </p:sp>
@@ -16788,12 +16339,21 @@
             <p:ph type="body" sz="quarter" idx="11"/>
           </p:nvPr>
         </p:nvSpPr>
-        <p:spPr/>
+        <p:spPr>
+          <a:xfrm>
+            <a:off x="952499" y="2289363"/>
+            <a:ext cx="5143501" cy="706756"/>
+          </a:xfrm>
+        </p:spPr>
         <p:txBody>
           <a:bodyPr/>
           <a:lstStyle/>
           <a:p>
-            <a:endParaRPr lang="es-MX"/>
+            <a:pPr algn="just"/>
+            <a:r>
+              <a:rPr lang="es-MX" sz="2000" dirty="0"/>
+              <a:t>Se creó una imagen de Docker para poder usar nuestro modelo como un servicio.</a:t>
+            </a:r>
           </a:p>
         </p:txBody>
       </p:sp>
@@ -16828,10 +16388,40 @@
           </a:p>
         </p:txBody>
       </p:sp>
+      <p:pic>
+        <p:nvPicPr>
+          <p:cNvPr id="5" name="Imagen 4">
+            <a:extLst>
+              <a:ext uri="{FF2B5EF4-FFF2-40B4-BE49-F238E27FC236}">
+                <a16:creationId xmlns:a16="http://schemas.microsoft.com/office/drawing/2014/main" id="{25872427-4A1E-F499-CFE5-B5EB63303590}"/>
+              </a:ext>
+            </a:extLst>
+          </p:cNvPr>
+          <p:cNvPicPr>
+            <a:picLocks noChangeAspect="1"/>
+          </p:cNvPicPr>
+          <p:nvPr/>
+        </p:nvPicPr>
+        <p:blipFill>
+          <a:blip r:embed="rId2"/>
+          <a:stretch>
+            <a:fillRect/>
+          </a:stretch>
+        </p:blipFill>
+        <p:spPr>
+          <a:xfrm>
+            <a:off x="952499" y="3237192"/>
+            <a:ext cx="10487229" cy="2946133"/>
+          </a:xfrm>
+          <a:prstGeom prst="rect">
+            <a:avLst/>
+          </a:prstGeom>
+        </p:spPr>
+      </p:pic>
     </p:spTree>
     <p:extLst>
       <p:ext uri="{BB962C8B-B14F-4D97-AF65-F5344CB8AC3E}">
-        <p14:creationId xmlns:p14="http://schemas.microsoft.com/office/powerpoint/2010/main" val="1894357094"/>
+        <p14:creationId xmlns:p14="http://schemas.microsoft.com/office/powerpoint/2010/main" val="3730588438"/>
       </p:ext>
     </p:extLst>
   </p:cSld>
@@ -16879,32 +16469,10 @@
           <a:bodyPr/>
           <a:lstStyle/>
           <a:p>
-            <a:endParaRPr lang="es-MX"/>
-          </a:p>
-        </p:txBody>
-      </p:sp>
-      <p:sp>
-        <p:nvSpPr>
-          <p:cNvPr id="4" name="Marcador de texto 3">
-            <a:extLst>
-              <a:ext uri="{FF2B5EF4-FFF2-40B4-BE49-F238E27FC236}">
-                <a16:creationId xmlns:a16="http://schemas.microsoft.com/office/drawing/2014/main" id="{92936A34-2D94-C70C-4498-6D949A584EA0}"/>
-              </a:ext>
-            </a:extLst>
-          </p:cNvPr>
-          <p:cNvSpPr>
-            <a:spLocks noGrp="1"/>
-          </p:cNvSpPr>
-          <p:nvPr>
-            <p:ph type="body" sz="quarter" idx="11"/>
-          </p:nvPr>
-        </p:nvSpPr>
-        <p:spPr/>
-        <p:txBody>
-          <a:bodyPr/>
-          <a:lstStyle/>
-          <a:p>
-            <a:endParaRPr lang="es-MX"/>
+            <a:r>
+              <a:rPr lang="es-MX" dirty="0"/>
+              <a:t>Contenedores</a:t>
+            </a:r>
           </a:p>
         </p:txBody>
       </p:sp>
@@ -16939,10 +16507,74 @@
           </a:p>
         </p:txBody>
       </p:sp>
+      <p:sp>
+        <p:nvSpPr>
+          <p:cNvPr id="2" name="Marcador de texto 3">
+            <a:extLst>
+              <a:ext uri="{FF2B5EF4-FFF2-40B4-BE49-F238E27FC236}">
+                <a16:creationId xmlns:a16="http://schemas.microsoft.com/office/drawing/2014/main" id="{8BB78826-9419-C7AB-3897-15C3FEB9B3B4}"/>
+              </a:ext>
+            </a:extLst>
+          </p:cNvPr>
+          <p:cNvSpPr>
+            <a:spLocks noGrp="1"/>
+          </p:cNvSpPr>
+          <p:nvPr>
+            <p:ph type="body" sz="quarter" idx="11"/>
+          </p:nvPr>
+        </p:nvSpPr>
+        <p:spPr>
+          <a:xfrm>
+            <a:off x="952499" y="2289363"/>
+            <a:ext cx="5143501" cy="706756"/>
+          </a:xfrm>
+        </p:spPr>
+        <p:txBody>
+          <a:bodyPr/>
+          <a:lstStyle/>
+          <a:p>
+            <a:pPr algn="just"/>
+            <a:r>
+              <a:rPr lang="es-MX" sz="2000" dirty="0"/>
+              <a:t>Se crean dos contenedores para poder ejecutar nuestra imagen de Docker.</a:t>
+            </a:r>
+          </a:p>
+        </p:txBody>
+      </p:sp>
+      <p:pic>
+        <p:nvPicPr>
+          <p:cNvPr id="6" name="Imagen 5">
+            <a:extLst>
+              <a:ext uri="{FF2B5EF4-FFF2-40B4-BE49-F238E27FC236}">
+                <a16:creationId xmlns:a16="http://schemas.microsoft.com/office/drawing/2014/main" id="{33DE2A75-499D-5509-2826-5C34D77DE4EA}"/>
+              </a:ext>
+            </a:extLst>
+          </p:cNvPr>
+          <p:cNvPicPr>
+            <a:picLocks noChangeAspect="1"/>
+          </p:cNvPicPr>
+          <p:nvPr/>
+        </p:nvPicPr>
+        <p:blipFill>
+          <a:blip r:embed="rId2"/>
+          <a:stretch>
+            <a:fillRect/>
+          </a:stretch>
+        </p:blipFill>
+        <p:spPr>
+          <a:xfrm>
+            <a:off x="1054119" y="3204045"/>
+            <a:ext cx="10083761" cy="3307985"/>
+          </a:xfrm>
+          <a:prstGeom prst="rect">
+            <a:avLst/>
+          </a:prstGeom>
+        </p:spPr>
+      </p:pic>
     </p:spTree>
     <p:extLst>
       <p:ext uri="{BB962C8B-B14F-4D97-AF65-F5344CB8AC3E}">
-        <p14:creationId xmlns:p14="http://schemas.microsoft.com/office/powerpoint/2010/main" val="733852120"/>
+        <p14:creationId xmlns:p14="http://schemas.microsoft.com/office/powerpoint/2010/main" val="1894357094"/>
       </p:ext>
     </p:extLst>
   </p:cSld>
@@ -17744,6 +17376,15 @@
 </file>
 
 <file path=customXml/item1.xml><?xml version="1.0" encoding="utf-8"?>
+<p:properties xmlns:p="http://schemas.microsoft.com/office/2006/metadata/properties" xmlns:xsi="http://www.w3.org/2001/XMLSchema-instance" xmlns:pc="http://schemas.microsoft.com/office/infopath/2007/PartnerControls">
+  <documentManagement>
+    <Status xmlns="71af3243-3dd4-4a8d-8c0d-dd76da1f02a5">Not started</Status>
+    <MediaServiceKeyPoints xmlns="71af3243-3dd4-4a8d-8c0d-dd76da1f02a5" xsi:nil="true"/>
+  </documentManagement>
+</p:properties>
+</file>
+
+<file path=customXml/item2.xml><?xml version="1.0" encoding="utf-8"?>
 <ct:contentTypeSchema xmlns:ct="http://schemas.microsoft.com/office/2006/metadata/contentType" xmlns:ma="http://schemas.microsoft.com/office/2006/metadata/properties/metaAttributes" ct:_="" ma:_="" ma:contentTypeName="Document" ma:contentTypeID="0x01010079F111ED35F8CC479449609E8A0923A6" ma:contentTypeVersion="12" ma:contentTypeDescription="Create a new document." ma:contentTypeScope="" ma:versionID="426e97fa315356fffbdcd9876fe988c2">
   <xsd:schema xmlns:xsd="http://www.w3.org/2001/XMLSchema" xmlns:xs="http://www.w3.org/2001/XMLSchema" xmlns:p="http://schemas.microsoft.com/office/2006/metadata/properties" xmlns:ns2="71af3243-3dd4-4a8d-8c0d-dd76da1f02a5" xmlns:ns3="16c05727-aa75-4e4a-9b5f-8a80a1165891" targetNamespace="http://schemas.microsoft.com/office/2006/metadata/properties" ma:root="true" ma:fieldsID="14b8f0def80e6d70ce3def20c90759ae" ns2:_="" ns3:_="">
     <xsd:import namespace="71af3243-3dd4-4a8d-8c0d-dd76da1f02a5"/>
@@ -17964,15 +17605,6 @@
 </ct:contentTypeSchema>
 </file>
 
-<file path=customXml/item2.xml><?xml version="1.0" encoding="utf-8"?>
-<p:properties xmlns:p="http://schemas.microsoft.com/office/2006/metadata/properties" xmlns:xsi="http://www.w3.org/2001/XMLSchema-instance" xmlns:pc="http://schemas.microsoft.com/office/infopath/2007/PartnerControls">
-  <documentManagement>
-    <Status xmlns="71af3243-3dd4-4a8d-8c0d-dd76da1f02a5">Not started</Status>
-    <MediaServiceKeyPoints xmlns="71af3243-3dd4-4a8d-8c0d-dd76da1f02a5" xsi:nil="true"/>
-  </documentManagement>
-</p:properties>
-</file>
-
 <file path=customXml/item3.xml><?xml version="1.0" encoding="utf-8"?>
 <?mso-contentType ?>
 <FormTemplates xmlns="http://schemas.microsoft.com/sharepoint/v3/contenttype/forms">
@@ -17983,6 +17615,16 @@
 </file>
 
 <file path=customXml/itemProps1.xml><?xml version="1.0" encoding="utf-8"?>
+<ds:datastoreItem xmlns:ds="http://schemas.openxmlformats.org/officeDocument/2006/customXml" ds:itemID="{09EC1AB0-9704-404D-B6D3-819D938AC55B}">
+  <ds:schemaRefs>
+    <ds:schemaRef ds:uri="http://schemas.microsoft.com/office/2006/metadata/properties"/>
+    <ds:schemaRef ds:uri="http://schemas.microsoft.com/office/infopath/2007/PartnerControls"/>
+    <ds:schemaRef ds:uri="71af3243-3dd4-4a8d-8c0d-dd76da1f02a5"/>
+  </ds:schemaRefs>
+</ds:datastoreItem>
+</file>
+
+<file path=customXml/itemProps2.xml><?xml version="1.0" encoding="utf-8"?>
 <ds:datastoreItem xmlns:ds="http://schemas.openxmlformats.org/officeDocument/2006/customXml" ds:itemID="{94F21D10-BD83-491A-AAA6-945C2DB1EB01}">
   <ds:schemaRefs>
     <ds:schemaRef ds:uri="http://schemas.microsoft.com/office/2006/metadata/contentType"/>
@@ -18001,16 +17643,6 @@
 </ds:datastoreItem>
 </file>
 
-<file path=customXml/itemProps2.xml><?xml version="1.0" encoding="utf-8"?>
-<ds:datastoreItem xmlns:ds="http://schemas.openxmlformats.org/officeDocument/2006/customXml" ds:itemID="{09EC1AB0-9704-404D-B6D3-819D938AC55B}">
-  <ds:schemaRefs>
-    <ds:schemaRef ds:uri="http://schemas.microsoft.com/office/2006/metadata/properties"/>
-    <ds:schemaRef ds:uri="http://schemas.microsoft.com/office/infopath/2007/PartnerControls"/>
-    <ds:schemaRef ds:uri="71af3243-3dd4-4a8d-8c0d-dd76da1f02a5"/>
-  </ds:schemaRefs>
-</ds:datastoreItem>
-</file>
-
 <file path=customXml/itemProps3.xml><?xml version="1.0" encoding="utf-8"?>
 <ds:datastoreItem xmlns:ds="http://schemas.openxmlformats.org/officeDocument/2006/customXml" ds:itemID="{1D20B6E4-879E-4E6C-BDE7-261540CD3765}">
   <ds:schemaRefs>

</xml_diff>